<commit_message>
Präsentation Milestone 4 v1.0
</commit_message>
<xml_diff>
--- a/Non-Code (Doku usw.)/Semester 2/_Präsentationen/Präsentation Milestone 4 - 25.04.17.pptx
+++ b/Non-Code (Doku usw.)/Semester 2/_Präsentationen/Präsentation Milestone 4 - 25.04.17.pptx
@@ -9,10 +9,10 @@
     <p:sldMasterId id="2147483683" r:id="rId5"/>
   </p:sldMasterIdLst>
   <p:notesMasterIdLst>
-    <p:notesMasterId r:id="rId34"/>
+    <p:notesMasterId r:id="rId32"/>
   </p:notesMasterIdLst>
   <p:handoutMasterIdLst>
-    <p:handoutMasterId r:id="rId35"/>
+    <p:handoutMasterId r:id="rId33"/>
   </p:handoutMasterIdLst>
   <p:sldIdLst>
     <p:sldId id="293" r:id="rId6"/>
@@ -22,27 +22,25 @@
     <p:sldId id="308" r:id="rId10"/>
     <p:sldId id="315" r:id="rId11"/>
     <p:sldId id="316" r:id="rId12"/>
-    <p:sldId id="317" r:id="rId13"/>
-    <p:sldId id="318" r:id="rId14"/>
-    <p:sldId id="309" r:id="rId15"/>
-    <p:sldId id="310" r:id="rId16"/>
-    <p:sldId id="320" r:id="rId17"/>
-    <p:sldId id="331" r:id="rId18"/>
-    <p:sldId id="321" r:id="rId19"/>
-    <p:sldId id="322" r:id="rId20"/>
-    <p:sldId id="324" r:id="rId21"/>
-    <p:sldId id="323" r:id="rId22"/>
-    <p:sldId id="311" r:id="rId23"/>
-    <p:sldId id="312" r:id="rId24"/>
-    <p:sldId id="325" r:id="rId25"/>
-    <p:sldId id="326" r:id="rId26"/>
-    <p:sldId id="327" r:id="rId27"/>
-    <p:sldId id="328" r:id="rId28"/>
-    <p:sldId id="329" r:id="rId29"/>
-    <p:sldId id="330" r:id="rId30"/>
-    <p:sldId id="313" r:id="rId31"/>
-    <p:sldId id="314" r:id="rId32"/>
-    <p:sldId id="278" r:id="rId33"/>
+    <p:sldId id="318" r:id="rId13"/>
+    <p:sldId id="309" r:id="rId14"/>
+    <p:sldId id="310" r:id="rId15"/>
+    <p:sldId id="320" r:id="rId16"/>
+    <p:sldId id="331" r:id="rId17"/>
+    <p:sldId id="321" r:id="rId18"/>
+    <p:sldId id="332" r:id="rId19"/>
+    <p:sldId id="333" r:id="rId20"/>
+    <p:sldId id="311" r:id="rId21"/>
+    <p:sldId id="312" r:id="rId22"/>
+    <p:sldId id="325" r:id="rId23"/>
+    <p:sldId id="326" r:id="rId24"/>
+    <p:sldId id="327" r:id="rId25"/>
+    <p:sldId id="328" r:id="rId26"/>
+    <p:sldId id="329" r:id="rId27"/>
+    <p:sldId id="330" r:id="rId28"/>
+    <p:sldId id="313" r:id="rId29"/>
+    <p:sldId id="314" r:id="rId30"/>
+    <p:sldId id="278" r:id="rId31"/>
   </p:sldIdLst>
   <p:sldSz cx="12192000" cy="6858000"/>
   <p:notesSz cx="6858000" cy="9144000"/>
@@ -17869,25 +17867,17 @@
           <a:p>
             <a:r>
               <a:rPr lang="de-DE" dirty="0"/>
-              <a:t>Idee der Sessions erklären</a:t>
-            </a:r>
-            <a:br>
-              <a:rPr lang="de-DE" dirty="0"/>
-            </a:br>
-            <a:r>
-              <a:rPr lang="de-DE" dirty="0"/>
-              <a:t>Idee des Archivs erklären</a:t>
-            </a:r>
-            <a:br>
-              <a:rPr lang="de-DE" dirty="0"/>
-            </a:br>
-            <a:r>
-              <a:rPr lang="de-DE" dirty="0"/>
-              <a:t>Überleitung</a:t>
+              <a:t>Betonen der Archivfunktion</a:t>
             </a:r>
             <a:r>
               <a:rPr lang="de-DE" baseline="0" dirty="0"/>
-              <a:t> auf Navigationsleiste (nächste Folie)</a:t>
+              <a:t> </a:t>
+            </a:r>
+            <a:r>
+              <a:rPr lang="de-DE" baseline="0" dirty="0">
+                <a:sym typeface="Wingdings" panose="05000000000000000000" pitchFamily="2" charset="2"/>
+              </a:rPr>
+              <a:t> Aus User-Stories hervorgegangen, aber noch nicht final abgeklärt</a:t>
             </a:r>
             <a:endParaRPr lang="de-DE" dirty="0"/>
           </a:p>
@@ -17910,7 +17900,7 @@
           <a:p>
             <a:fld id="{2C6D43BA-BF3B-4C35-86C4-88F3F3542AEC}" type="slidenum">
               <a:rPr lang="de-DE" smtClean="0"/>
-              <a:t>23</a:t>
+              <a:t>7</a:t>
             </a:fld>
             <a:endParaRPr lang="de-DE"/>
           </a:p>
@@ -17919,7 +17909,7 @@
     </p:spTree>
     <p:extLst>
       <p:ext uri="{BB962C8B-B14F-4D97-AF65-F5344CB8AC3E}">
-        <p14:creationId xmlns:p14="http://schemas.microsoft.com/office/powerpoint/2010/main" val="2562713288"/>
+        <p14:creationId xmlns:p14="http://schemas.microsoft.com/office/powerpoint/2010/main" val="3385204701"/>
       </p:ext>
     </p:extLst>
   </p:cSld>
@@ -17975,30 +17965,11 @@
           <a:p>
             <a:r>
               <a:rPr lang="de-DE" dirty="0"/>
-              <a:t>Ausloggen</a:t>
+              <a:t>Hier ebenfalls</a:t>
             </a:r>
             <a:r>
               <a:rPr lang="de-DE" baseline="0" dirty="0"/>
-              <a:t> bzw. Session verlassen</a:t>
-            </a:r>
-            <a:br>
-              <a:rPr lang="de-DE" baseline="0" dirty="0"/>
-            </a:br>
-            <a:r>
-              <a:rPr lang="de-DE" baseline="0" dirty="0"/>
-              <a:t>Nutzer der aktuellen Session hinzufügen</a:t>
-            </a:r>
-          </a:p>
-          <a:p>
-            <a:r>
-              <a:rPr lang="de-DE" baseline="0" dirty="0"/>
-              <a:t>Nutzerdaten bearbeiten / ansehen</a:t>
-            </a:r>
-          </a:p>
-          <a:p>
-            <a:r>
-              <a:rPr lang="de-DE" baseline="0" dirty="0"/>
-              <a:t>Hilfefunktion zur aktuellen Seite</a:t>
+              <a:t> auf die Events eingehen, werden ja eh miterklärt, wenn die Agent Aufteilung erklärt wird</a:t>
             </a:r>
             <a:endParaRPr lang="de-DE" dirty="0"/>
           </a:p>
@@ -18021,7 +17992,7 @@
           <a:p>
             <a:fld id="{2C6D43BA-BF3B-4C35-86C4-88F3F3542AEC}" type="slidenum">
               <a:rPr lang="de-DE" smtClean="0"/>
-              <a:t>24</a:t>
+              <a:t>8</a:t>
             </a:fld>
             <a:endParaRPr lang="de-DE"/>
           </a:p>
@@ -18030,7 +18001,7 @@
     </p:spTree>
     <p:extLst>
       <p:ext uri="{BB962C8B-B14F-4D97-AF65-F5344CB8AC3E}">
-        <p14:creationId xmlns:p14="http://schemas.microsoft.com/office/powerpoint/2010/main" val="1741390941"/>
+        <p14:creationId xmlns:p14="http://schemas.microsoft.com/office/powerpoint/2010/main" val="3658190669"/>
       </p:ext>
     </p:extLst>
   </p:cSld>
@@ -18084,7 +18055,10 @@
           <a:bodyPr/>
           <a:lstStyle/>
           <a:p>
-            <a:endParaRPr lang="en-US" dirty="0"/>
+            <a:r>
+              <a:rPr lang="de-DE" dirty="0"/>
+              <a:t>Hinweis auf externe Schnittstelle Google OAuth2</a:t>
+            </a:r>
           </a:p>
         </p:txBody>
       </p:sp>
@@ -18105,7 +18079,308 @@
           <a:p>
             <a:fld id="{2C6D43BA-BF3B-4C35-86C4-88F3F3542AEC}" type="slidenum">
               <a:rPr lang="de-DE" smtClean="0"/>
-              <a:t>28</a:t>
+              <a:t>15</a:t>
+            </a:fld>
+            <a:endParaRPr lang="de-DE"/>
+          </a:p>
+        </p:txBody>
+      </p:sp>
+    </p:spTree>
+    <p:extLst>
+      <p:ext uri="{BB962C8B-B14F-4D97-AF65-F5344CB8AC3E}">
+        <p14:creationId xmlns:p14="http://schemas.microsoft.com/office/powerpoint/2010/main" val="3140933512"/>
+      </p:ext>
+    </p:extLst>
+  </p:cSld>
+  <p:clrMapOvr>
+    <a:masterClrMapping/>
+  </p:clrMapOvr>
+</p:notes>
+</file>
+
+<file path=ppt/notesSlides/notesSlide5.xml><?xml version="1.0" encoding="utf-8"?>
+<p:notes xmlns:a="http://schemas.openxmlformats.org/drawingml/2006/main" xmlns:r="http://schemas.openxmlformats.org/officeDocument/2006/relationships" xmlns:p="http://schemas.openxmlformats.org/presentationml/2006/main">
+  <p:cSld>
+    <p:spTree>
+      <p:nvGrpSpPr>
+        <p:cNvPr id="1" name=""/>
+        <p:cNvGrpSpPr/>
+        <p:nvPr/>
+      </p:nvGrpSpPr>
+      <p:grpSpPr>
+        <a:xfrm>
+          <a:off x="0" y="0"/>
+          <a:ext cx="0" cy="0"/>
+          <a:chOff x="0" y="0"/>
+          <a:chExt cx="0" cy="0"/>
+        </a:xfrm>
+      </p:grpSpPr>
+      <p:sp>
+        <p:nvSpPr>
+          <p:cNvPr id="2" name="Folienbildplatzhalter 1"/>
+          <p:cNvSpPr>
+            <a:spLocks noGrp="1" noRot="1" noChangeAspect="1"/>
+          </p:cNvSpPr>
+          <p:nvPr>
+            <p:ph type="sldImg"/>
+          </p:nvPr>
+        </p:nvSpPr>
+        <p:spPr/>
+      </p:sp>
+      <p:sp>
+        <p:nvSpPr>
+          <p:cNvPr id="3" name="Notizenplatzhalter 2"/>
+          <p:cNvSpPr>
+            <a:spLocks noGrp="1"/>
+          </p:cNvSpPr>
+          <p:nvPr>
+            <p:ph type="body" idx="1"/>
+          </p:nvPr>
+        </p:nvSpPr>
+        <p:spPr/>
+        <p:txBody>
+          <a:bodyPr/>
+          <a:lstStyle/>
+          <a:p>
+            <a:r>
+              <a:rPr lang="de-DE" dirty="0"/>
+              <a:t>Idee der Sessions erklären</a:t>
+            </a:r>
+            <a:br>
+              <a:rPr lang="de-DE" dirty="0"/>
+            </a:br>
+            <a:r>
+              <a:rPr lang="de-DE" dirty="0"/>
+              <a:t>Idee des Archivs erklären</a:t>
+            </a:r>
+            <a:br>
+              <a:rPr lang="de-DE" dirty="0"/>
+            </a:br>
+            <a:r>
+              <a:rPr lang="de-DE" dirty="0"/>
+              <a:t>Überleitung</a:t>
+            </a:r>
+            <a:r>
+              <a:rPr lang="de-DE" baseline="0" dirty="0"/>
+              <a:t> auf Navigationsleiste (nächste Folie)</a:t>
+            </a:r>
+            <a:endParaRPr lang="de-DE" dirty="0"/>
+          </a:p>
+        </p:txBody>
+      </p:sp>
+      <p:sp>
+        <p:nvSpPr>
+          <p:cNvPr id="4" name="Foliennummernplatzhalter 3"/>
+          <p:cNvSpPr>
+            <a:spLocks noGrp="1"/>
+          </p:cNvSpPr>
+          <p:nvPr>
+            <p:ph type="sldNum" sz="quarter" idx="10"/>
+          </p:nvPr>
+        </p:nvSpPr>
+        <p:spPr/>
+        <p:txBody>
+          <a:bodyPr/>
+          <a:lstStyle/>
+          <a:p>
+            <a:fld id="{2C6D43BA-BF3B-4C35-86C4-88F3F3542AEC}" type="slidenum">
+              <a:rPr lang="de-DE" smtClean="0"/>
+              <a:t>21</a:t>
+            </a:fld>
+            <a:endParaRPr lang="de-DE"/>
+          </a:p>
+        </p:txBody>
+      </p:sp>
+    </p:spTree>
+    <p:extLst>
+      <p:ext uri="{BB962C8B-B14F-4D97-AF65-F5344CB8AC3E}">
+        <p14:creationId xmlns:p14="http://schemas.microsoft.com/office/powerpoint/2010/main" val="2562713288"/>
+      </p:ext>
+    </p:extLst>
+  </p:cSld>
+  <p:clrMapOvr>
+    <a:masterClrMapping/>
+  </p:clrMapOvr>
+</p:notes>
+</file>
+
+<file path=ppt/notesSlides/notesSlide6.xml><?xml version="1.0" encoding="utf-8"?>
+<p:notes xmlns:a="http://schemas.openxmlformats.org/drawingml/2006/main" xmlns:r="http://schemas.openxmlformats.org/officeDocument/2006/relationships" xmlns:p="http://schemas.openxmlformats.org/presentationml/2006/main">
+  <p:cSld>
+    <p:spTree>
+      <p:nvGrpSpPr>
+        <p:cNvPr id="1" name=""/>
+        <p:cNvGrpSpPr/>
+        <p:nvPr/>
+      </p:nvGrpSpPr>
+      <p:grpSpPr>
+        <a:xfrm>
+          <a:off x="0" y="0"/>
+          <a:ext cx="0" cy="0"/>
+          <a:chOff x="0" y="0"/>
+          <a:chExt cx="0" cy="0"/>
+        </a:xfrm>
+      </p:grpSpPr>
+      <p:sp>
+        <p:nvSpPr>
+          <p:cNvPr id="2" name="Folienbildplatzhalter 1"/>
+          <p:cNvSpPr>
+            <a:spLocks noGrp="1" noRot="1" noChangeAspect="1"/>
+          </p:cNvSpPr>
+          <p:nvPr>
+            <p:ph type="sldImg"/>
+          </p:nvPr>
+        </p:nvSpPr>
+        <p:spPr/>
+      </p:sp>
+      <p:sp>
+        <p:nvSpPr>
+          <p:cNvPr id="3" name="Notizenplatzhalter 2"/>
+          <p:cNvSpPr>
+            <a:spLocks noGrp="1"/>
+          </p:cNvSpPr>
+          <p:nvPr>
+            <p:ph type="body" idx="1"/>
+          </p:nvPr>
+        </p:nvSpPr>
+        <p:spPr/>
+        <p:txBody>
+          <a:bodyPr/>
+          <a:lstStyle/>
+          <a:p>
+            <a:r>
+              <a:rPr lang="de-DE" dirty="0"/>
+              <a:t>Ausloggen</a:t>
+            </a:r>
+            <a:r>
+              <a:rPr lang="de-DE" baseline="0" dirty="0"/>
+              <a:t> bzw. Session verlassen</a:t>
+            </a:r>
+            <a:br>
+              <a:rPr lang="de-DE" baseline="0" dirty="0"/>
+            </a:br>
+            <a:r>
+              <a:rPr lang="de-DE" baseline="0" dirty="0"/>
+              <a:t>Nutzer der aktuellen Session hinzufügen</a:t>
+            </a:r>
+          </a:p>
+          <a:p>
+            <a:r>
+              <a:rPr lang="de-DE" baseline="0" dirty="0"/>
+              <a:t>Nutzerdaten bearbeiten / ansehen</a:t>
+            </a:r>
+          </a:p>
+          <a:p>
+            <a:r>
+              <a:rPr lang="de-DE" baseline="0" dirty="0"/>
+              <a:t>Hilfefunktion zur aktuellen Seite</a:t>
+            </a:r>
+            <a:endParaRPr lang="de-DE" dirty="0"/>
+          </a:p>
+        </p:txBody>
+      </p:sp>
+      <p:sp>
+        <p:nvSpPr>
+          <p:cNvPr id="4" name="Foliennummernplatzhalter 3"/>
+          <p:cNvSpPr>
+            <a:spLocks noGrp="1"/>
+          </p:cNvSpPr>
+          <p:nvPr>
+            <p:ph type="sldNum" sz="quarter" idx="10"/>
+          </p:nvPr>
+        </p:nvSpPr>
+        <p:spPr/>
+        <p:txBody>
+          <a:bodyPr/>
+          <a:lstStyle/>
+          <a:p>
+            <a:fld id="{2C6D43BA-BF3B-4C35-86C4-88F3F3542AEC}" type="slidenum">
+              <a:rPr lang="de-DE" smtClean="0"/>
+              <a:t>22</a:t>
+            </a:fld>
+            <a:endParaRPr lang="de-DE"/>
+          </a:p>
+        </p:txBody>
+      </p:sp>
+    </p:spTree>
+    <p:extLst>
+      <p:ext uri="{BB962C8B-B14F-4D97-AF65-F5344CB8AC3E}">
+        <p14:creationId xmlns:p14="http://schemas.microsoft.com/office/powerpoint/2010/main" val="1741390941"/>
+      </p:ext>
+    </p:extLst>
+  </p:cSld>
+  <p:clrMapOvr>
+    <a:masterClrMapping/>
+  </p:clrMapOvr>
+</p:notes>
+</file>
+
+<file path=ppt/notesSlides/notesSlide7.xml><?xml version="1.0" encoding="utf-8"?>
+<p:notes xmlns:a="http://schemas.openxmlformats.org/drawingml/2006/main" xmlns:r="http://schemas.openxmlformats.org/officeDocument/2006/relationships" xmlns:p="http://schemas.openxmlformats.org/presentationml/2006/main">
+  <p:cSld>
+    <p:spTree>
+      <p:nvGrpSpPr>
+        <p:cNvPr id="1" name=""/>
+        <p:cNvGrpSpPr/>
+        <p:nvPr/>
+      </p:nvGrpSpPr>
+      <p:grpSpPr>
+        <a:xfrm>
+          <a:off x="0" y="0"/>
+          <a:ext cx="0" cy="0"/>
+          <a:chOff x="0" y="0"/>
+          <a:chExt cx="0" cy="0"/>
+        </a:xfrm>
+      </p:grpSpPr>
+      <p:sp>
+        <p:nvSpPr>
+          <p:cNvPr id="2" name="Folienbildplatzhalter 1"/>
+          <p:cNvSpPr>
+            <a:spLocks noGrp="1" noRot="1" noChangeAspect="1"/>
+          </p:cNvSpPr>
+          <p:nvPr>
+            <p:ph type="sldImg"/>
+          </p:nvPr>
+        </p:nvSpPr>
+        <p:spPr/>
+      </p:sp>
+      <p:sp>
+        <p:nvSpPr>
+          <p:cNvPr id="3" name="Notizenplatzhalter 2"/>
+          <p:cNvSpPr>
+            <a:spLocks noGrp="1"/>
+          </p:cNvSpPr>
+          <p:nvPr>
+            <p:ph type="body" idx="1"/>
+          </p:nvPr>
+        </p:nvSpPr>
+        <p:spPr/>
+        <p:txBody>
+          <a:bodyPr/>
+          <a:lstStyle/>
+          <a:p>
+            <a:endParaRPr lang="en-US" dirty="0"/>
+          </a:p>
+        </p:txBody>
+      </p:sp>
+      <p:sp>
+        <p:nvSpPr>
+          <p:cNvPr id="4" name="Foliennummernplatzhalter 3"/>
+          <p:cNvSpPr>
+            <a:spLocks noGrp="1"/>
+          </p:cNvSpPr>
+          <p:nvPr>
+            <p:ph type="sldNum" sz="quarter" idx="10"/>
+          </p:nvPr>
+        </p:nvSpPr>
+        <p:spPr/>
+        <p:txBody>
+          <a:bodyPr/>
+          <a:lstStyle/>
+          <a:p>
+            <a:fld id="{2C6D43BA-BF3B-4C35-86C4-88F3F3542AEC}" type="slidenum">
+              <a:rPr lang="de-DE" smtClean="0"/>
+              <a:t>26</a:t>
             </a:fld>
             <a:endParaRPr lang="de-DE"/>
           </a:p>
@@ -36772,144 +37047,6 @@
           <a:p>
             <a:r>
               <a:rPr lang="de-DE" dirty="0"/>
-              <a:t>Systementwurf</a:t>
-            </a:r>
-          </a:p>
-        </p:txBody>
-      </p:sp>
-      <p:sp>
-        <p:nvSpPr>
-          <p:cNvPr id="3" name="Textplatzhalter 2"/>
-          <p:cNvSpPr>
-            <a:spLocks noGrp="1"/>
-          </p:cNvSpPr>
-          <p:nvPr>
-            <p:ph type="body" idx="1"/>
-          </p:nvPr>
-        </p:nvSpPr>
-        <p:spPr/>
-        <p:txBody>
-          <a:bodyPr/>
-          <a:lstStyle/>
-          <a:p>
-            <a:endParaRPr lang="de-DE"/>
-          </a:p>
-        </p:txBody>
-      </p:sp>
-      <p:sp>
-        <p:nvSpPr>
-          <p:cNvPr id="4" name="Datumsplatzhalter 3"/>
-          <p:cNvSpPr>
-            <a:spLocks noGrp="1"/>
-          </p:cNvSpPr>
-          <p:nvPr>
-            <p:ph type="dt" sz="half" idx="10"/>
-          </p:nvPr>
-        </p:nvSpPr>
-        <p:spPr/>
-        <p:txBody>
-          <a:bodyPr/>
-          <a:lstStyle/>
-          <a:p>
-            <a:r>
-              <a:rPr lang="de-DE"/>
-              <a:t>25.04.2017</a:t>
-            </a:r>
-          </a:p>
-        </p:txBody>
-      </p:sp>
-      <p:sp>
-        <p:nvSpPr>
-          <p:cNvPr id="5" name="Fußzeilenplatzhalter 4"/>
-          <p:cNvSpPr>
-            <a:spLocks noGrp="1"/>
-          </p:cNvSpPr>
-          <p:nvPr>
-            <p:ph type="ftr" sz="quarter" idx="11"/>
-          </p:nvPr>
-        </p:nvSpPr>
-        <p:spPr/>
-        <p:txBody>
-          <a:bodyPr/>
-          <a:lstStyle/>
-          <a:p>
-            <a:r>
-              <a:rPr lang="de-DE"/>
-              <a:t>Florian Blessing, Lisa Böhler, Markus Götz, Jan Habersetzer, Wendelin Herrmann</a:t>
-            </a:r>
-          </a:p>
-        </p:txBody>
-      </p:sp>
-      <p:sp>
-        <p:nvSpPr>
-          <p:cNvPr id="6" name="Foliennummernplatzhalter 5"/>
-          <p:cNvSpPr>
-            <a:spLocks noGrp="1"/>
-          </p:cNvSpPr>
-          <p:nvPr>
-            <p:ph type="sldNum" sz="quarter" idx="12"/>
-          </p:nvPr>
-        </p:nvSpPr>
-        <p:spPr/>
-        <p:txBody>
-          <a:bodyPr/>
-          <a:lstStyle/>
-          <a:p>
-            <a:fld id="{9A8D1588-5235-4A3E-9519-E5C37E4E16B7}" type="slidenum">
-              <a:rPr lang="de-DE" smtClean="0"/>
-              <a:t>10</a:t>
-            </a:fld>
-            <a:endParaRPr lang="de-DE"/>
-          </a:p>
-        </p:txBody>
-      </p:sp>
-    </p:spTree>
-    <p:extLst>
-      <p:ext uri="{BB962C8B-B14F-4D97-AF65-F5344CB8AC3E}">
-        <p14:creationId xmlns:p14="http://schemas.microsoft.com/office/powerpoint/2010/main" val="3801462308"/>
-      </p:ext>
-    </p:extLst>
-  </p:cSld>
-  <p:clrMapOvr>
-    <a:masterClrMapping/>
-  </p:clrMapOvr>
-</p:sld>
-</file>
-
-<file path=ppt/slides/slide11.xml><?xml version="1.0" encoding="utf-8"?>
-<p:sld xmlns:a="http://schemas.openxmlformats.org/drawingml/2006/main" xmlns:r="http://schemas.openxmlformats.org/officeDocument/2006/relationships" xmlns:p="http://schemas.openxmlformats.org/presentationml/2006/main">
-  <p:cSld>
-    <p:spTree>
-      <p:nvGrpSpPr>
-        <p:cNvPr id="1" name=""/>
-        <p:cNvGrpSpPr/>
-        <p:nvPr/>
-      </p:nvGrpSpPr>
-      <p:grpSpPr>
-        <a:xfrm>
-          <a:off x="0" y="0"/>
-          <a:ext cx="0" cy="0"/>
-          <a:chOff x="0" y="0"/>
-          <a:chExt cx="0" cy="0"/>
-        </a:xfrm>
-      </p:grpSpPr>
-      <p:sp>
-        <p:nvSpPr>
-          <p:cNvPr id="2" name="Titel 1"/>
-          <p:cNvSpPr>
-            <a:spLocks noGrp="1"/>
-          </p:cNvSpPr>
-          <p:nvPr>
-            <p:ph type="title"/>
-          </p:nvPr>
-        </p:nvSpPr>
-        <p:spPr/>
-        <p:txBody>
-          <a:bodyPr/>
-          <a:lstStyle/>
-          <a:p>
-            <a:r>
-              <a:rPr lang="de-DE" dirty="0"/>
               <a:t>Übersicht der Schnittstellen-Bereiche</a:t>
             </a:r>
           </a:p>
@@ -37005,7 +37142,7 @@
           <a:p>
             <a:fld id="{9A8D1588-5235-4A3E-9519-E5C37E4E16B7}" type="slidenum">
               <a:rPr lang="de-DE" smtClean="0"/>
-              <a:t>11</a:t>
+              <a:t>10</a:t>
             </a:fld>
             <a:endParaRPr lang="de-DE"/>
           </a:p>
@@ -37024,7 +37161,7 @@
 </p:sld>
 </file>
 
-<file path=ppt/slides/slide12.xml><?xml version="1.0" encoding="utf-8"?>
+<file path=ppt/slides/slide11.xml><?xml version="1.0" encoding="utf-8"?>
 <p:sld xmlns:a="http://schemas.openxmlformats.org/drawingml/2006/main" xmlns:r="http://schemas.openxmlformats.org/officeDocument/2006/relationships" xmlns:p="http://schemas.openxmlformats.org/presentationml/2006/main">
   <p:cSld>
     <p:spTree>
@@ -37124,7 +37261,7 @@
           <a:p>
             <a:fld id="{9A8D1588-5235-4A3E-9519-E5C37E4E16B7}" type="slidenum">
               <a:rPr lang="de-DE" smtClean="0"/>
-              <a:t>12</a:t>
+              <a:t>11</a:t>
             </a:fld>
             <a:endParaRPr lang="de-DE"/>
           </a:p>
@@ -37172,7 +37309,7 @@
 </p:sld>
 </file>
 
-<file path=ppt/slides/slide13.xml><?xml version="1.0" encoding="utf-8"?>
+<file path=ppt/slides/slide12.xml><?xml version="1.0" encoding="utf-8"?>
 <p:sld xmlns:a="http://schemas.openxmlformats.org/drawingml/2006/main" xmlns:r="http://schemas.openxmlformats.org/officeDocument/2006/relationships" xmlns:p="http://schemas.openxmlformats.org/presentationml/2006/main">
   <p:cSld>
     <p:spTree>
@@ -37272,7 +37409,7 @@
           <a:p>
             <a:fld id="{9A8D1588-5235-4A3E-9519-E5C37E4E16B7}" type="slidenum">
               <a:rPr lang="de-DE" smtClean="0"/>
-              <a:t>13</a:t>
+              <a:t>12</a:t>
             </a:fld>
             <a:endParaRPr lang="de-DE"/>
           </a:p>
@@ -37320,7 +37457,7 @@
 </p:sld>
 </file>
 
-<file path=ppt/slides/slide14.xml><?xml version="1.0" encoding="utf-8"?>
+<file path=ppt/slides/slide13.xml><?xml version="1.0" encoding="utf-8"?>
 <p:sld xmlns:a="http://schemas.openxmlformats.org/drawingml/2006/main" xmlns:r="http://schemas.openxmlformats.org/officeDocument/2006/relationships" xmlns:p="http://schemas.openxmlformats.org/presentationml/2006/main">
   <p:cSld>
     <p:spTree>
@@ -37337,25 +37474,35 @@
           <a:chExt cx="0" cy="0"/>
         </a:xfrm>
       </p:grpSpPr>
-      <p:sp>
-        <p:nvSpPr>
-          <p:cNvPr id="7" name="Inhaltsplatzhalter 6"/>
-          <p:cNvSpPr>
-            <a:spLocks noGrp="1"/>
-          </p:cNvSpPr>
+      <p:pic>
+        <p:nvPicPr>
+          <p:cNvPr id="9" name="Inhaltsplatzhalter 8"/>
+          <p:cNvPicPr>
+            <a:picLocks noGrp="1" noChangeAspect="1"/>
+          </p:cNvPicPr>
           <p:nvPr>
             <p:ph idx="1"/>
           </p:nvPr>
-        </p:nvSpPr>
-        <p:spPr/>
-        <p:txBody>
-          <a:bodyPr/>
-          <a:lstStyle/>
-          <a:p>
-            <a:endParaRPr lang="de-DE"/>
-          </a:p>
-        </p:txBody>
-      </p:sp>
+        </p:nvPicPr>
+        <p:blipFill>
+          <a:blip r:embed="rId2">
+            <a:extLst>
+              <a:ext uri="{28A0092B-C50C-407E-A947-70E740481C1C}">
+                <a14:useLocalDpi xmlns:a14="http://schemas.microsoft.com/office/drawing/2010/main" val="0"/>
+              </a:ext>
+            </a:extLst>
+          </a:blip>
+          <a:stretch>
+            <a:fillRect/>
+          </a:stretch>
+        </p:blipFill>
+        <p:spPr>
+          <a:xfrm>
+            <a:off x="3470970" y="2057399"/>
+            <a:ext cx="8176243" cy="3780000"/>
+          </a:xfrm>
+        </p:spPr>
+      </p:pic>
       <p:sp>
         <p:nvSpPr>
           <p:cNvPr id="8" name="Textplatzhalter 7"/>
@@ -37366,12 +37513,17 @@
             <p:ph type="body" sz="half" idx="2"/>
           </p:nvPr>
         </p:nvSpPr>
-        <p:spPr/>
+        <p:spPr>
+          <a:xfrm>
+            <a:off x="838199" y="2057399"/>
+            <a:ext cx="2381394" cy="3811588"/>
+          </a:xfrm>
+        </p:spPr>
         <p:txBody>
           <a:bodyPr/>
           <a:lstStyle/>
           <a:p>
-            <a:endParaRPr lang="de-DE"/>
+            <a:endParaRPr lang="de-DE" dirty="0"/>
           </a:p>
         </p:txBody>
       </p:sp>
@@ -37436,7 +37588,7 @@
           <a:p>
             <a:fld id="{9A8D1588-5235-4A3E-9519-E5C37E4E16B7}" type="slidenum">
               <a:rPr lang="de-DE" smtClean="0"/>
-              <a:t>14</a:t>
+              <a:t>13</a:t>
             </a:fld>
             <a:endParaRPr lang="de-DE"/>
           </a:p>
@@ -37480,6 +37632,195 @@
     <p:extLst>
       <p:ext uri="{BB962C8B-B14F-4D97-AF65-F5344CB8AC3E}">
         <p14:creationId xmlns:p14="http://schemas.microsoft.com/office/powerpoint/2010/main" val="783009305"/>
+      </p:ext>
+    </p:extLst>
+  </p:cSld>
+  <p:clrMapOvr>
+    <a:masterClrMapping/>
+  </p:clrMapOvr>
+</p:sld>
+</file>
+
+<file path=ppt/slides/slide14.xml><?xml version="1.0" encoding="utf-8"?>
+<p:sld xmlns:a="http://schemas.openxmlformats.org/drawingml/2006/main" xmlns:r="http://schemas.openxmlformats.org/officeDocument/2006/relationships" xmlns:p="http://schemas.openxmlformats.org/presentationml/2006/main">
+  <p:cSld>
+    <p:spTree>
+      <p:nvGrpSpPr>
+        <p:cNvPr id="1" name=""/>
+        <p:cNvGrpSpPr/>
+        <p:nvPr/>
+      </p:nvGrpSpPr>
+      <p:grpSpPr>
+        <a:xfrm>
+          <a:off x="0" y="0"/>
+          <a:ext cx="0" cy="0"/>
+          <a:chOff x="0" y="0"/>
+          <a:chExt cx="0" cy="0"/>
+        </a:xfrm>
+      </p:grpSpPr>
+      <p:pic>
+        <p:nvPicPr>
+          <p:cNvPr id="9" name="Inhaltsplatzhalter 8"/>
+          <p:cNvPicPr>
+            <a:picLocks noGrp="1" noChangeAspect="1"/>
+          </p:cNvPicPr>
+          <p:nvPr>
+            <p:ph idx="1"/>
+          </p:nvPr>
+        </p:nvPicPr>
+        <p:blipFill>
+          <a:blip r:embed="rId2">
+            <a:extLst>
+              <a:ext uri="{28A0092B-C50C-407E-A947-70E740481C1C}">
+                <a14:useLocalDpi xmlns:a14="http://schemas.microsoft.com/office/drawing/2010/main" val="0"/>
+              </a:ext>
+            </a:extLst>
+          </a:blip>
+          <a:stretch>
+            <a:fillRect/>
+          </a:stretch>
+        </p:blipFill>
+        <p:spPr>
+          <a:xfrm>
+            <a:off x="3470970" y="2158020"/>
+            <a:ext cx="8176243" cy="3578757"/>
+          </a:xfrm>
+        </p:spPr>
+      </p:pic>
+      <p:sp>
+        <p:nvSpPr>
+          <p:cNvPr id="8" name="Textplatzhalter 7"/>
+          <p:cNvSpPr>
+            <a:spLocks noGrp="1"/>
+          </p:cNvSpPr>
+          <p:nvPr>
+            <p:ph type="body" sz="half" idx="2"/>
+          </p:nvPr>
+        </p:nvSpPr>
+        <p:spPr>
+          <a:xfrm>
+            <a:off x="838199" y="2057399"/>
+            <a:ext cx="2381394" cy="3811588"/>
+          </a:xfrm>
+        </p:spPr>
+        <p:txBody>
+          <a:bodyPr/>
+          <a:lstStyle/>
+          <a:p>
+            <a:endParaRPr lang="de-DE" dirty="0"/>
+          </a:p>
+        </p:txBody>
+      </p:sp>
+      <p:sp>
+        <p:nvSpPr>
+          <p:cNvPr id="4" name="Datumsplatzhalter 3"/>
+          <p:cNvSpPr>
+            <a:spLocks noGrp="1"/>
+          </p:cNvSpPr>
+          <p:nvPr>
+            <p:ph type="dt" sz="half" idx="10"/>
+          </p:nvPr>
+        </p:nvSpPr>
+        <p:spPr/>
+        <p:txBody>
+          <a:bodyPr/>
+          <a:lstStyle/>
+          <a:p>
+            <a:r>
+              <a:rPr lang="de-DE"/>
+              <a:t>25.04.2017</a:t>
+            </a:r>
+          </a:p>
+        </p:txBody>
+      </p:sp>
+      <p:sp>
+        <p:nvSpPr>
+          <p:cNvPr id="5" name="Fußzeilenplatzhalter 4"/>
+          <p:cNvSpPr>
+            <a:spLocks noGrp="1"/>
+          </p:cNvSpPr>
+          <p:nvPr>
+            <p:ph type="ftr" sz="quarter" idx="11"/>
+          </p:nvPr>
+        </p:nvSpPr>
+        <p:spPr/>
+        <p:txBody>
+          <a:bodyPr/>
+          <a:lstStyle/>
+          <a:p>
+            <a:r>
+              <a:rPr lang="de-DE"/>
+              <a:t>Florian Blessing, Lisa Böhler, Markus Götz, Jan Habersetzer, Wendelin Herrmann</a:t>
+            </a:r>
+          </a:p>
+        </p:txBody>
+      </p:sp>
+      <p:sp>
+        <p:nvSpPr>
+          <p:cNvPr id="6" name="Foliennummernplatzhalter 5"/>
+          <p:cNvSpPr>
+            <a:spLocks noGrp="1"/>
+          </p:cNvSpPr>
+          <p:nvPr>
+            <p:ph type="sldNum" sz="quarter" idx="12"/>
+          </p:nvPr>
+        </p:nvSpPr>
+        <p:spPr/>
+        <p:txBody>
+          <a:bodyPr/>
+          <a:lstStyle/>
+          <a:p>
+            <a:fld id="{9A8D1588-5235-4A3E-9519-E5C37E4E16B7}" type="slidenum">
+              <a:rPr lang="de-DE" smtClean="0"/>
+              <a:t>14</a:t>
+            </a:fld>
+            <a:endParaRPr lang="de-DE"/>
+          </a:p>
+        </p:txBody>
+      </p:sp>
+      <p:sp>
+        <p:nvSpPr>
+          <p:cNvPr id="2" name="Titel 1"/>
+          <p:cNvSpPr>
+            <a:spLocks noGrp="1"/>
+          </p:cNvSpPr>
+          <p:nvPr>
+            <p:ph type="title"/>
+          </p:nvPr>
+        </p:nvSpPr>
+        <p:spPr>
+          <a:xfrm>
+            <a:off x="839788" y="595222"/>
+            <a:ext cx="4343400" cy="1462177"/>
+          </a:xfrm>
+        </p:spPr>
+        <p:txBody>
+          <a:bodyPr/>
+          <a:lstStyle/>
+          <a:p>
+            <a:r>
+              <a:rPr lang="de-DE" dirty="0"/>
+              <a:t>Schnittstelle </a:t>
+            </a:r>
+            <a:br>
+              <a:rPr lang="de-DE" dirty="0"/>
+            </a:br>
+            <a:r>
+              <a:rPr lang="de-DE" dirty="0"/>
+              <a:t>Speech </a:t>
+            </a:r>
+            <a:r>
+              <a:rPr lang="de-DE" dirty="0" err="1"/>
+              <a:t>Tokenizer</a:t>
+            </a:r>
+            <a:endParaRPr lang="de-DE" dirty="0"/>
+          </a:p>
+        </p:txBody>
+      </p:sp>
+    </p:spTree>
+    <p:extLst>
+      <p:ext uri="{BB962C8B-B14F-4D97-AF65-F5344CB8AC3E}">
+        <p14:creationId xmlns:p14="http://schemas.microsoft.com/office/powerpoint/2010/main" val="3649198627"/>
       </p:ext>
     </p:extLst>
   </p:cSld>
@@ -37506,28 +37847,38 @@
           <a:chExt cx="0" cy="0"/>
         </a:xfrm>
       </p:grpSpPr>
-      <p:sp>
-        <p:nvSpPr>
-          <p:cNvPr id="2" name="Inhaltsplatzhalter 1"/>
-          <p:cNvSpPr>
-            <a:spLocks noGrp="1"/>
-          </p:cNvSpPr>
+      <p:pic>
+        <p:nvPicPr>
+          <p:cNvPr id="9" name="Inhaltsplatzhalter 8"/>
+          <p:cNvPicPr>
+            <a:picLocks noGrp="1" noChangeAspect="1"/>
+          </p:cNvPicPr>
           <p:nvPr>
             <p:ph idx="1"/>
           </p:nvPr>
-        </p:nvSpPr>
-        <p:spPr/>
-        <p:txBody>
-          <a:bodyPr/>
-          <a:lstStyle/>
-          <a:p>
-            <a:endParaRPr lang="de-DE"/>
-          </a:p>
-        </p:txBody>
-      </p:sp>
+        </p:nvPicPr>
+        <p:blipFill>
+          <a:blip r:embed="rId3">
+            <a:extLst>
+              <a:ext uri="{28A0092B-C50C-407E-A947-70E740481C1C}">
+                <a14:useLocalDpi xmlns:a14="http://schemas.microsoft.com/office/drawing/2010/main" val="0"/>
+              </a:ext>
+            </a:extLst>
+          </a:blip>
+          <a:stretch>
+            <a:fillRect/>
+          </a:stretch>
+        </p:blipFill>
+        <p:spPr>
+          <a:xfrm>
+            <a:off x="4146856" y="1188987"/>
+            <a:ext cx="7484104" cy="4680000"/>
+          </a:xfrm>
+        </p:spPr>
+      </p:pic>
       <p:sp>
         <p:nvSpPr>
-          <p:cNvPr id="3" name="Textplatzhalter 2"/>
+          <p:cNvPr id="8" name="Textplatzhalter 7"/>
           <p:cNvSpPr>
             <a:spLocks noGrp="1"/>
           </p:cNvSpPr>
@@ -37535,12 +37886,17 @@
             <p:ph type="body" sz="half" idx="2"/>
           </p:nvPr>
         </p:nvSpPr>
-        <p:spPr/>
+        <p:spPr>
+          <a:xfrm>
+            <a:off x="838199" y="2057399"/>
+            <a:ext cx="2381394" cy="3811588"/>
+          </a:xfrm>
+        </p:spPr>
         <p:txBody>
           <a:bodyPr/>
           <a:lstStyle/>
           <a:p>
-            <a:endParaRPr lang="de-DE"/>
+            <a:endParaRPr lang="de-DE" dirty="0"/>
           </a:p>
         </p:txBody>
       </p:sp>
@@ -37613,7 +37969,7 @@
       </p:sp>
       <p:sp>
         <p:nvSpPr>
-          <p:cNvPr id="7" name="Titel 6"/>
+          <p:cNvPr id="2" name="Titel 1"/>
           <p:cNvSpPr>
             <a:spLocks noGrp="1"/>
           </p:cNvSpPr>
@@ -37621,7 +37977,12 @@
             <p:ph type="title"/>
           </p:nvPr>
         </p:nvSpPr>
-        <p:spPr/>
+        <p:spPr>
+          <a:xfrm>
+            <a:off x="839788" y="595222"/>
+            <a:ext cx="4343400" cy="1462177"/>
+          </a:xfrm>
+        </p:spPr>
         <p:txBody>
           <a:bodyPr/>
           <a:lstStyle/>
@@ -37635,20 +37996,15 @@
             </a:br>
             <a:r>
               <a:rPr lang="de-DE" dirty="0"/>
-              <a:t>Speech </a:t>
-            </a:r>
-            <a:r>
-              <a:rPr lang="de-DE" dirty="0" err="1"/>
-              <a:t>Tokenizer</a:t>
-            </a:r>
-            <a:endParaRPr lang="de-DE" dirty="0"/>
+              <a:t>User</a:t>
+            </a:r>
           </a:p>
         </p:txBody>
       </p:sp>
     </p:spTree>
     <p:extLst>
       <p:ext uri="{BB962C8B-B14F-4D97-AF65-F5344CB8AC3E}">
-        <p14:creationId xmlns:p14="http://schemas.microsoft.com/office/powerpoint/2010/main" val="2937030735"/>
+        <p14:creationId xmlns:p14="http://schemas.microsoft.com/office/powerpoint/2010/main" val="2038653466"/>
       </p:ext>
     </p:extLst>
   </p:cSld>
@@ -37659,342 +38015,6 @@
 </file>
 
 <file path=ppt/slides/slide16.xml><?xml version="1.0" encoding="utf-8"?>
-<p:sld xmlns:a="http://schemas.openxmlformats.org/drawingml/2006/main" xmlns:r="http://schemas.openxmlformats.org/officeDocument/2006/relationships" xmlns:p="http://schemas.openxmlformats.org/presentationml/2006/main">
-  <p:cSld>
-    <p:spTree>
-      <p:nvGrpSpPr>
-        <p:cNvPr id="1" name=""/>
-        <p:cNvGrpSpPr/>
-        <p:nvPr/>
-      </p:nvGrpSpPr>
-      <p:grpSpPr>
-        <a:xfrm>
-          <a:off x="0" y="0"/>
-          <a:ext cx="0" cy="0"/>
-          <a:chOff x="0" y="0"/>
-          <a:chExt cx="0" cy="0"/>
-        </a:xfrm>
-      </p:grpSpPr>
-      <p:sp>
-        <p:nvSpPr>
-          <p:cNvPr id="2" name="Inhaltsplatzhalter 1"/>
-          <p:cNvSpPr>
-            <a:spLocks noGrp="1"/>
-          </p:cNvSpPr>
-          <p:nvPr>
-            <p:ph idx="1"/>
-          </p:nvPr>
-        </p:nvSpPr>
-        <p:spPr/>
-        <p:txBody>
-          <a:bodyPr/>
-          <a:lstStyle/>
-          <a:p>
-            <a:endParaRPr lang="de-DE" dirty="0"/>
-          </a:p>
-        </p:txBody>
-      </p:sp>
-      <p:sp>
-        <p:nvSpPr>
-          <p:cNvPr id="3" name="Textplatzhalter 2"/>
-          <p:cNvSpPr>
-            <a:spLocks noGrp="1"/>
-          </p:cNvSpPr>
-          <p:nvPr>
-            <p:ph type="body" sz="half" idx="2"/>
-          </p:nvPr>
-        </p:nvSpPr>
-        <p:spPr/>
-        <p:txBody>
-          <a:bodyPr/>
-          <a:lstStyle/>
-          <a:p>
-            <a:endParaRPr lang="de-DE" dirty="0"/>
-          </a:p>
-        </p:txBody>
-      </p:sp>
-      <p:sp>
-        <p:nvSpPr>
-          <p:cNvPr id="4" name="Datumsplatzhalter 3"/>
-          <p:cNvSpPr>
-            <a:spLocks noGrp="1"/>
-          </p:cNvSpPr>
-          <p:nvPr>
-            <p:ph type="dt" sz="half" idx="10"/>
-          </p:nvPr>
-        </p:nvSpPr>
-        <p:spPr/>
-        <p:txBody>
-          <a:bodyPr/>
-          <a:lstStyle/>
-          <a:p>
-            <a:r>
-              <a:rPr lang="de-DE"/>
-              <a:t>25.04.2017</a:t>
-            </a:r>
-          </a:p>
-        </p:txBody>
-      </p:sp>
-      <p:sp>
-        <p:nvSpPr>
-          <p:cNvPr id="5" name="Fußzeilenplatzhalter 4"/>
-          <p:cNvSpPr>
-            <a:spLocks noGrp="1"/>
-          </p:cNvSpPr>
-          <p:nvPr>
-            <p:ph type="ftr" sz="quarter" idx="11"/>
-          </p:nvPr>
-        </p:nvSpPr>
-        <p:spPr/>
-        <p:txBody>
-          <a:bodyPr/>
-          <a:lstStyle/>
-          <a:p>
-            <a:r>
-              <a:rPr lang="de-DE"/>
-              <a:t>Florian Blessing, Lisa Böhler, Markus Götz, Jan Habersetzer, Wendelin Herrmann</a:t>
-            </a:r>
-          </a:p>
-        </p:txBody>
-      </p:sp>
-      <p:sp>
-        <p:nvSpPr>
-          <p:cNvPr id="6" name="Foliennummernplatzhalter 5"/>
-          <p:cNvSpPr>
-            <a:spLocks noGrp="1"/>
-          </p:cNvSpPr>
-          <p:nvPr>
-            <p:ph type="sldNum" sz="quarter" idx="12"/>
-          </p:nvPr>
-        </p:nvSpPr>
-        <p:spPr/>
-        <p:txBody>
-          <a:bodyPr/>
-          <a:lstStyle/>
-          <a:p>
-            <a:fld id="{9A8D1588-5235-4A3E-9519-E5C37E4E16B7}" type="slidenum">
-              <a:rPr lang="de-DE" smtClean="0"/>
-              <a:t>16</a:t>
-            </a:fld>
-            <a:endParaRPr lang="de-DE"/>
-          </a:p>
-        </p:txBody>
-      </p:sp>
-      <p:sp>
-        <p:nvSpPr>
-          <p:cNvPr id="7" name="Titel 6"/>
-          <p:cNvSpPr>
-            <a:spLocks noGrp="1"/>
-          </p:cNvSpPr>
-          <p:nvPr>
-            <p:ph type="title"/>
-          </p:nvPr>
-        </p:nvSpPr>
-        <p:spPr/>
-        <p:txBody>
-          <a:bodyPr/>
-          <a:lstStyle/>
-          <a:p>
-            <a:r>
-              <a:rPr lang="de-DE" dirty="0"/>
-              <a:t>Schnittstelle </a:t>
-            </a:r>
-            <a:br>
-              <a:rPr lang="de-DE" dirty="0"/>
-            </a:br>
-            <a:r>
-              <a:rPr lang="de-DE" dirty="0"/>
-              <a:t>Google </a:t>
-            </a:r>
-            <a:r>
-              <a:rPr lang="de-DE" dirty="0" err="1"/>
-              <a:t>Oauth</a:t>
-            </a:r>
-            <a:r>
-              <a:rPr lang="de-DE" dirty="0"/>
-              <a:t> 2.0</a:t>
-            </a:r>
-          </a:p>
-        </p:txBody>
-      </p:sp>
-    </p:spTree>
-    <p:extLst>
-      <p:ext uri="{BB962C8B-B14F-4D97-AF65-F5344CB8AC3E}">
-        <p14:creationId xmlns:p14="http://schemas.microsoft.com/office/powerpoint/2010/main" val="4125638618"/>
-      </p:ext>
-    </p:extLst>
-  </p:cSld>
-  <p:clrMapOvr>
-    <a:masterClrMapping/>
-  </p:clrMapOvr>
-</p:sld>
-</file>
-
-<file path=ppt/slides/slide17.xml><?xml version="1.0" encoding="utf-8"?>
-<p:sld xmlns:a="http://schemas.openxmlformats.org/drawingml/2006/main" xmlns:r="http://schemas.openxmlformats.org/officeDocument/2006/relationships" xmlns:p="http://schemas.openxmlformats.org/presentationml/2006/main">
-  <p:cSld>
-    <p:spTree>
-      <p:nvGrpSpPr>
-        <p:cNvPr id="1" name=""/>
-        <p:cNvGrpSpPr/>
-        <p:nvPr/>
-      </p:nvGrpSpPr>
-      <p:grpSpPr>
-        <a:xfrm>
-          <a:off x="0" y="0"/>
-          <a:ext cx="0" cy="0"/>
-          <a:chOff x="0" y="0"/>
-          <a:chExt cx="0" cy="0"/>
-        </a:xfrm>
-      </p:grpSpPr>
-      <p:sp>
-        <p:nvSpPr>
-          <p:cNvPr id="2" name="Inhaltsplatzhalter 1"/>
-          <p:cNvSpPr>
-            <a:spLocks noGrp="1"/>
-          </p:cNvSpPr>
-          <p:nvPr>
-            <p:ph idx="1"/>
-          </p:nvPr>
-        </p:nvSpPr>
-        <p:spPr/>
-        <p:txBody>
-          <a:bodyPr/>
-          <a:lstStyle/>
-          <a:p>
-            <a:endParaRPr lang="de-DE"/>
-          </a:p>
-        </p:txBody>
-      </p:sp>
-      <p:sp>
-        <p:nvSpPr>
-          <p:cNvPr id="3" name="Textplatzhalter 2"/>
-          <p:cNvSpPr>
-            <a:spLocks noGrp="1"/>
-          </p:cNvSpPr>
-          <p:nvPr>
-            <p:ph type="body" sz="half" idx="2"/>
-          </p:nvPr>
-        </p:nvSpPr>
-        <p:spPr/>
-        <p:txBody>
-          <a:bodyPr/>
-          <a:lstStyle/>
-          <a:p>
-            <a:endParaRPr lang="de-DE"/>
-          </a:p>
-        </p:txBody>
-      </p:sp>
-      <p:sp>
-        <p:nvSpPr>
-          <p:cNvPr id="4" name="Datumsplatzhalter 3"/>
-          <p:cNvSpPr>
-            <a:spLocks noGrp="1"/>
-          </p:cNvSpPr>
-          <p:nvPr>
-            <p:ph type="dt" sz="half" idx="10"/>
-          </p:nvPr>
-        </p:nvSpPr>
-        <p:spPr/>
-        <p:txBody>
-          <a:bodyPr/>
-          <a:lstStyle/>
-          <a:p>
-            <a:r>
-              <a:rPr lang="de-DE"/>
-              <a:t>25.04.2017</a:t>
-            </a:r>
-          </a:p>
-        </p:txBody>
-      </p:sp>
-      <p:sp>
-        <p:nvSpPr>
-          <p:cNvPr id="5" name="Fußzeilenplatzhalter 4"/>
-          <p:cNvSpPr>
-            <a:spLocks noGrp="1"/>
-          </p:cNvSpPr>
-          <p:nvPr>
-            <p:ph type="ftr" sz="quarter" idx="11"/>
-          </p:nvPr>
-        </p:nvSpPr>
-        <p:spPr/>
-        <p:txBody>
-          <a:bodyPr/>
-          <a:lstStyle/>
-          <a:p>
-            <a:r>
-              <a:rPr lang="de-DE"/>
-              <a:t>Florian Blessing, Lisa Böhler, Markus Götz, Jan Habersetzer, Wendelin Herrmann</a:t>
-            </a:r>
-          </a:p>
-        </p:txBody>
-      </p:sp>
-      <p:sp>
-        <p:nvSpPr>
-          <p:cNvPr id="6" name="Foliennummernplatzhalter 5"/>
-          <p:cNvSpPr>
-            <a:spLocks noGrp="1"/>
-          </p:cNvSpPr>
-          <p:nvPr>
-            <p:ph type="sldNum" sz="quarter" idx="12"/>
-          </p:nvPr>
-        </p:nvSpPr>
-        <p:spPr/>
-        <p:txBody>
-          <a:bodyPr/>
-          <a:lstStyle/>
-          <a:p>
-            <a:fld id="{9A8D1588-5235-4A3E-9519-E5C37E4E16B7}" type="slidenum">
-              <a:rPr lang="de-DE" smtClean="0"/>
-              <a:t>17</a:t>
-            </a:fld>
-            <a:endParaRPr lang="de-DE"/>
-          </a:p>
-        </p:txBody>
-      </p:sp>
-      <p:sp>
-        <p:nvSpPr>
-          <p:cNvPr id="7" name="Titel 6"/>
-          <p:cNvSpPr>
-            <a:spLocks noGrp="1"/>
-          </p:cNvSpPr>
-          <p:nvPr>
-            <p:ph type="title"/>
-          </p:nvPr>
-        </p:nvSpPr>
-        <p:spPr/>
-        <p:txBody>
-          <a:bodyPr/>
-          <a:lstStyle/>
-          <a:p>
-            <a:r>
-              <a:rPr lang="de-DE" dirty="0"/>
-              <a:t>Schnittstelle</a:t>
-            </a:r>
-            <a:br>
-              <a:rPr lang="de-DE" dirty="0"/>
-            </a:br>
-            <a:r>
-              <a:rPr lang="de-DE" dirty="0"/>
-              <a:t>User</a:t>
-            </a:r>
-          </a:p>
-        </p:txBody>
-      </p:sp>
-    </p:spTree>
-    <p:extLst>
-      <p:ext uri="{BB962C8B-B14F-4D97-AF65-F5344CB8AC3E}">
-        <p14:creationId xmlns:p14="http://schemas.microsoft.com/office/powerpoint/2010/main" val="3541359369"/>
-      </p:ext>
-    </p:extLst>
-  </p:cSld>
-  <p:clrMapOvr>
-    <a:masterClrMapping/>
-  </p:clrMapOvr>
-</p:sld>
-</file>
-
-<file path=ppt/slides/slide18.xml><?xml version="1.0" encoding="utf-8"?>
 <p:sld xmlns:a="http://schemas.openxmlformats.org/drawingml/2006/main" xmlns:r="http://schemas.openxmlformats.org/officeDocument/2006/relationships" xmlns:p="http://schemas.openxmlformats.org/presentationml/2006/main">
   <p:cSld>
     <p:spTree>
@@ -38113,7 +38133,7 @@
           <a:p>
             <a:fld id="{9A8D1588-5235-4A3E-9519-E5C37E4E16B7}" type="slidenum">
               <a:rPr lang="de-DE" smtClean="0"/>
-              <a:t>18</a:t>
+              <a:t>16</a:t>
             </a:fld>
             <a:endParaRPr lang="de-DE"/>
           </a:p>
@@ -38132,7 +38152,7 @@
 </p:sld>
 </file>
 
-<file path=ppt/slides/slide19.xml><?xml version="1.0" encoding="utf-8"?>
+<file path=ppt/slides/slide17.xml><?xml version="1.0" encoding="utf-8"?>
 <p:sld xmlns:a="http://schemas.openxmlformats.org/drawingml/2006/main" xmlns:r="http://schemas.openxmlformats.org/officeDocument/2006/relationships" xmlns:p="http://schemas.openxmlformats.org/presentationml/2006/main">
   <p:cSld>
     <p:spTree>
@@ -38257,7 +38277,7 @@
           <a:p>
             <a:fld id="{9A8D1588-5235-4A3E-9519-E5C37E4E16B7}" type="slidenum">
               <a:rPr lang="de-DE" smtClean="0"/>
-              <a:t>19</a:t>
+              <a:t>17</a:t>
             </a:fld>
             <a:endParaRPr lang="de-DE"/>
           </a:p>
@@ -38276,7 +38296,7 @@
 </p:sld>
 </file>
 
-<file path=ppt/slides/slide2.xml><?xml version="1.0" encoding="utf-8"?>
+<file path=ppt/slides/slide18.xml><?xml version="1.0" encoding="utf-8"?>
 <p:sld xmlns:a="http://schemas.openxmlformats.org/drawingml/2006/main" xmlns:r="http://schemas.openxmlformats.org/officeDocument/2006/relationships" xmlns:p="http://schemas.openxmlformats.org/presentationml/2006/main">
   <p:cSld>
     <p:spTree>
@@ -38310,36 +38330,11 @@
           <a:p>
             <a:r>
               <a:rPr lang="de-DE" dirty="0"/>
-              <a:t>AGENDA</a:t>
+              <a:t>Persona Entwicklung</a:t>
             </a:r>
           </a:p>
         </p:txBody>
       </p:sp>
-      <p:graphicFrame>
-        <p:nvGraphicFramePr>
-          <p:cNvPr id="11" name="Inhaltsplatzhalter 10"/>
-          <p:cNvGraphicFramePr>
-            <a:graphicFrameLocks noGrp="1"/>
-          </p:cNvGraphicFramePr>
-          <p:nvPr>
-            <p:ph idx="1"/>
-            <p:extLst>
-              <p:ext uri="{D42A27DB-BD31-4B8C-83A1-F6EECF244321}">
-                <p14:modId xmlns:p14="http://schemas.microsoft.com/office/powerpoint/2010/main" val="1755907837"/>
-              </p:ext>
-            </p:extLst>
-          </p:nvPr>
-        </p:nvGraphicFramePr>
-        <p:xfrm>
-          <a:off x="838200" y="2651036"/>
-          <a:ext cx="10515600" cy="1555929"/>
-        </p:xfrm>
-        <a:graphic>
-          <a:graphicData uri="http://schemas.openxmlformats.org/drawingml/2006/diagram">
-            <dgm:relIds xmlns:dgm="http://schemas.openxmlformats.org/drawingml/2006/diagram" xmlns:r="http://schemas.openxmlformats.org/officeDocument/2006/relationships" r:dm="rId2" r:lo="rId3" r:qs="rId4" r:cs="rId5"/>
-          </a:graphicData>
-        </a:graphic>
-      </p:graphicFrame>
       <p:sp>
         <p:nvSpPr>
           <p:cNvPr id="4" name="Datumsplatzhalter 3"/>
@@ -38386,125 +38381,6 @@
       </p:sp>
       <p:sp>
         <p:nvSpPr>
-          <p:cNvPr id="8" name="Foliennummernplatzhalter 7"/>
-          <p:cNvSpPr>
-            <a:spLocks noGrp="1"/>
-          </p:cNvSpPr>
-          <p:nvPr>
-            <p:ph type="sldNum" sz="quarter" idx="12"/>
-          </p:nvPr>
-        </p:nvSpPr>
-        <p:spPr/>
-        <p:txBody>
-          <a:bodyPr/>
-          <a:lstStyle/>
-          <a:p>
-            <a:fld id="{9A8D1588-5235-4A3E-9519-E5C37E4E16B7}" type="slidenum">
-              <a:rPr lang="de-DE" smtClean="0"/>
-              <a:t>2</a:t>
-            </a:fld>
-            <a:endParaRPr lang="de-DE"/>
-          </a:p>
-        </p:txBody>
-      </p:sp>
-    </p:spTree>
-    <p:extLst>
-      <p:ext uri="{BB962C8B-B14F-4D97-AF65-F5344CB8AC3E}">
-        <p14:creationId xmlns:p14="http://schemas.microsoft.com/office/powerpoint/2010/main" val="3060933778"/>
-      </p:ext>
-    </p:extLst>
-  </p:cSld>
-  <p:clrMapOvr>
-    <a:masterClrMapping/>
-  </p:clrMapOvr>
-</p:sld>
-</file>
-
-<file path=ppt/slides/slide20.xml><?xml version="1.0" encoding="utf-8"?>
-<p:sld xmlns:a="http://schemas.openxmlformats.org/drawingml/2006/main" xmlns:r="http://schemas.openxmlformats.org/officeDocument/2006/relationships" xmlns:p="http://schemas.openxmlformats.org/presentationml/2006/main">
-  <p:cSld>
-    <p:spTree>
-      <p:nvGrpSpPr>
-        <p:cNvPr id="1" name=""/>
-        <p:cNvGrpSpPr/>
-        <p:nvPr/>
-      </p:nvGrpSpPr>
-      <p:grpSpPr>
-        <a:xfrm>
-          <a:off x="0" y="0"/>
-          <a:ext cx="0" cy="0"/>
-          <a:chOff x="0" y="0"/>
-          <a:chExt cx="0" cy="0"/>
-        </a:xfrm>
-      </p:grpSpPr>
-      <p:sp>
-        <p:nvSpPr>
-          <p:cNvPr id="2" name="Titel 1"/>
-          <p:cNvSpPr>
-            <a:spLocks noGrp="1"/>
-          </p:cNvSpPr>
-          <p:nvPr>
-            <p:ph type="title"/>
-          </p:nvPr>
-        </p:nvSpPr>
-        <p:spPr/>
-        <p:txBody>
-          <a:bodyPr/>
-          <a:lstStyle/>
-          <a:p>
-            <a:r>
-              <a:rPr lang="de-DE" dirty="0"/>
-              <a:t>Persona Entwicklung</a:t>
-            </a:r>
-          </a:p>
-        </p:txBody>
-      </p:sp>
-      <p:sp>
-        <p:nvSpPr>
-          <p:cNvPr id="4" name="Datumsplatzhalter 3"/>
-          <p:cNvSpPr>
-            <a:spLocks noGrp="1"/>
-          </p:cNvSpPr>
-          <p:nvPr>
-            <p:ph type="dt" sz="half" idx="10"/>
-          </p:nvPr>
-        </p:nvSpPr>
-        <p:spPr/>
-        <p:txBody>
-          <a:bodyPr/>
-          <a:lstStyle/>
-          <a:p>
-            <a:r>
-              <a:rPr lang="de-DE"/>
-              <a:t>25.04.2017</a:t>
-            </a:r>
-          </a:p>
-        </p:txBody>
-      </p:sp>
-      <p:sp>
-        <p:nvSpPr>
-          <p:cNvPr id="5" name="Fußzeilenplatzhalter 4"/>
-          <p:cNvSpPr>
-            <a:spLocks noGrp="1"/>
-          </p:cNvSpPr>
-          <p:nvPr>
-            <p:ph type="ftr" sz="quarter" idx="11"/>
-          </p:nvPr>
-        </p:nvSpPr>
-        <p:spPr/>
-        <p:txBody>
-          <a:bodyPr/>
-          <a:lstStyle/>
-          <a:p>
-            <a:r>
-              <a:rPr lang="de-DE"/>
-              <a:t>Florian Blessing, Lisa Böhler, Markus Götz, Jan Habersetzer, Wendelin Herrmann</a:t>
-            </a:r>
-          </a:p>
-        </p:txBody>
-      </p:sp>
-      <p:sp>
-        <p:nvSpPr>
           <p:cNvPr id="6" name="Foliennummernplatzhalter 5"/>
           <p:cNvSpPr>
             <a:spLocks noGrp="1"/>
@@ -38520,7 +38396,7 @@
           <a:p>
             <a:fld id="{9A8D1588-5235-4A3E-9519-E5C37E4E16B7}" type="slidenum">
               <a:rPr lang="de-DE" smtClean="0"/>
-              <a:t>20</a:t>
+              <a:t>18</a:t>
             </a:fld>
             <a:endParaRPr lang="de-DE"/>
           </a:p>
@@ -38649,7 +38525,7 @@
 </p:sld>
 </file>
 
-<file path=ppt/slides/slide21.xml><?xml version="1.0" encoding="utf-8"?>
+<file path=ppt/slides/slide19.xml><?xml version="1.0" encoding="utf-8"?>
 <p:sld xmlns:a="http://schemas.openxmlformats.org/drawingml/2006/main" xmlns:r="http://schemas.openxmlformats.org/officeDocument/2006/relationships" xmlns:p="http://schemas.openxmlformats.org/presentationml/2006/main">
   <p:cSld>
     <p:spTree>
@@ -38690,20 +38566,46 @@
       </p:sp>
       <p:sp>
         <p:nvSpPr>
-          <p:cNvPr id="3" name="Inhaltsplatzhalter 2"/>
+          <p:cNvPr id="7" name="Inhaltsplatzhalter 6"/>
           <p:cNvSpPr>
             <a:spLocks noGrp="1"/>
           </p:cNvSpPr>
           <p:nvPr>
-            <p:ph idx="1"/>
+            <p:ph sz="half" idx="1"/>
           </p:nvPr>
         </p:nvSpPr>
         <p:spPr/>
         <p:txBody>
-          <a:bodyPr/>
+          <a:bodyPr anchor="ctr"/>
           <a:lstStyle/>
           <a:p>
-            <a:endParaRPr lang="de-DE"/>
+            <a:pPr marL="0" indent="0" algn="ctr">
+              <a:buNone/>
+            </a:pPr>
+            <a:r>
+              <a:rPr lang="de-DE" b="1" dirty="0"/>
+              <a:t>WER</a:t>
+            </a:r>
+            <a:r>
+              <a:rPr lang="de-DE" dirty="0"/>
+              <a:t> möchte </a:t>
+            </a:r>
+            <a:r>
+              <a:rPr lang="de-DE" b="1" dirty="0"/>
+              <a:t>WAS</a:t>
+            </a:r>
+            <a:r>
+              <a:rPr lang="de-DE" dirty="0"/>
+              <a:t>, </a:t>
+            </a:r>
+            <a:r>
+              <a:rPr lang="de-DE" b="1" dirty="0"/>
+              <a:t>WOZU</a:t>
+            </a:r>
+            <a:r>
+              <a:rPr lang="de-DE" dirty="0"/>
+              <a:t>?</a:t>
+            </a:r>
           </a:p>
         </p:txBody>
       </p:sp>
@@ -38768,12 +38670,427 @@
           <a:p>
             <a:fld id="{9A8D1588-5235-4A3E-9519-E5C37E4E16B7}" type="slidenum">
               <a:rPr lang="de-DE" smtClean="0"/>
-              <a:t>21</a:t>
+              <a:t>19</a:t>
             </a:fld>
             <a:endParaRPr lang="de-DE"/>
           </a:p>
         </p:txBody>
       </p:sp>
+      <p:grpSp>
+        <p:nvGrpSpPr>
+          <p:cNvPr id="12" name="Gruppieren 11"/>
+          <p:cNvGrpSpPr/>
+          <p:nvPr/>
+        </p:nvGrpSpPr>
+        <p:grpSpPr>
+          <a:xfrm>
+            <a:off x="7138773" y="2658168"/>
+            <a:ext cx="3248454" cy="1541665"/>
+            <a:chOff x="7138773" y="2921294"/>
+            <a:chExt cx="3248454" cy="1541665"/>
+          </a:xfrm>
+        </p:grpSpPr>
+        <p:sp>
+          <p:nvSpPr>
+            <p:cNvPr id="10" name="Freeform 55"/>
+            <p:cNvSpPr>
+              <a:spLocks noChangeAspect="1" noEditPoints="1"/>
+            </p:cNvSpPr>
+            <p:nvPr/>
+          </p:nvSpPr>
+          <p:spPr bwMode="auto">
+            <a:xfrm>
+              <a:off x="8267474" y="2921294"/>
+              <a:ext cx="991052" cy="1080000"/>
+            </a:xfrm>
+            <a:custGeom>
+              <a:avLst/>
+              <a:gdLst>
+                <a:gd name="T0" fmla="*/ 29 w 86"/>
+                <a:gd name="T1" fmla="*/ 32 h 93"/>
+                <a:gd name="T2" fmla="*/ 30 w 86"/>
+                <a:gd name="T3" fmla="*/ 6 h 93"/>
+                <a:gd name="T4" fmla="*/ 55 w 86"/>
+                <a:gd name="T5" fmla="*/ 5 h 93"/>
+                <a:gd name="T6" fmla="*/ 57 w 86"/>
+                <a:gd name="T7" fmla="*/ 32 h 93"/>
+                <a:gd name="T8" fmla="*/ 51 w 86"/>
+                <a:gd name="T9" fmla="*/ 13 h 93"/>
+                <a:gd name="T10" fmla="*/ 32 w 86"/>
+                <a:gd name="T11" fmla="*/ 19 h 93"/>
+                <a:gd name="T12" fmla="*/ 29 w 86"/>
+                <a:gd name="T13" fmla="*/ 32 h 93"/>
+                <a:gd name="T14" fmla="*/ 32 w 86"/>
+                <a:gd name="T15" fmla="*/ 45 h 93"/>
+                <a:gd name="T16" fmla="*/ 18 w 86"/>
+                <a:gd name="T17" fmla="*/ 62 h 93"/>
+                <a:gd name="T18" fmla="*/ 9 w 86"/>
+                <a:gd name="T19" fmla="*/ 65 h 93"/>
+                <a:gd name="T20" fmla="*/ 2 w 86"/>
+                <a:gd name="T21" fmla="*/ 75 h 93"/>
+                <a:gd name="T22" fmla="*/ 0 w 86"/>
+                <a:gd name="T23" fmla="*/ 93 h 93"/>
+                <a:gd name="T24" fmla="*/ 32 w 86"/>
+                <a:gd name="T25" fmla="*/ 93 h 93"/>
+                <a:gd name="T26" fmla="*/ 33 w 86"/>
+                <a:gd name="T27" fmla="*/ 74 h 93"/>
+                <a:gd name="T28" fmla="*/ 37 w 86"/>
+                <a:gd name="T29" fmla="*/ 72 h 93"/>
+                <a:gd name="T30" fmla="*/ 37 w 86"/>
+                <a:gd name="T31" fmla="*/ 93 h 93"/>
+                <a:gd name="T32" fmla="*/ 49 w 86"/>
+                <a:gd name="T33" fmla="*/ 93 h 93"/>
+                <a:gd name="T34" fmla="*/ 51 w 86"/>
+                <a:gd name="T35" fmla="*/ 71 h 93"/>
+                <a:gd name="T36" fmla="*/ 54 w 86"/>
+                <a:gd name="T37" fmla="*/ 74 h 93"/>
+                <a:gd name="T38" fmla="*/ 53 w 86"/>
+                <a:gd name="T39" fmla="*/ 93 h 93"/>
+                <a:gd name="T40" fmla="*/ 86 w 86"/>
+                <a:gd name="T41" fmla="*/ 93 h 93"/>
+                <a:gd name="T42" fmla="*/ 84 w 86"/>
+                <a:gd name="T43" fmla="*/ 75 h 93"/>
+                <a:gd name="T44" fmla="*/ 77 w 86"/>
+                <a:gd name="T45" fmla="*/ 65 h 93"/>
+                <a:gd name="T46" fmla="*/ 69 w 86"/>
+                <a:gd name="T47" fmla="*/ 62 h 93"/>
+                <a:gd name="T48" fmla="*/ 54 w 86"/>
+                <a:gd name="T49" fmla="*/ 45 h 93"/>
+                <a:gd name="T50" fmla="*/ 54 w 86"/>
+                <a:gd name="T51" fmla="*/ 56 h 93"/>
+                <a:gd name="T52" fmla="*/ 63 w 86"/>
+                <a:gd name="T53" fmla="*/ 54 h 93"/>
+                <a:gd name="T54" fmla="*/ 43 w 86"/>
+                <a:gd name="T55" fmla="*/ 75 h 93"/>
+                <a:gd name="T56" fmla="*/ 23 w 86"/>
+                <a:gd name="T57" fmla="*/ 53 h 93"/>
+                <a:gd name="T58" fmla="*/ 32 w 86"/>
+                <a:gd name="T59" fmla="*/ 55 h 93"/>
+                <a:gd name="T60" fmla="*/ 32 w 86"/>
+                <a:gd name="T61" fmla="*/ 45 h 93"/>
+              </a:gdLst>
+              <a:ahLst/>
+              <a:cxnLst>
+                <a:cxn ang="0">
+                  <a:pos x="T0" y="T1"/>
+                </a:cxn>
+                <a:cxn ang="0">
+                  <a:pos x="T2" y="T3"/>
+                </a:cxn>
+                <a:cxn ang="0">
+                  <a:pos x="T4" y="T5"/>
+                </a:cxn>
+                <a:cxn ang="0">
+                  <a:pos x="T6" y="T7"/>
+                </a:cxn>
+                <a:cxn ang="0">
+                  <a:pos x="T8" y="T9"/>
+                </a:cxn>
+                <a:cxn ang="0">
+                  <a:pos x="T10" y="T11"/>
+                </a:cxn>
+                <a:cxn ang="0">
+                  <a:pos x="T12" y="T13"/>
+                </a:cxn>
+                <a:cxn ang="0">
+                  <a:pos x="T14" y="T15"/>
+                </a:cxn>
+                <a:cxn ang="0">
+                  <a:pos x="T16" y="T17"/>
+                </a:cxn>
+                <a:cxn ang="0">
+                  <a:pos x="T18" y="T19"/>
+                </a:cxn>
+                <a:cxn ang="0">
+                  <a:pos x="T20" y="T21"/>
+                </a:cxn>
+                <a:cxn ang="0">
+                  <a:pos x="T22" y="T23"/>
+                </a:cxn>
+                <a:cxn ang="0">
+                  <a:pos x="T24" y="T25"/>
+                </a:cxn>
+                <a:cxn ang="0">
+                  <a:pos x="T26" y="T27"/>
+                </a:cxn>
+                <a:cxn ang="0">
+                  <a:pos x="T28" y="T29"/>
+                </a:cxn>
+                <a:cxn ang="0">
+                  <a:pos x="T30" y="T31"/>
+                </a:cxn>
+                <a:cxn ang="0">
+                  <a:pos x="T32" y="T33"/>
+                </a:cxn>
+                <a:cxn ang="0">
+                  <a:pos x="T34" y="T35"/>
+                </a:cxn>
+                <a:cxn ang="0">
+                  <a:pos x="T36" y="T37"/>
+                </a:cxn>
+                <a:cxn ang="0">
+                  <a:pos x="T38" y="T39"/>
+                </a:cxn>
+                <a:cxn ang="0">
+                  <a:pos x="T40" y="T41"/>
+                </a:cxn>
+                <a:cxn ang="0">
+                  <a:pos x="T42" y="T43"/>
+                </a:cxn>
+                <a:cxn ang="0">
+                  <a:pos x="T44" y="T45"/>
+                </a:cxn>
+                <a:cxn ang="0">
+                  <a:pos x="T46" y="T47"/>
+                </a:cxn>
+                <a:cxn ang="0">
+                  <a:pos x="T48" y="T49"/>
+                </a:cxn>
+                <a:cxn ang="0">
+                  <a:pos x="T50" y="T51"/>
+                </a:cxn>
+                <a:cxn ang="0">
+                  <a:pos x="T52" y="T53"/>
+                </a:cxn>
+                <a:cxn ang="0">
+                  <a:pos x="T54" y="T55"/>
+                </a:cxn>
+                <a:cxn ang="0">
+                  <a:pos x="T56" y="T57"/>
+                </a:cxn>
+                <a:cxn ang="0">
+                  <a:pos x="T58" y="T59"/>
+                </a:cxn>
+                <a:cxn ang="0">
+                  <a:pos x="T60" y="T61"/>
+                </a:cxn>
+              </a:cxnLst>
+              <a:rect l="0" t="0" r="r" b="b"/>
+              <a:pathLst>
+                <a:path w="86" h="93">
+                  <a:moveTo>
+                    <a:pt x="29" y="32"/>
+                  </a:moveTo>
+                  <a:cubicBezTo>
+                    <a:pt x="23" y="28"/>
+                    <a:pt x="23" y="10"/>
+                    <a:pt x="30" y="6"/>
+                  </a:cubicBezTo>
+                  <a:cubicBezTo>
+                    <a:pt x="37" y="0"/>
+                    <a:pt x="47" y="0"/>
+                    <a:pt x="55" y="5"/>
+                  </a:cubicBezTo>
+                  <a:cubicBezTo>
+                    <a:pt x="63" y="9"/>
+                    <a:pt x="61" y="30"/>
+                    <a:pt x="57" y="32"/>
+                  </a:cubicBezTo>
+                  <a:cubicBezTo>
+                    <a:pt x="57" y="22"/>
+                    <a:pt x="53" y="19"/>
+                    <a:pt x="51" y="13"/>
+                  </a:cubicBezTo>
+                  <a:cubicBezTo>
+                    <a:pt x="44" y="22"/>
+                    <a:pt x="34" y="20"/>
+                    <a:pt x="32" y="19"/>
+                  </a:cubicBezTo>
+                  <a:cubicBezTo>
+                    <a:pt x="30" y="23"/>
+                    <a:pt x="30" y="27"/>
+                    <a:pt x="29" y="32"/>
+                  </a:cubicBezTo>
+                  <a:close/>
+                  <a:moveTo>
+                    <a:pt x="32" y="45"/>
+                  </a:moveTo>
+                  <a:cubicBezTo>
+                    <a:pt x="32" y="45"/>
+                    <a:pt x="13" y="58"/>
+                    <a:pt x="18" y="62"/>
+                  </a:cubicBezTo>
+                  <a:cubicBezTo>
+                    <a:pt x="9" y="65"/>
+                    <a:pt x="9" y="65"/>
+                    <a:pt x="9" y="65"/>
+                  </a:cubicBezTo>
+                  <a:cubicBezTo>
+                    <a:pt x="5" y="67"/>
+                    <a:pt x="3" y="70"/>
+                    <a:pt x="2" y="75"/>
+                  </a:cubicBezTo>
+                  <a:cubicBezTo>
+                    <a:pt x="0" y="93"/>
+                    <a:pt x="0" y="93"/>
+                    <a:pt x="0" y="93"/>
+                  </a:cubicBezTo>
+                  <a:cubicBezTo>
+                    <a:pt x="32" y="93"/>
+                    <a:pt x="32" y="93"/>
+                    <a:pt x="32" y="93"/>
+                  </a:cubicBezTo>
+                  <a:cubicBezTo>
+                    <a:pt x="33" y="89"/>
+                    <a:pt x="35" y="78"/>
+                    <a:pt x="33" y="74"/>
+                  </a:cubicBezTo>
+                  <a:cubicBezTo>
+                    <a:pt x="32" y="72"/>
+                    <a:pt x="36" y="70"/>
+                    <a:pt x="37" y="72"/>
+                  </a:cubicBezTo>
+                  <a:cubicBezTo>
+                    <a:pt x="39" y="77"/>
+                    <a:pt x="38" y="88"/>
+                    <a:pt x="37" y="93"/>
+                  </a:cubicBezTo>
+                  <a:cubicBezTo>
+                    <a:pt x="49" y="93"/>
+                    <a:pt x="49" y="93"/>
+                    <a:pt x="49" y="93"/>
+                  </a:cubicBezTo>
+                  <a:cubicBezTo>
+                    <a:pt x="48" y="85"/>
+                    <a:pt x="48" y="75"/>
+                    <a:pt x="51" y="71"/>
+                  </a:cubicBezTo>
+                  <a:cubicBezTo>
+                    <a:pt x="53" y="69"/>
+                    <a:pt x="56" y="72"/>
+                    <a:pt x="54" y="74"/>
+                  </a:cubicBezTo>
+                  <a:cubicBezTo>
+                    <a:pt x="52" y="77"/>
+                    <a:pt x="53" y="89"/>
+                    <a:pt x="53" y="93"/>
+                  </a:cubicBezTo>
+                  <a:cubicBezTo>
+                    <a:pt x="86" y="93"/>
+                    <a:pt x="86" y="93"/>
+                    <a:pt x="86" y="93"/>
+                  </a:cubicBezTo>
+                  <a:cubicBezTo>
+                    <a:pt x="84" y="75"/>
+                    <a:pt x="84" y="75"/>
+                    <a:pt x="84" y="75"/>
+                  </a:cubicBezTo>
+                  <a:cubicBezTo>
+                    <a:pt x="84" y="70"/>
+                    <a:pt x="82" y="67"/>
+                    <a:pt x="77" y="65"/>
+                  </a:cubicBezTo>
+                  <a:cubicBezTo>
+                    <a:pt x="69" y="62"/>
+                    <a:pt x="69" y="62"/>
+                    <a:pt x="69" y="62"/>
+                  </a:cubicBezTo>
+                  <a:cubicBezTo>
+                    <a:pt x="71" y="59"/>
+                    <a:pt x="71" y="45"/>
+                    <a:pt x="54" y="45"/>
+                  </a:cubicBezTo>
+                  <a:cubicBezTo>
+                    <a:pt x="54" y="56"/>
+                    <a:pt x="54" y="56"/>
+                    <a:pt x="54" y="56"/>
+                  </a:cubicBezTo>
+                  <a:cubicBezTo>
+                    <a:pt x="58" y="54"/>
+                    <a:pt x="61" y="52"/>
+                    <a:pt x="63" y="54"/>
+                  </a:cubicBezTo>
+                  <a:cubicBezTo>
+                    <a:pt x="60" y="57"/>
+                    <a:pt x="44" y="70"/>
+                    <a:pt x="43" y="75"/>
+                  </a:cubicBezTo>
+                  <a:cubicBezTo>
+                    <a:pt x="42" y="68"/>
+                    <a:pt x="29" y="59"/>
+                    <a:pt x="23" y="53"/>
+                  </a:cubicBezTo>
+                  <a:cubicBezTo>
+                    <a:pt x="26" y="51"/>
+                    <a:pt x="28" y="53"/>
+                    <a:pt x="32" y="55"/>
+                  </a:cubicBezTo>
+                  <a:cubicBezTo>
+                    <a:pt x="32" y="45"/>
+                    <a:pt x="32" y="45"/>
+                    <a:pt x="32" y="45"/>
+                  </a:cubicBezTo>
+                  <a:close/>
+                </a:path>
+              </a:pathLst>
+            </a:custGeom>
+            <a:solidFill>
+              <a:srgbClr val="9A2120"/>
+            </a:solidFill>
+            <a:ln>
+              <a:noFill/>
+            </a:ln>
+            <a:extLst>
+              <a:ext uri="{91240B29-F687-4F45-9708-019B960494DF}">
+                <a14:hiddenLine xmlns:a14="http://schemas.microsoft.com/office/drawing/2010/main" w="9525">
+                  <a:solidFill>
+                    <a:srgbClr val="000000"/>
+                  </a:solidFill>
+                  <a:round/>
+                  <a:headEnd/>
+                  <a:tailEnd/>
+                </a14:hiddenLine>
+              </a:ext>
+            </a:extLst>
+          </p:spPr>
+          <p:txBody>
+            <a:bodyPr vert="horz" wrap="square" lIns="91440" tIns="45720" rIns="91440" bIns="45720" numCol="1" anchor="t" anchorCtr="0" compatLnSpc="1">
+              <a:prstTxWarp prst="textNoShape">
+                <a:avLst/>
+              </a:prstTxWarp>
+            </a:bodyPr>
+            <a:lstStyle/>
+            <a:p>
+              <a:endParaRPr lang="de-DE"/>
+            </a:p>
+          </p:txBody>
+        </p:sp>
+        <p:sp>
+          <p:nvSpPr>
+            <p:cNvPr id="11" name="Textfeld 10"/>
+            <p:cNvSpPr txBox="1"/>
+            <p:nvPr/>
+          </p:nvSpPr>
+          <p:spPr>
+            <a:xfrm>
+              <a:off x="7138773" y="4001294"/>
+              <a:ext cx="3248454" cy="461665"/>
+            </a:xfrm>
+            <a:prstGeom prst="rect">
+              <a:avLst/>
+            </a:prstGeom>
+            <a:noFill/>
+          </p:spPr>
+          <p:txBody>
+            <a:bodyPr wrap="none" rtlCol="0">
+              <a:spAutoFit/>
+            </a:bodyPr>
+            <a:lstStyle/>
+            <a:p>
+              <a:pPr algn="ctr"/>
+              <a:r>
+                <a:rPr lang="de-DE" sz="2400" dirty="0"/>
+                <a:t>System- &amp; </a:t>
+              </a:r>
+              <a:r>
+                <a:rPr lang="de-DE" sz="2400" dirty="0" err="1"/>
+                <a:t>Sessionnutzer</a:t>
+              </a:r>
+              <a:endParaRPr lang="de-DE" sz="2400" dirty="0"/>
+            </a:p>
+          </p:txBody>
+        </p:sp>
+      </p:grpSp>
     </p:spTree>
     <p:extLst>
       <p:ext uri="{BB962C8B-B14F-4D97-AF65-F5344CB8AC3E}">
@@ -38787,7 +39104,151 @@
 </p:sld>
 </file>
 
-<file path=ppt/slides/slide22.xml><?xml version="1.0" encoding="utf-8"?>
+<file path=ppt/slides/slide2.xml><?xml version="1.0" encoding="utf-8"?>
+<p:sld xmlns:a="http://schemas.openxmlformats.org/drawingml/2006/main" xmlns:r="http://schemas.openxmlformats.org/officeDocument/2006/relationships" xmlns:p="http://schemas.openxmlformats.org/presentationml/2006/main">
+  <p:cSld>
+    <p:spTree>
+      <p:nvGrpSpPr>
+        <p:cNvPr id="1" name=""/>
+        <p:cNvGrpSpPr/>
+        <p:nvPr/>
+      </p:nvGrpSpPr>
+      <p:grpSpPr>
+        <a:xfrm>
+          <a:off x="0" y="0"/>
+          <a:ext cx="0" cy="0"/>
+          <a:chOff x="0" y="0"/>
+          <a:chExt cx="0" cy="0"/>
+        </a:xfrm>
+      </p:grpSpPr>
+      <p:sp>
+        <p:nvSpPr>
+          <p:cNvPr id="2" name="Titel 1"/>
+          <p:cNvSpPr>
+            <a:spLocks noGrp="1"/>
+          </p:cNvSpPr>
+          <p:nvPr>
+            <p:ph type="title"/>
+          </p:nvPr>
+        </p:nvSpPr>
+        <p:spPr/>
+        <p:txBody>
+          <a:bodyPr/>
+          <a:lstStyle/>
+          <a:p>
+            <a:r>
+              <a:rPr lang="de-DE" dirty="0"/>
+              <a:t>AGENDA</a:t>
+            </a:r>
+          </a:p>
+        </p:txBody>
+      </p:sp>
+      <p:graphicFrame>
+        <p:nvGraphicFramePr>
+          <p:cNvPr id="11" name="Inhaltsplatzhalter 10"/>
+          <p:cNvGraphicFramePr>
+            <a:graphicFrameLocks noGrp="1"/>
+          </p:cNvGraphicFramePr>
+          <p:nvPr>
+            <p:ph idx="1"/>
+            <p:extLst>
+              <p:ext uri="{D42A27DB-BD31-4B8C-83A1-F6EECF244321}">
+                <p14:modId xmlns:p14="http://schemas.microsoft.com/office/powerpoint/2010/main" val="1755907837"/>
+              </p:ext>
+            </p:extLst>
+          </p:nvPr>
+        </p:nvGraphicFramePr>
+        <p:xfrm>
+          <a:off x="838200" y="2651036"/>
+          <a:ext cx="10515600" cy="1555929"/>
+        </p:xfrm>
+        <a:graphic>
+          <a:graphicData uri="http://schemas.openxmlformats.org/drawingml/2006/diagram">
+            <dgm:relIds xmlns:dgm="http://schemas.openxmlformats.org/drawingml/2006/diagram" xmlns:r="http://schemas.openxmlformats.org/officeDocument/2006/relationships" r:dm="rId2" r:lo="rId3" r:qs="rId4" r:cs="rId5"/>
+          </a:graphicData>
+        </a:graphic>
+      </p:graphicFrame>
+      <p:sp>
+        <p:nvSpPr>
+          <p:cNvPr id="4" name="Datumsplatzhalter 3"/>
+          <p:cNvSpPr>
+            <a:spLocks noGrp="1"/>
+          </p:cNvSpPr>
+          <p:nvPr>
+            <p:ph type="dt" sz="half" idx="10"/>
+          </p:nvPr>
+        </p:nvSpPr>
+        <p:spPr/>
+        <p:txBody>
+          <a:bodyPr/>
+          <a:lstStyle/>
+          <a:p>
+            <a:r>
+              <a:rPr lang="de-DE"/>
+              <a:t>25.04.2017</a:t>
+            </a:r>
+          </a:p>
+        </p:txBody>
+      </p:sp>
+      <p:sp>
+        <p:nvSpPr>
+          <p:cNvPr id="5" name="Fußzeilenplatzhalter 4"/>
+          <p:cNvSpPr>
+            <a:spLocks noGrp="1"/>
+          </p:cNvSpPr>
+          <p:nvPr>
+            <p:ph type="ftr" sz="quarter" idx="11"/>
+          </p:nvPr>
+        </p:nvSpPr>
+        <p:spPr/>
+        <p:txBody>
+          <a:bodyPr/>
+          <a:lstStyle/>
+          <a:p>
+            <a:r>
+              <a:rPr lang="de-DE"/>
+              <a:t>Florian Blessing, Lisa Böhler, Markus Götz, Jan Habersetzer, Wendelin Herrmann</a:t>
+            </a:r>
+          </a:p>
+        </p:txBody>
+      </p:sp>
+      <p:sp>
+        <p:nvSpPr>
+          <p:cNvPr id="8" name="Foliennummernplatzhalter 7"/>
+          <p:cNvSpPr>
+            <a:spLocks noGrp="1"/>
+          </p:cNvSpPr>
+          <p:nvPr>
+            <p:ph type="sldNum" sz="quarter" idx="12"/>
+          </p:nvPr>
+        </p:nvSpPr>
+        <p:spPr/>
+        <p:txBody>
+          <a:bodyPr/>
+          <a:lstStyle/>
+          <a:p>
+            <a:fld id="{9A8D1588-5235-4A3E-9519-E5C37E4E16B7}" type="slidenum">
+              <a:rPr lang="de-DE" smtClean="0"/>
+              <a:t>2</a:t>
+            </a:fld>
+            <a:endParaRPr lang="de-DE"/>
+          </a:p>
+        </p:txBody>
+      </p:sp>
+    </p:spTree>
+    <p:extLst>
+      <p:ext uri="{BB962C8B-B14F-4D97-AF65-F5344CB8AC3E}">
+        <p14:creationId xmlns:p14="http://schemas.microsoft.com/office/powerpoint/2010/main" val="3060933778"/>
+      </p:ext>
+    </p:extLst>
+  </p:cSld>
+  <p:clrMapOvr>
+    <a:masterClrMapping/>
+  </p:clrMapOvr>
+</p:sld>
+</file>
+
+<file path=ppt/slides/slide20.xml><?xml version="1.0" encoding="utf-8"?>
 <p:sld xmlns:a="http://schemas.openxmlformats.org/drawingml/2006/main" xmlns:r="http://schemas.openxmlformats.org/officeDocument/2006/relationships" xmlns:p="http://schemas.openxmlformats.org/presentationml/2006/main">
   <p:cSld>
     <p:spTree>
@@ -38916,7 +39377,7 @@
           <a:p>
             <a:fld id="{9A8D1588-5235-4A3E-9519-E5C37E4E16B7}" type="slidenum">
               <a:rPr lang="de-DE" smtClean="0"/>
-              <a:t>22</a:t>
+              <a:t>20</a:t>
             </a:fld>
             <a:endParaRPr lang="de-DE"/>
           </a:p>
@@ -38935,7 +39396,7 @@
 </p:sld>
 </file>
 
-<file path=ppt/slides/slide23.xml><?xml version="1.0" encoding="utf-8"?>
+<file path=ppt/slides/slide21.xml><?xml version="1.0" encoding="utf-8"?>
 <p:sld xmlns:a="http://schemas.openxmlformats.org/drawingml/2006/main" xmlns:r="http://schemas.openxmlformats.org/officeDocument/2006/relationships" xmlns:p="http://schemas.openxmlformats.org/presentationml/2006/main">
   <p:cSld>
     <p:spTree>
@@ -39064,7 +39525,7 @@
           <a:p>
             <a:fld id="{9A8D1588-5235-4A3E-9519-E5C37E4E16B7}" type="slidenum">
               <a:rPr lang="de-DE" smtClean="0"/>
-              <a:t>23</a:t>
+              <a:t>21</a:t>
             </a:fld>
             <a:endParaRPr lang="de-DE"/>
           </a:p>
@@ -39083,7 +39544,7 @@
 </p:sld>
 </file>
 
-<file path=ppt/slides/slide24.xml><?xml version="1.0" encoding="utf-8"?>
+<file path=ppt/slides/slide22.xml><?xml version="1.0" encoding="utf-8"?>
 <p:sld xmlns:a="http://schemas.openxmlformats.org/drawingml/2006/main" xmlns:r="http://schemas.openxmlformats.org/officeDocument/2006/relationships" xmlns:p="http://schemas.openxmlformats.org/presentationml/2006/main">
   <p:cSld>
     <p:spTree>
@@ -39212,7 +39673,7 @@
           <a:p>
             <a:fld id="{9A8D1588-5235-4A3E-9519-E5C37E4E16B7}" type="slidenum">
               <a:rPr lang="de-DE" smtClean="0"/>
-              <a:t>24</a:t>
+              <a:t>22</a:t>
             </a:fld>
             <a:endParaRPr lang="de-DE"/>
           </a:p>
@@ -39231,7 +39692,7 @@
 </p:sld>
 </file>
 
-<file path=ppt/slides/slide25.xml><?xml version="1.0" encoding="utf-8"?>
+<file path=ppt/slides/slide23.xml><?xml version="1.0" encoding="utf-8"?>
 <p:sld xmlns:a="http://schemas.openxmlformats.org/drawingml/2006/main" xmlns:r="http://schemas.openxmlformats.org/officeDocument/2006/relationships" xmlns:p="http://schemas.openxmlformats.org/presentationml/2006/main">
   <p:cSld>
     <p:spTree>
@@ -39360,7 +39821,7 @@
           <a:p>
             <a:fld id="{9A8D1588-5235-4A3E-9519-E5C37E4E16B7}" type="slidenum">
               <a:rPr lang="de-DE" smtClean="0"/>
-              <a:t>25</a:t>
+              <a:t>23</a:t>
             </a:fld>
             <a:endParaRPr lang="de-DE"/>
           </a:p>
@@ -39379,7 +39840,7 @@
 </p:sld>
 </file>
 
-<file path=ppt/slides/slide26.xml><?xml version="1.0" encoding="utf-8"?>
+<file path=ppt/slides/slide24.xml><?xml version="1.0" encoding="utf-8"?>
 <p:sld xmlns:a="http://schemas.openxmlformats.org/drawingml/2006/main" xmlns:r="http://schemas.openxmlformats.org/officeDocument/2006/relationships" xmlns:p="http://schemas.openxmlformats.org/presentationml/2006/main">
   <p:cSld>
     <p:spTree>
@@ -39498,7 +39959,7 @@
           <a:p>
             <a:fld id="{9A8D1588-5235-4A3E-9519-E5C37E4E16B7}" type="slidenum">
               <a:rPr lang="de-DE" smtClean="0"/>
-              <a:t>26</a:t>
+              <a:t>24</a:t>
             </a:fld>
             <a:endParaRPr lang="de-DE"/>
           </a:p>
@@ -39517,7 +39978,7 @@
 </p:sld>
 </file>
 
-<file path=ppt/slides/slide27.xml><?xml version="1.0" encoding="utf-8"?>
+<file path=ppt/slides/slide25.xml><?xml version="1.0" encoding="utf-8"?>
 <p:sld xmlns:a="http://schemas.openxmlformats.org/drawingml/2006/main" xmlns:r="http://schemas.openxmlformats.org/officeDocument/2006/relationships" xmlns:p="http://schemas.openxmlformats.org/presentationml/2006/main">
   <p:cSld>
     <p:spTree>
@@ -39558,20 +40019,35 @@
       </p:sp>
       <p:sp>
         <p:nvSpPr>
-          <p:cNvPr id="3" name="Inhaltsplatzhalter 2"/>
+          <p:cNvPr id="7" name="Inhaltsplatzhalter 6"/>
           <p:cNvSpPr>
             <a:spLocks noGrp="1"/>
           </p:cNvSpPr>
           <p:nvPr>
-            <p:ph idx="1"/>
+            <p:ph sz="half" idx="1"/>
           </p:nvPr>
         </p:nvSpPr>
         <p:spPr/>
         <p:txBody>
-          <a:bodyPr/>
+          <a:bodyPr anchor="ctr"/>
           <a:lstStyle/>
           <a:p>
-            <a:endParaRPr lang="de-DE"/>
+            <a:r>
+              <a:rPr lang="de-DE" dirty="0"/>
+              <a:t>Implementierung des Systementwurfs</a:t>
+            </a:r>
+          </a:p>
+          <a:p>
+            <a:endParaRPr lang="de-DE" dirty="0"/>
+          </a:p>
+          <a:p>
+            <a:r>
+              <a:rPr lang="de-DE" dirty="0"/>
+              <a:t>Fortführung der UX Entwicklung</a:t>
+            </a:r>
+          </a:p>
+          <a:p>
+            <a:endParaRPr lang="de-DE" dirty="0"/>
           </a:p>
         </p:txBody>
       </p:sp>
@@ -39636,9 +40112,423 @@
           <a:p>
             <a:fld id="{9A8D1588-5235-4A3E-9519-E5C37E4E16B7}" type="slidenum">
               <a:rPr lang="de-DE" smtClean="0"/>
-              <a:t>27</a:t>
+              <a:t>25</a:t>
             </a:fld>
             <a:endParaRPr lang="de-DE"/>
+          </a:p>
+        </p:txBody>
+      </p:sp>
+      <p:sp>
+        <p:nvSpPr>
+          <p:cNvPr id="9" name="Freeform 50"/>
+          <p:cNvSpPr>
+            <a:spLocks noChangeAspect="1" noEditPoints="1"/>
+          </p:cNvSpPr>
+          <p:nvPr/>
+        </p:nvSpPr>
+        <p:spPr bwMode="auto">
+          <a:xfrm>
+            <a:off x="7844958" y="3184257"/>
+            <a:ext cx="2464736" cy="1260000"/>
+          </a:xfrm>
+          <a:custGeom>
+            <a:avLst/>
+            <a:gdLst>
+              <a:gd name="T0" fmla="*/ 19 w 123"/>
+              <a:gd name="T1" fmla="*/ 28 h 63"/>
+              <a:gd name="T2" fmla="*/ 19 w 123"/>
+              <a:gd name="T3" fmla="*/ 27 h 63"/>
+              <a:gd name="T4" fmla="*/ 19 w 123"/>
+              <a:gd name="T5" fmla="*/ 8 h 63"/>
+              <a:gd name="T6" fmla="*/ 19 w 123"/>
+              <a:gd name="T7" fmla="*/ 7 h 63"/>
+              <a:gd name="T8" fmla="*/ 20 w 123"/>
+              <a:gd name="T9" fmla="*/ 7 h 63"/>
+              <a:gd name="T10" fmla="*/ 46 w 123"/>
+              <a:gd name="T11" fmla="*/ 15 h 63"/>
+              <a:gd name="T12" fmla="*/ 47 w 123"/>
+              <a:gd name="T13" fmla="*/ 17 h 63"/>
+              <a:gd name="T14" fmla="*/ 46 w 123"/>
+              <a:gd name="T15" fmla="*/ 18 h 63"/>
+              <a:gd name="T16" fmla="*/ 21 w 123"/>
+              <a:gd name="T17" fmla="*/ 29 h 63"/>
+              <a:gd name="T18" fmla="*/ 20 w 123"/>
+              <a:gd name="T19" fmla="*/ 29 h 63"/>
+              <a:gd name="T20" fmla="*/ 19 w 123"/>
+              <a:gd name="T21" fmla="*/ 28 h 63"/>
+              <a:gd name="T22" fmla="*/ 111 w 123"/>
+              <a:gd name="T23" fmla="*/ 38 h 63"/>
+              <a:gd name="T24" fmla="*/ 100 w 123"/>
+              <a:gd name="T25" fmla="*/ 46 h 63"/>
+              <a:gd name="T26" fmla="*/ 73 w 123"/>
+              <a:gd name="T27" fmla="*/ 46 h 63"/>
+              <a:gd name="T28" fmla="*/ 62 w 123"/>
+              <a:gd name="T29" fmla="*/ 38 h 63"/>
+              <a:gd name="T30" fmla="*/ 51 w 123"/>
+              <a:gd name="T31" fmla="*/ 46 h 63"/>
+              <a:gd name="T32" fmla="*/ 24 w 123"/>
+              <a:gd name="T33" fmla="*/ 46 h 63"/>
+              <a:gd name="T34" fmla="*/ 15 w 123"/>
+              <a:gd name="T35" fmla="*/ 39 h 63"/>
+              <a:gd name="T36" fmla="*/ 15 w 123"/>
+              <a:gd name="T37" fmla="*/ 7 h 63"/>
+              <a:gd name="T38" fmla="*/ 15 w 123"/>
+              <a:gd name="T39" fmla="*/ 6 h 63"/>
+              <a:gd name="T40" fmla="*/ 17 w 123"/>
+              <a:gd name="T41" fmla="*/ 3 h 63"/>
+              <a:gd name="T42" fmla="*/ 14 w 123"/>
+              <a:gd name="T43" fmla="*/ 0 h 63"/>
+              <a:gd name="T44" fmla="*/ 13 w 123"/>
+              <a:gd name="T45" fmla="*/ 0 h 63"/>
+              <a:gd name="T46" fmla="*/ 9 w 123"/>
+              <a:gd name="T47" fmla="*/ 3 h 63"/>
+              <a:gd name="T48" fmla="*/ 11 w 123"/>
+              <a:gd name="T49" fmla="*/ 6 h 63"/>
+              <a:gd name="T50" fmla="*/ 11 w 123"/>
+              <a:gd name="T51" fmla="*/ 7 h 63"/>
+              <a:gd name="T52" fmla="*/ 11 w 123"/>
+              <a:gd name="T53" fmla="*/ 39 h 63"/>
+              <a:gd name="T54" fmla="*/ 0 w 123"/>
+              <a:gd name="T55" fmla="*/ 51 h 63"/>
+              <a:gd name="T56" fmla="*/ 12 w 123"/>
+              <a:gd name="T57" fmla="*/ 63 h 63"/>
+              <a:gd name="T58" fmla="*/ 24 w 123"/>
+              <a:gd name="T59" fmla="*/ 55 h 63"/>
+              <a:gd name="T60" fmla="*/ 51 w 123"/>
+              <a:gd name="T61" fmla="*/ 55 h 63"/>
+              <a:gd name="T62" fmla="*/ 62 w 123"/>
+              <a:gd name="T63" fmla="*/ 63 h 63"/>
+              <a:gd name="T64" fmla="*/ 73 w 123"/>
+              <a:gd name="T65" fmla="*/ 55 h 63"/>
+              <a:gd name="T66" fmla="*/ 100 w 123"/>
+              <a:gd name="T67" fmla="*/ 55 h 63"/>
+              <a:gd name="T68" fmla="*/ 111 w 123"/>
+              <a:gd name="T69" fmla="*/ 63 h 63"/>
+              <a:gd name="T70" fmla="*/ 123 w 123"/>
+              <a:gd name="T71" fmla="*/ 51 h 63"/>
+              <a:gd name="T72" fmla="*/ 111 w 123"/>
+              <a:gd name="T73" fmla="*/ 38 h 63"/>
+            </a:gdLst>
+            <a:ahLst/>
+            <a:cxnLst>
+              <a:cxn ang="0">
+                <a:pos x="T0" y="T1"/>
+              </a:cxn>
+              <a:cxn ang="0">
+                <a:pos x="T2" y="T3"/>
+              </a:cxn>
+              <a:cxn ang="0">
+                <a:pos x="T4" y="T5"/>
+              </a:cxn>
+              <a:cxn ang="0">
+                <a:pos x="T6" y="T7"/>
+              </a:cxn>
+              <a:cxn ang="0">
+                <a:pos x="T8" y="T9"/>
+              </a:cxn>
+              <a:cxn ang="0">
+                <a:pos x="T10" y="T11"/>
+              </a:cxn>
+              <a:cxn ang="0">
+                <a:pos x="T12" y="T13"/>
+              </a:cxn>
+              <a:cxn ang="0">
+                <a:pos x="T14" y="T15"/>
+              </a:cxn>
+              <a:cxn ang="0">
+                <a:pos x="T16" y="T17"/>
+              </a:cxn>
+              <a:cxn ang="0">
+                <a:pos x="T18" y="T19"/>
+              </a:cxn>
+              <a:cxn ang="0">
+                <a:pos x="T20" y="T21"/>
+              </a:cxn>
+              <a:cxn ang="0">
+                <a:pos x="T22" y="T23"/>
+              </a:cxn>
+              <a:cxn ang="0">
+                <a:pos x="T24" y="T25"/>
+              </a:cxn>
+              <a:cxn ang="0">
+                <a:pos x="T26" y="T27"/>
+              </a:cxn>
+              <a:cxn ang="0">
+                <a:pos x="T28" y="T29"/>
+              </a:cxn>
+              <a:cxn ang="0">
+                <a:pos x="T30" y="T31"/>
+              </a:cxn>
+              <a:cxn ang="0">
+                <a:pos x="T32" y="T33"/>
+              </a:cxn>
+              <a:cxn ang="0">
+                <a:pos x="T34" y="T35"/>
+              </a:cxn>
+              <a:cxn ang="0">
+                <a:pos x="T36" y="T37"/>
+              </a:cxn>
+              <a:cxn ang="0">
+                <a:pos x="T38" y="T39"/>
+              </a:cxn>
+              <a:cxn ang="0">
+                <a:pos x="T40" y="T41"/>
+              </a:cxn>
+              <a:cxn ang="0">
+                <a:pos x="T42" y="T43"/>
+              </a:cxn>
+              <a:cxn ang="0">
+                <a:pos x="T44" y="T45"/>
+              </a:cxn>
+              <a:cxn ang="0">
+                <a:pos x="T46" y="T47"/>
+              </a:cxn>
+              <a:cxn ang="0">
+                <a:pos x="T48" y="T49"/>
+              </a:cxn>
+              <a:cxn ang="0">
+                <a:pos x="T50" y="T51"/>
+              </a:cxn>
+              <a:cxn ang="0">
+                <a:pos x="T52" y="T53"/>
+              </a:cxn>
+              <a:cxn ang="0">
+                <a:pos x="T54" y="T55"/>
+              </a:cxn>
+              <a:cxn ang="0">
+                <a:pos x="T56" y="T57"/>
+              </a:cxn>
+              <a:cxn ang="0">
+                <a:pos x="T58" y="T59"/>
+              </a:cxn>
+              <a:cxn ang="0">
+                <a:pos x="T60" y="T61"/>
+              </a:cxn>
+              <a:cxn ang="0">
+                <a:pos x="T62" y="T63"/>
+              </a:cxn>
+              <a:cxn ang="0">
+                <a:pos x="T64" y="T65"/>
+              </a:cxn>
+              <a:cxn ang="0">
+                <a:pos x="T66" y="T67"/>
+              </a:cxn>
+              <a:cxn ang="0">
+                <a:pos x="T68" y="T69"/>
+              </a:cxn>
+              <a:cxn ang="0">
+                <a:pos x="T70" y="T71"/>
+              </a:cxn>
+              <a:cxn ang="0">
+                <a:pos x="T72" y="T73"/>
+              </a:cxn>
+            </a:cxnLst>
+            <a:rect l="0" t="0" r="r" b="b"/>
+            <a:pathLst>
+              <a:path w="123" h="63">
+                <a:moveTo>
+                  <a:pt x="19" y="28"/>
+                </a:moveTo>
+                <a:cubicBezTo>
+                  <a:pt x="19" y="28"/>
+                  <a:pt x="19" y="28"/>
+                  <a:pt x="19" y="27"/>
+                </a:cubicBezTo>
+                <a:cubicBezTo>
+                  <a:pt x="19" y="8"/>
+                  <a:pt x="19" y="8"/>
+                  <a:pt x="19" y="8"/>
+                </a:cubicBezTo>
+                <a:cubicBezTo>
+                  <a:pt x="19" y="8"/>
+                  <a:pt x="19" y="7"/>
+                  <a:pt x="19" y="7"/>
+                </a:cubicBezTo>
+                <a:cubicBezTo>
+                  <a:pt x="19" y="7"/>
+                  <a:pt x="20" y="7"/>
+                  <a:pt x="20" y="7"/>
+                </a:cubicBezTo>
+                <a:cubicBezTo>
+                  <a:pt x="46" y="15"/>
+                  <a:pt x="46" y="15"/>
+                  <a:pt x="46" y="15"/>
+                </a:cubicBezTo>
+                <a:cubicBezTo>
+                  <a:pt x="46" y="16"/>
+                  <a:pt x="47" y="16"/>
+                  <a:pt x="47" y="17"/>
+                </a:cubicBezTo>
+                <a:cubicBezTo>
+                  <a:pt x="47" y="17"/>
+                  <a:pt x="46" y="18"/>
+                  <a:pt x="46" y="18"/>
+                </a:cubicBezTo>
+                <a:cubicBezTo>
+                  <a:pt x="21" y="29"/>
+                  <a:pt x="21" y="29"/>
+                  <a:pt x="21" y="29"/>
+                </a:cubicBezTo>
+                <a:cubicBezTo>
+                  <a:pt x="20" y="29"/>
+                  <a:pt x="20" y="29"/>
+                  <a:pt x="20" y="29"/>
+                </a:cubicBezTo>
+                <a:cubicBezTo>
+                  <a:pt x="20" y="29"/>
+                  <a:pt x="19" y="29"/>
+                  <a:pt x="19" y="28"/>
+                </a:cubicBezTo>
+                <a:close/>
+                <a:moveTo>
+                  <a:pt x="111" y="38"/>
+                </a:moveTo>
+                <a:cubicBezTo>
+                  <a:pt x="106" y="38"/>
+                  <a:pt x="101" y="42"/>
+                  <a:pt x="100" y="46"/>
+                </a:cubicBezTo>
+                <a:cubicBezTo>
+                  <a:pt x="73" y="46"/>
+                  <a:pt x="73" y="46"/>
+                  <a:pt x="73" y="46"/>
+                </a:cubicBezTo>
+                <a:cubicBezTo>
+                  <a:pt x="71" y="42"/>
+                  <a:pt x="67" y="38"/>
+                  <a:pt x="62" y="38"/>
+                </a:cubicBezTo>
+                <a:cubicBezTo>
+                  <a:pt x="57" y="38"/>
+                  <a:pt x="52" y="42"/>
+                  <a:pt x="51" y="46"/>
+                </a:cubicBezTo>
+                <a:cubicBezTo>
+                  <a:pt x="24" y="46"/>
+                  <a:pt x="24" y="46"/>
+                  <a:pt x="24" y="46"/>
+                </a:cubicBezTo>
+                <a:cubicBezTo>
+                  <a:pt x="22" y="42"/>
+                  <a:pt x="19" y="40"/>
+                  <a:pt x="15" y="39"/>
+                </a:cubicBezTo>
+                <a:cubicBezTo>
+                  <a:pt x="15" y="7"/>
+                  <a:pt x="15" y="7"/>
+                  <a:pt x="15" y="7"/>
+                </a:cubicBezTo>
+                <a:cubicBezTo>
+                  <a:pt x="15" y="6"/>
+                  <a:pt x="15" y="6"/>
+                  <a:pt x="15" y="6"/>
+                </a:cubicBezTo>
+                <a:cubicBezTo>
+                  <a:pt x="16" y="6"/>
+                  <a:pt x="17" y="5"/>
+                  <a:pt x="17" y="3"/>
+                </a:cubicBezTo>
+                <a:cubicBezTo>
+                  <a:pt x="17" y="1"/>
+                  <a:pt x="16" y="0"/>
+                  <a:pt x="14" y="0"/>
+                </a:cubicBezTo>
+                <a:cubicBezTo>
+                  <a:pt x="13" y="0"/>
+                  <a:pt x="13" y="0"/>
+                  <a:pt x="13" y="0"/>
+                </a:cubicBezTo>
+                <a:cubicBezTo>
+                  <a:pt x="11" y="0"/>
+                  <a:pt x="9" y="1"/>
+                  <a:pt x="9" y="3"/>
+                </a:cubicBezTo>
+                <a:cubicBezTo>
+                  <a:pt x="9" y="4"/>
+                  <a:pt x="10" y="5"/>
+                  <a:pt x="11" y="6"/>
+                </a:cubicBezTo>
+                <a:cubicBezTo>
+                  <a:pt x="11" y="6"/>
+                  <a:pt x="11" y="6"/>
+                  <a:pt x="11" y="7"/>
+                </a:cubicBezTo>
+                <a:cubicBezTo>
+                  <a:pt x="11" y="39"/>
+                  <a:pt x="11" y="39"/>
+                  <a:pt x="11" y="39"/>
+                </a:cubicBezTo>
+                <a:cubicBezTo>
+                  <a:pt x="5" y="39"/>
+                  <a:pt x="0" y="44"/>
+                  <a:pt x="0" y="51"/>
+                </a:cubicBezTo>
+                <a:cubicBezTo>
+                  <a:pt x="0" y="57"/>
+                  <a:pt x="6" y="63"/>
+                  <a:pt x="12" y="63"/>
+                </a:cubicBezTo>
+                <a:cubicBezTo>
+                  <a:pt x="18" y="63"/>
+                  <a:pt x="22" y="60"/>
+                  <a:pt x="24" y="55"/>
+                </a:cubicBezTo>
+                <a:cubicBezTo>
+                  <a:pt x="51" y="55"/>
+                  <a:pt x="51" y="55"/>
+                  <a:pt x="51" y="55"/>
+                </a:cubicBezTo>
+                <a:cubicBezTo>
+                  <a:pt x="52" y="60"/>
+                  <a:pt x="57" y="63"/>
+                  <a:pt x="62" y="63"/>
+                </a:cubicBezTo>
+                <a:cubicBezTo>
+                  <a:pt x="67" y="63"/>
+                  <a:pt x="71" y="60"/>
+                  <a:pt x="73" y="55"/>
+                </a:cubicBezTo>
+                <a:cubicBezTo>
+                  <a:pt x="100" y="55"/>
+                  <a:pt x="100" y="55"/>
+                  <a:pt x="100" y="55"/>
+                </a:cubicBezTo>
+                <a:cubicBezTo>
+                  <a:pt x="102" y="60"/>
+                  <a:pt x="106" y="63"/>
+                  <a:pt x="111" y="63"/>
+                </a:cubicBezTo>
+                <a:cubicBezTo>
+                  <a:pt x="118" y="63"/>
+                  <a:pt x="123" y="57"/>
+                  <a:pt x="123" y="51"/>
+                </a:cubicBezTo>
+                <a:cubicBezTo>
+                  <a:pt x="123" y="44"/>
+                  <a:pt x="118" y="38"/>
+                  <a:pt x="111" y="38"/>
+                </a:cubicBezTo>
+                <a:close/>
+              </a:path>
+            </a:pathLst>
+          </a:custGeom>
+          <a:solidFill>
+            <a:srgbClr val="9A2120"/>
+          </a:solidFill>
+          <a:ln>
+            <a:noFill/>
+          </a:ln>
+          <a:extLst/>
+        </p:spPr>
+        <p:txBody>
+          <a:bodyPr vert="horz" wrap="square" lIns="91440" tIns="45720" rIns="91440" bIns="45720" numCol="1" anchor="t" anchorCtr="0" compatLnSpc="1">
+            <a:prstTxWarp prst="textNoShape">
+              <a:avLst/>
+            </a:prstTxWarp>
+          </a:bodyPr>
+          <a:lstStyle/>
+          <a:p>
+            <a:endParaRPr lang="de-DE" dirty="0"/>
           </a:p>
         </p:txBody>
       </p:sp>
@@ -39655,7 +40545,7 @@
 </p:sld>
 </file>
 
-<file path=ppt/slides/slide28.xml><?xml version="1.0" encoding="utf-8"?>
+<file path=ppt/slides/slide26.xml><?xml version="1.0" encoding="utf-8"?>
 <p:sld xmlns:a="http://schemas.openxmlformats.org/drawingml/2006/main" xmlns:r="http://schemas.openxmlformats.org/officeDocument/2006/relationships" xmlns:p="http://schemas.openxmlformats.org/presentationml/2006/main">
   <p:cSld>
     <p:spTree>
@@ -42246,6 +43136,51 @@
       </p:grpSpPr>
       <p:sp>
         <p:nvSpPr>
+          <p:cNvPr id="25" name="Rechteck 24"/>
+          <p:cNvSpPr/>
+          <p:nvPr/>
+        </p:nvSpPr>
+        <p:spPr>
+          <a:xfrm>
+            <a:off x="8628609" y="4603173"/>
+            <a:ext cx="3310547" cy="1537854"/>
+          </a:xfrm>
+          <a:prstGeom prst="rect">
+            <a:avLst/>
+          </a:prstGeom>
+          <a:ln>
+            <a:solidFill>
+              <a:schemeClr val="tx1"/>
+            </a:solidFill>
+          </a:ln>
+        </p:spPr>
+        <p:style>
+          <a:lnRef idx="2">
+            <a:schemeClr val="accent3">
+              <a:shade val="50000"/>
+            </a:schemeClr>
+          </a:lnRef>
+          <a:fillRef idx="1">
+            <a:schemeClr val="accent3"/>
+          </a:fillRef>
+          <a:effectRef idx="0">
+            <a:schemeClr val="accent3"/>
+          </a:effectRef>
+          <a:fontRef idx="minor">
+            <a:schemeClr val="lt1"/>
+          </a:fontRef>
+        </p:style>
+        <p:txBody>
+          <a:bodyPr rtlCol="0" anchor="ctr"/>
+          <a:lstStyle/>
+          <a:p>
+            <a:pPr algn="ctr"/>
+            <a:endParaRPr lang="de-DE"/>
+          </a:p>
+        </p:txBody>
+      </p:sp>
+      <p:sp>
+        <p:nvSpPr>
           <p:cNvPr id="2" name="Titel 1"/>
           <p:cNvSpPr>
             <a:spLocks noGrp="1"/>
@@ -42263,25 +43198,6 @@
               <a:rPr lang="de-DE" dirty="0"/>
               <a:t>Unsere Vorstellung des Gesamtsystems</a:t>
             </a:r>
-          </a:p>
-        </p:txBody>
-      </p:sp>
-      <p:sp>
-        <p:nvSpPr>
-          <p:cNvPr id="3" name="Inhaltsplatzhalter 2"/>
-          <p:cNvSpPr>
-            <a:spLocks noGrp="1"/>
-          </p:cNvSpPr>
-          <p:nvPr>
-            <p:ph idx="1"/>
-          </p:nvPr>
-        </p:nvSpPr>
-        <p:spPr/>
-        <p:txBody>
-          <a:bodyPr/>
-          <a:lstStyle/>
-          <a:p>
-            <a:endParaRPr lang="de-DE"/>
           </a:p>
         </p:txBody>
       </p:sp>
@@ -42349,6 +43265,1681 @@
               <a:t>5</a:t>
             </a:fld>
             <a:endParaRPr lang="de-DE"/>
+          </a:p>
+        </p:txBody>
+      </p:sp>
+      <p:sp>
+        <p:nvSpPr>
+          <p:cNvPr id="7" name="Rechteck: obere Ecken abgeschnitten 6"/>
+          <p:cNvSpPr>
+            <a:spLocks/>
+          </p:cNvSpPr>
+          <p:nvPr/>
+        </p:nvSpPr>
+        <p:spPr>
+          <a:xfrm>
+            <a:off x="3482537" y="3574040"/>
+            <a:ext cx="5219997" cy="594230"/>
+          </a:xfrm>
+          <a:prstGeom prst="snip2SameRect">
+            <a:avLst>
+              <a:gd name="adj1" fmla="val 50000"/>
+              <a:gd name="adj2" fmla="val 50000"/>
+            </a:avLst>
+          </a:prstGeom>
+          <a:solidFill>
+            <a:srgbClr val="3E3E3E"/>
+          </a:solidFill>
+          <a:ln>
+            <a:solidFill>
+              <a:schemeClr val="tx1"/>
+            </a:solidFill>
+          </a:ln>
+        </p:spPr>
+        <p:style>
+          <a:lnRef idx="2">
+            <a:schemeClr val="accent1">
+              <a:shade val="50000"/>
+            </a:schemeClr>
+          </a:lnRef>
+          <a:fillRef idx="1">
+            <a:schemeClr val="accent1"/>
+          </a:fillRef>
+          <a:effectRef idx="0">
+            <a:schemeClr val="accent1"/>
+          </a:effectRef>
+          <a:fontRef idx="minor">
+            <a:schemeClr val="lt1"/>
+          </a:fontRef>
+        </p:style>
+        <p:txBody>
+          <a:bodyPr rtlCol="0" anchor="ctr"/>
+          <a:lstStyle/>
+          <a:p>
+            <a:pPr algn="ctr"/>
+            <a:r>
+              <a:rPr lang="de-DE" dirty="0"/>
+              <a:t>Systemröhre</a:t>
+            </a:r>
+          </a:p>
+        </p:txBody>
+      </p:sp>
+      <p:sp>
+        <p:nvSpPr>
+          <p:cNvPr id="8" name="Rechteck: abgerundete Ecken 7"/>
+          <p:cNvSpPr/>
+          <p:nvPr/>
+        </p:nvSpPr>
+        <p:spPr>
+          <a:xfrm>
+            <a:off x="687186" y="2753591"/>
+            <a:ext cx="2189017" cy="301337"/>
+          </a:xfrm>
+          <a:prstGeom prst="roundRect">
+            <a:avLst/>
+          </a:prstGeom>
+          <a:solidFill>
+            <a:srgbClr val="E7E6E6"/>
+          </a:solidFill>
+          <a:ln>
+            <a:solidFill>
+              <a:schemeClr val="tx1"/>
+            </a:solidFill>
+          </a:ln>
+        </p:spPr>
+        <p:style>
+          <a:lnRef idx="2">
+            <a:schemeClr val="accent1">
+              <a:shade val="50000"/>
+            </a:schemeClr>
+          </a:lnRef>
+          <a:fillRef idx="1">
+            <a:schemeClr val="accent1"/>
+          </a:fillRef>
+          <a:effectRef idx="0">
+            <a:schemeClr val="accent1"/>
+          </a:effectRef>
+          <a:fontRef idx="minor">
+            <a:schemeClr val="lt1"/>
+          </a:fontRef>
+        </p:style>
+        <p:txBody>
+          <a:bodyPr rtlCol="0" anchor="ctr"/>
+          <a:lstStyle/>
+          <a:p>
+            <a:pPr algn="ctr"/>
+            <a:endParaRPr lang="de-DE"/>
+          </a:p>
+        </p:txBody>
+      </p:sp>
+      <p:sp>
+        <p:nvSpPr>
+          <p:cNvPr id="9" name="Rechteck: abgerundete Ecken 8"/>
+          <p:cNvSpPr/>
+          <p:nvPr/>
+        </p:nvSpPr>
+        <p:spPr>
+          <a:xfrm>
+            <a:off x="687186" y="1721861"/>
+            <a:ext cx="2189017" cy="813521"/>
+          </a:xfrm>
+          <a:prstGeom prst="roundRect">
+            <a:avLst/>
+          </a:prstGeom>
+          <a:solidFill>
+            <a:srgbClr val="9A2120"/>
+          </a:solidFill>
+          <a:ln>
+            <a:solidFill>
+              <a:schemeClr val="tx1"/>
+            </a:solidFill>
+          </a:ln>
+        </p:spPr>
+        <p:style>
+          <a:lnRef idx="2">
+            <a:schemeClr val="accent1">
+              <a:shade val="50000"/>
+            </a:schemeClr>
+          </a:lnRef>
+          <a:fillRef idx="1">
+            <a:schemeClr val="accent1"/>
+          </a:fillRef>
+          <a:effectRef idx="0">
+            <a:schemeClr val="accent1"/>
+          </a:effectRef>
+          <a:fontRef idx="minor">
+            <a:schemeClr val="lt1"/>
+          </a:fontRef>
+        </p:style>
+        <p:txBody>
+          <a:bodyPr rtlCol="0" anchor="ctr"/>
+          <a:lstStyle/>
+          <a:p>
+            <a:r>
+              <a:rPr lang="de-DE" dirty="0"/>
+              <a:t>User</a:t>
+            </a:r>
+            <a:br>
+              <a:rPr lang="de-DE" dirty="0"/>
+            </a:br>
+            <a:r>
+              <a:rPr lang="de-DE" dirty="0"/>
+              <a:t>Experience</a:t>
+            </a:r>
+          </a:p>
+        </p:txBody>
+      </p:sp>
+      <p:sp>
+        <p:nvSpPr>
+          <p:cNvPr id="10" name="Rechteck: abgerundete Ecken 9"/>
+          <p:cNvSpPr/>
+          <p:nvPr/>
+        </p:nvSpPr>
+        <p:spPr>
+          <a:xfrm>
+            <a:off x="3563389" y="2753591"/>
+            <a:ext cx="2189017" cy="301337"/>
+          </a:xfrm>
+          <a:prstGeom prst="roundRect">
+            <a:avLst/>
+          </a:prstGeom>
+          <a:solidFill>
+            <a:srgbClr val="E7E6E6"/>
+          </a:solidFill>
+          <a:ln>
+            <a:solidFill>
+              <a:schemeClr val="tx1"/>
+            </a:solidFill>
+          </a:ln>
+        </p:spPr>
+        <p:style>
+          <a:lnRef idx="2">
+            <a:schemeClr val="accent1">
+              <a:shade val="50000"/>
+            </a:schemeClr>
+          </a:lnRef>
+          <a:fillRef idx="1">
+            <a:schemeClr val="accent1"/>
+          </a:fillRef>
+          <a:effectRef idx="0">
+            <a:schemeClr val="accent1"/>
+          </a:effectRef>
+          <a:fontRef idx="minor">
+            <a:schemeClr val="lt1"/>
+          </a:fontRef>
+        </p:style>
+        <p:txBody>
+          <a:bodyPr rtlCol="0" anchor="ctr"/>
+          <a:lstStyle/>
+          <a:p>
+            <a:pPr algn="ctr"/>
+            <a:endParaRPr lang="de-DE"/>
+          </a:p>
+        </p:txBody>
+      </p:sp>
+      <p:sp>
+        <p:nvSpPr>
+          <p:cNvPr id="11" name="Rechteck: abgerundete Ecken 10"/>
+          <p:cNvSpPr/>
+          <p:nvPr/>
+        </p:nvSpPr>
+        <p:spPr>
+          <a:xfrm>
+            <a:off x="3563389" y="1721861"/>
+            <a:ext cx="2189017" cy="813521"/>
+          </a:xfrm>
+          <a:prstGeom prst="roundRect">
+            <a:avLst/>
+          </a:prstGeom>
+          <a:solidFill>
+            <a:srgbClr val="9A2120"/>
+          </a:solidFill>
+          <a:ln>
+            <a:solidFill>
+              <a:schemeClr val="tx1"/>
+            </a:solidFill>
+          </a:ln>
+        </p:spPr>
+        <p:style>
+          <a:lnRef idx="2">
+            <a:schemeClr val="accent1">
+              <a:shade val="50000"/>
+            </a:schemeClr>
+          </a:lnRef>
+          <a:fillRef idx="1">
+            <a:schemeClr val="accent1"/>
+          </a:fillRef>
+          <a:effectRef idx="0">
+            <a:schemeClr val="accent1"/>
+          </a:effectRef>
+          <a:fontRef idx="minor">
+            <a:schemeClr val="lt1"/>
+          </a:fontRef>
+        </p:style>
+        <p:txBody>
+          <a:bodyPr rtlCol="0" anchor="ctr"/>
+          <a:lstStyle/>
+          <a:p>
+            <a:r>
+              <a:rPr lang="de-DE" dirty="0"/>
+              <a:t>Speech</a:t>
+            </a:r>
+            <a:br>
+              <a:rPr lang="de-DE" dirty="0"/>
+            </a:br>
+            <a:r>
+              <a:rPr lang="de-DE" dirty="0" err="1"/>
+              <a:t>Tokenizer</a:t>
+            </a:r>
+            <a:endParaRPr lang="de-DE" dirty="0"/>
+          </a:p>
+        </p:txBody>
+      </p:sp>
+      <p:sp>
+        <p:nvSpPr>
+          <p:cNvPr id="12" name="Rechteck: abgerundete Ecken 11"/>
+          <p:cNvSpPr/>
+          <p:nvPr/>
+        </p:nvSpPr>
+        <p:spPr>
+          <a:xfrm>
+            <a:off x="6439592" y="2753591"/>
+            <a:ext cx="2189017" cy="301337"/>
+          </a:xfrm>
+          <a:prstGeom prst="roundRect">
+            <a:avLst/>
+          </a:prstGeom>
+          <a:solidFill>
+            <a:srgbClr val="E7E6E6"/>
+          </a:solidFill>
+          <a:ln>
+            <a:solidFill>
+              <a:schemeClr val="tx1"/>
+            </a:solidFill>
+          </a:ln>
+        </p:spPr>
+        <p:style>
+          <a:lnRef idx="2">
+            <a:schemeClr val="accent1">
+              <a:shade val="50000"/>
+            </a:schemeClr>
+          </a:lnRef>
+          <a:fillRef idx="1">
+            <a:schemeClr val="accent1"/>
+          </a:fillRef>
+          <a:effectRef idx="0">
+            <a:schemeClr val="accent1"/>
+          </a:effectRef>
+          <a:fontRef idx="minor">
+            <a:schemeClr val="lt1"/>
+          </a:fontRef>
+        </p:style>
+        <p:txBody>
+          <a:bodyPr rtlCol="0" anchor="ctr"/>
+          <a:lstStyle/>
+          <a:p>
+            <a:pPr algn="ctr"/>
+            <a:endParaRPr lang="de-DE"/>
+          </a:p>
+        </p:txBody>
+      </p:sp>
+      <p:sp>
+        <p:nvSpPr>
+          <p:cNvPr id="13" name="Rechteck: abgerundete Ecken 12"/>
+          <p:cNvSpPr/>
+          <p:nvPr/>
+        </p:nvSpPr>
+        <p:spPr>
+          <a:xfrm>
+            <a:off x="6439592" y="1721861"/>
+            <a:ext cx="2189017" cy="813521"/>
+          </a:xfrm>
+          <a:prstGeom prst="roundRect">
+            <a:avLst/>
+          </a:prstGeom>
+          <a:solidFill>
+            <a:srgbClr val="9A2120"/>
+          </a:solidFill>
+          <a:ln>
+            <a:solidFill>
+              <a:schemeClr val="tx1"/>
+            </a:solidFill>
+          </a:ln>
+        </p:spPr>
+        <p:style>
+          <a:lnRef idx="2">
+            <a:schemeClr val="accent1">
+              <a:shade val="50000"/>
+            </a:schemeClr>
+          </a:lnRef>
+          <a:fillRef idx="1">
+            <a:schemeClr val="accent1"/>
+          </a:fillRef>
+          <a:effectRef idx="0">
+            <a:schemeClr val="accent1"/>
+          </a:effectRef>
+          <a:fontRef idx="minor">
+            <a:schemeClr val="lt1"/>
+          </a:fontRef>
+        </p:style>
+        <p:txBody>
+          <a:bodyPr rtlCol="0" anchor="ctr"/>
+          <a:lstStyle/>
+          <a:p>
+            <a:r>
+              <a:rPr lang="de-DE" dirty="0"/>
+              <a:t>Dokumenten-</a:t>
+            </a:r>
+            <a:br>
+              <a:rPr lang="de-DE" dirty="0"/>
+            </a:br>
+            <a:r>
+              <a:rPr lang="de-DE" dirty="0" err="1"/>
+              <a:t>repräsentation</a:t>
+            </a:r>
+            <a:endParaRPr lang="de-DE" dirty="0"/>
+          </a:p>
+        </p:txBody>
+      </p:sp>
+      <p:sp>
+        <p:nvSpPr>
+          <p:cNvPr id="14" name="Rechteck: abgerundete Ecken 13"/>
+          <p:cNvSpPr/>
+          <p:nvPr/>
+        </p:nvSpPr>
+        <p:spPr>
+          <a:xfrm>
+            <a:off x="9315795" y="2753591"/>
+            <a:ext cx="2189017" cy="301337"/>
+          </a:xfrm>
+          <a:prstGeom prst="roundRect">
+            <a:avLst/>
+          </a:prstGeom>
+          <a:solidFill>
+            <a:srgbClr val="E7E6E6"/>
+          </a:solidFill>
+          <a:ln>
+            <a:solidFill>
+              <a:schemeClr val="tx1"/>
+            </a:solidFill>
+          </a:ln>
+        </p:spPr>
+        <p:style>
+          <a:lnRef idx="2">
+            <a:schemeClr val="accent1">
+              <a:shade val="50000"/>
+            </a:schemeClr>
+          </a:lnRef>
+          <a:fillRef idx="1">
+            <a:schemeClr val="accent1"/>
+          </a:fillRef>
+          <a:effectRef idx="0">
+            <a:schemeClr val="accent1"/>
+          </a:effectRef>
+          <a:fontRef idx="minor">
+            <a:schemeClr val="lt1"/>
+          </a:fontRef>
+        </p:style>
+        <p:txBody>
+          <a:bodyPr rtlCol="0" anchor="ctr"/>
+          <a:lstStyle/>
+          <a:p>
+            <a:pPr algn="ctr"/>
+            <a:endParaRPr lang="de-DE"/>
+          </a:p>
+        </p:txBody>
+      </p:sp>
+      <p:sp>
+        <p:nvSpPr>
+          <p:cNvPr id="15" name="Rechteck: abgerundete Ecken 14"/>
+          <p:cNvSpPr/>
+          <p:nvPr/>
+        </p:nvSpPr>
+        <p:spPr>
+          <a:xfrm>
+            <a:off x="9315795" y="1721861"/>
+            <a:ext cx="2189017" cy="813521"/>
+          </a:xfrm>
+          <a:prstGeom prst="roundRect">
+            <a:avLst/>
+          </a:prstGeom>
+          <a:solidFill>
+            <a:srgbClr val="9A2120"/>
+          </a:solidFill>
+          <a:ln>
+            <a:solidFill>
+              <a:schemeClr val="tx1"/>
+            </a:solidFill>
+          </a:ln>
+        </p:spPr>
+        <p:style>
+          <a:lnRef idx="2">
+            <a:schemeClr val="accent1">
+              <a:shade val="50000"/>
+            </a:schemeClr>
+          </a:lnRef>
+          <a:fillRef idx="1">
+            <a:schemeClr val="accent1"/>
+          </a:fillRef>
+          <a:effectRef idx="0">
+            <a:schemeClr val="accent1"/>
+          </a:effectRef>
+          <a:fontRef idx="minor">
+            <a:schemeClr val="lt1"/>
+          </a:fontRef>
+        </p:style>
+        <p:txBody>
+          <a:bodyPr rtlCol="0" anchor="ctr"/>
+          <a:lstStyle/>
+          <a:p>
+            <a:r>
+              <a:rPr lang="de-DE" dirty="0" err="1"/>
+              <a:t>Machine</a:t>
+            </a:r>
+            <a:br>
+              <a:rPr lang="de-DE" dirty="0"/>
+            </a:br>
+            <a:r>
+              <a:rPr lang="de-DE" dirty="0"/>
+              <a:t>Learning</a:t>
+            </a:r>
+          </a:p>
+        </p:txBody>
+      </p:sp>
+      <p:sp>
+        <p:nvSpPr>
+          <p:cNvPr id="16" name="Rechteck: abgerundete Ecken 15"/>
+          <p:cNvSpPr/>
+          <p:nvPr/>
+        </p:nvSpPr>
+        <p:spPr>
+          <a:xfrm>
+            <a:off x="4745183" y="4687816"/>
+            <a:ext cx="2694707" cy="301337"/>
+          </a:xfrm>
+          <a:prstGeom prst="roundRect">
+            <a:avLst/>
+          </a:prstGeom>
+          <a:solidFill>
+            <a:srgbClr val="E7E6E6"/>
+          </a:solidFill>
+          <a:ln>
+            <a:solidFill>
+              <a:schemeClr val="tx1"/>
+            </a:solidFill>
+          </a:ln>
+        </p:spPr>
+        <p:style>
+          <a:lnRef idx="2">
+            <a:schemeClr val="accent1">
+              <a:shade val="50000"/>
+            </a:schemeClr>
+          </a:lnRef>
+          <a:fillRef idx="1">
+            <a:schemeClr val="accent1"/>
+          </a:fillRef>
+          <a:effectRef idx="0">
+            <a:schemeClr val="accent1"/>
+          </a:effectRef>
+          <a:fontRef idx="minor">
+            <a:schemeClr val="lt1"/>
+          </a:fontRef>
+        </p:style>
+        <p:txBody>
+          <a:bodyPr rtlCol="0" anchor="ctr"/>
+          <a:lstStyle/>
+          <a:p>
+            <a:pPr algn="ctr"/>
+            <a:endParaRPr lang="de-DE"/>
+          </a:p>
+        </p:txBody>
+      </p:sp>
+      <p:sp>
+        <p:nvSpPr>
+          <p:cNvPr id="17" name="Rechteck: abgerundete Ecken 16"/>
+          <p:cNvSpPr/>
+          <p:nvPr/>
+        </p:nvSpPr>
+        <p:spPr>
+          <a:xfrm>
+            <a:off x="4745183" y="5207362"/>
+            <a:ext cx="2694707" cy="813521"/>
+          </a:xfrm>
+          <a:prstGeom prst="roundRect">
+            <a:avLst/>
+          </a:prstGeom>
+          <a:solidFill>
+            <a:srgbClr val="9A2120"/>
+          </a:solidFill>
+          <a:ln>
+            <a:solidFill>
+              <a:schemeClr val="tx1"/>
+            </a:solidFill>
+          </a:ln>
+        </p:spPr>
+        <p:style>
+          <a:lnRef idx="2">
+            <a:schemeClr val="accent1">
+              <a:shade val="50000"/>
+            </a:schemeClr>
+          </a:lnRef>
+          <a:fillRef idx="1">
+            <a:schemeClr val="accent1"/>
+          </a:fillRef>
+          <a:effectRef idx="0">
+            <a:schemeClr val="accent1"/>
+          </a:effectRef>
+          <a:fontRef idx="minor">
+            <a:schemeClr val="lt1"/>
+          </a:fontRef>
+        </p:style>
+        <p:txBody>
+          <a:bodyPr rtlCol="0" anchor="ctr"/>
+          <a:lstStyle/>
+          <a:p>
+            <a:r>
+              <a:rPr lang="de-DE" dirty="0" err="1"/>
+              <a:t>Complex</a:t>
+            </a:r>
+            <a:br>
+              <a:rPr lang="de-DE" dirty="0"/>
+            </a:br>
+            <a:r>
+              <a:rPr lang="de-DE" dirty="0"/>
+              <a:t>Event Processing</a:t>
+            </a:r>
+          </a:p>
+        </p:txBody>
+      </p:sp>
+      <p:sp>
+        <p:nvSpPr>
+          <p:cNvPr id="22" name="Rechteck: obere Ecken abgeschnitten 21"/>
+          <p:cNvSpPr>
+            <a:spLocks/>
+          </p:cNvSpPr>
+          <p:nvPr/>
+        </p:nvSpPr>
+        <p:spPr>
+          <a:xfrm>
+            <a:off x="8750843" y="4704918"/>
+            <a:ext cx="309095" cy="376455"/>
+          </a:xfrm>
+          <a:prstGeom prst="snip2SameRect">
+            <a:avLst>
+              <a:gd name="adj1" fmla="val 50000"/>
+              <a:gd name="adj2" fmla="val 50000"/>
+            </a:avLst>
+          </a:prstGeom>
+          <a:solidFill>
+            <a:srgbClr val="3E3E3E"/>
+          </a:solidFill>
+          <a:ln>
+            <a:solidFill>
+              <a:schemeClr val="tx1"/>
+            </a:solidFill>
+          </a:ln>
+        </p:spPr>
+        <p:style>
+          <a:lnRef idx="2">
+            <a:schemeClr val="accent1">
+              <a:shade val="50000"/>
+            </a:schemeClr>
+          </a:lnRef>
+          <a:fillRef idx="1">
+            <a:schemeClr val="accent1"/>
+          </a:fillRef>
+          <a:effectRef idx="0">
+            <a:schemeClr val="accent1"/>
+          </a:effectRef>
+          <a:fontRef idx="minor">
+            <a:schemeClr val="lt1"/>
+          </a:fontRef>
+        </p:style>
+        <p:txBody>
+          <a:bodyPr rtlCol="0" anchor="ctr"/>
+          <a:lstStyle/>
+          <a:p>
+            <a:pPr algn="ctr"/>
+            <a:endParaRPr lang="de-DE" dirty="0"/>
+          </a:p>
+        </p:txBody>
+      </p:sp>
+      <p:sp>
+        <p:nvSpPr>
+          <p:cNvPr id="23" name="Rechteck: abgerundete Ecken 22"/>
+          <p:cNvSpPr/>
+          <p:nvPr/>
+        </p:nvSpPr>
+        <p:spPr>
+          <a:xfrm>
+            <a:off x="8750843" y="5254860"/>
+            <a:ext cx="309095" cy="301337"/>
+          </a:xfrm>
+          <a:prstGeom prst="roundRect">
+            <a:avLst/>
+          </a:prstGeom>
+          <a:solidFill>
+            <a:srgbClr val="E7E6E6"/>
+          </a:solidFill>
+          <a:ln>
+            <a:solidFill>
+              <a:schemeClr val="tx1"/>
+            </a:solidFill>
+          </a:ln>
+        </p:spPr>
+        <p:style>
+          <a:lnRef idx="2">
+            <a:schemeClr val="accent1">
+              <a:shade val="50000"/>
+            </a:schemeClr>
+          </a:lnRef>
+          <a:fillRef idx="1">
+            <a:schemeClr val="accent1"/>
+          </a:fillRef>
+          <a:effectRef idx="0">
+            <a:schemeClr val="accent1"/>
+          </a:effectRef>
+          <a:fontRef idx="minor">
+            <a:schemeClr val="lt1"/>
+          </a:fontRef>
+        </p:style>
+        <p:txBody>
+          <a:bodyPr rtlCol="0" anchor="ctr"/>
+          <a:lstStyle/>
+          <a:p>
+            <a:pPr algn="ctr"/>
+            <a:endParaRPr lang="de-DE" dirty="0"/>
+          </a:p>
+        </p:txBody>
+      </p:sp>
+      <p:sp>
+        <p:nvSpPr>
+          <p:cNvPr id="24" name="Rechteck: abgerundete Ecken 23"/>
+          <p:cNvSpPr/>
+          <p:nvPr/>
+        </p:nvSpPr>
+        <p:spPr>
+          <a:xfrm>
+            <a:off x="8750843" y="5729684"/>
+            <a:ext cx="347321" cy="296862"/>
+          </a:xfrm>
+          <a:prstGeom prst="roundRect">
+            <a:avLst/>
+          </a:prstGeom>
+          <a:solidFill>
+            <a:srgbClr val="9A2120"/>
+          </a:solidFill>
+          <a:ln>
+            <a:solidFill>
+              <a:schemeClr val="tx1"/>
+            </a:solidFill>
+          </a:ln>
+        </p:spPr>
+        <p:style>
+          <a:lnRef idx="2">
+            <a:schemeClr val="accent1">
+              <a:shade val="50000"/>
+            </a:schemeClr>
+          </a:lnRef>
+          <a:fillRef idx="1">
+            <a:schemeClr val="accent1"/>
+          </a:fillRef>
+          <a:effectRef idx="0">
+            <a:schemeClr val="accent1"/>
+          </a:effectRef>
+          <a:fontRef idx="minor">
+            <a:schemeClr val="lt1"/>
+          </a:fontRef>
+        </p:style>
+        <p:txBody>
+          <a:bodyPr rtlCol="0" anchor="ctr"/>
+          <a:lstStyle/>
+          <a:p>
+            <a:endParaRPr lang="de-DE" dirty="0"/>
+          </a:p>
+        </p:txBody>
+      </p:sp>
+      <p:cxnSp>
+        <p:nvCxnSpPr>
+          <p:cNvPr id="32" name="Gerade Verbindung mit Pfeil 31"/>
+          <p:cNvCxnSpPr>
+            <a:stCxn id="7" idx="0"/>
+          </p:cNvCxnSpPr>
+          <p:nvPr/>
+        </p:nvCxnSpPr>
+        <p:spPr>
+          <a:xfrm flipV="1">
+            <a:off x="8702534" y="3074123"/>
+            <a:ext cx="1936371" cy="797032"/>
+          </a:xfrm>
+          <a:prstGeom prst="straightConnector1">
+            <a:avLst/>
+          </a:prstGeom>
+          <a:ln w="38100">
+            <a:solidFill>
+              <a:schemeClr val="tx1"/>
+            </a:solidFill>
+            <a:tailEnd type="triangle"/>
+          </a:ln>
+        </p:spPr>
+        <p:style>
+          <a:lnRef idx="1">
+            <a:schemeClr val="accent1"/>
+          </a:lnRef>
+          <a:fillRef idx="0">
+            <a:schemeClr val="accent1"/>
+          </a:fillRef>
+          <a:effectRef idx="0">
+            <a:schemeClr val="accent1"/>
+          </a:effectRef>
+          <a:fontRef idx="minor">
+            <a:schemeClr val="tx1"/>
+          </a:fontRef>
+        </p:style>
+      </p:cxnSp>
+      <p:cxnSp>
+        <p:nvCxnSpPr>
+          <p:cNvPr id="34" name="Gerade Verbindung mit Pfeil 33"/>
+          <p:cNvCxnSpPr>
+            <a:stCxn id="7" idx="2"/>
+          </p:cNvCxnSpPr>
+          <p:nvPr/>
+        </p:nvCxnSpPr>
+        <p:spPr>
+          <a:xfrm flipH="1" flipV="1">
+            <a:off x="1546166" y="3057885"/>
+            <a:ext cx="1936371" cy="813270"/>
+          </a:xfrm>
+          <a:prstGeom prst="straightConnector1">
+            <a:avLst/>
+          </a:prstGeom>
+          <a:ln w="38100">
+            <a:solidFill>
+              <a:schemeClr val="tx1"/>
+            </a:solidFill>
+            <a:tailEnd type="triangle"/>
+          </a:ln>
+        </p:spPr>
+        <p:style>
+          <a:lnRef idx="1">
+            <a:schemeClr val="accent1"/>
+          </a:lnRef>
+          <a:fillRef idx="0">
+            <a:schemeClr val="accent1"/>
+          </a:fillRef>
+          <a:effectRef idx="0">
+            <a:schemeClr val="accent1"/>
+          </a:effectRef>
+          <a:fontRef idx="minor">
+            <a:schemeClr val="tx1"/>
+          </a:fontRef>
+        </p:style>
+      </p:cxnSp>
+      <p:grpSp>
+        <p:nvGrpSpPr>
+          <p:cNvPr id="40" name="Gruppieren 39"/>
+          <p:cNvGrpSpPr/>
+          <p:nvPr/>
+        </p:nvGrpSpPr>
+        <p:grpSpPr>
+          <a:xfrm>
+            <a:off x="7298573" y="3053954"/>
+            <a:ext cx="471054" cy="521060"/>
+            <a:chOff x="6182591" y="4183858"/>
+            <a:chExt cx="471054" cy="521060"/>
+          </a:xfrm>
+        </p:grpSpPr>
+        <p:cxnSp>
+          <p:nvCxnSpPr>
+            <p:cNvPr id="38" name="Gerade Verbindung mit Pfeil 37"/>
+            <p:cNvCxnSpPr/>
+            <p:nvPr/>
+          </p:nvCxnSpPr>
+          <p:spPr>
+            <a:xfrm flipV="1">
+              <a:off x="6653645" y="4185806"/>
+              <a:ext cx="0" cy="519112"/>
+            </a:xfrm>
+            <a:prstGeom prst="straightConnector1">
+              <a:avLst/>
+            </a:prstGeom>
+            <a:ln w="38100">
+              <a:solidFill>
+                <a:schemeClr val="tx1"/>
+              </a:solidFill>
+              <a:tailEnd type="triangle"/>
+            </a:ln>
+          </p:spPr>
+          <p:style>
+            <a:lnRef idx="1">
+              <a:schemeClr val="accent1"/>
+            </a:lnRef>
+            <a:fillRef idx="0">
+              <a:schemeClr val="accent1"/>
+            </a:fillRef>
+            <a:effectRef idx="0">
+              <a:schemeClr val="accent1"/>
+            </a:effectRef>
+            <a:fontRef idx="minor">
+              <a:schemeClr val="tx1"/>
+            </a:fontRef>
+          </p:style>
+        </p:cxnSp>
+        <p:cxnSp>
+          <p:nvCxnSpPr>
+            <p:cNvPr id="39" name="Gerade Verbindung mit Pfeil 38"/>
+            <p:cNvCxnSpPr/>
+            <p:nvPr/>
+          </p:nvCxnSpPr>
+          <p:spPr>
+            <a:xfrm rot="10800000" flipV="1">
+              <a:off x="6182591" y="4183858"/>
+              <a:ext cx="0" cy="519112"/>
+            </a:xfrm>
+            <a:prstGeom prst="straightConnector1">
+              <a:avLst/>
+            </a:prstGeom>
+            <a:ln w="38100">
+              <a:solidFill>
+                <a:schemeClr val="tx1"/>
+              </a:solidFill>
+              <a:tailEnd type="triangle"/>
+            </a:ln>
+          </p:spPr>
+          <p:style>
+            <a:lnRef idx="1">
+              <a:schemeClr val="accent1"/>
+            </a:lnRef>
+            <a:fillRef idx="0">
+              <a:schemeClr val="accent1"/>
+            </a:fillRef>
+            <a:effectRef idx="0">
+              <a:schemeClr val="accent1"/>
+            </a:effectRef>
+            <a:fontRef idx="minor">
+              <a:schemeClr val="tx1"/>
+            </a:fontRef>
+          </p:style>
+        </p:cxnSp>
+      </p:grpSp>
+      <p:grpSp>
+        <p:nvGrpSpPr>
+          <p:cNvPr id="41" name="Gruppieren 40"/>
+          <p:cNvGrpSpPr/>
+          <p:nvPr/>
+        </p:nvGrpSpPr>
+        <p:grpSpPr>
+          <a:xfrm>
+            <a:off x="4423062" y="3056769"/>
+            <a:ext cx="471054" cy="521060"/>
+            <a:chOff x="6182591" y="4183858"/>
+            <a:chExt cx="471054" cy="521060"/>
+          </a:xfrm>
+        </p:grpSpPr>
+        <p:cxnSp>
+          <p:nvCxnSpPr>
+            <p:cNvPr id="42" name="Gerade Verbindung mit Pfeil 41"/>
+            <p:cNvCxnSpPr/>
+            <p:nvPr/>
+          </p:nvCxnSpPr>
+          <p:spPr>
+            <a:xfrm flipV="1">
+              <a:off x="6653645" y="4185806"/>
+              <a:ext cx="0" cy="519112"/>
+            </a:xfrm>
+            <a:prstGeom prst="straightConnector1">
+              <a:avLst/>
+            </a:prstGeom>
+            <a:ln w="38100">
+              <a:solidFill>
+                <a:schemeClr val="tx1"/>
+              </a:solidFill>
+              <a:tailEnd type="triangle"/>
+            </a:ln>
+          </p:spPr>
+          <p:style>
+            <a:lnRef idx="1">
+              <a:schemeClr val="accent1"/>
+            </a:lnRef>
+            <a:fillRef idx="0">
+              <a:schemeClr val="accent1"/>
+            </a:fillRef>
+            <a:effectRef idx="0">
+              <a:schemeClr val="accent1"/>
+            </a:effectRef>
+            <a:fontRef idx="minor">
+              <a:schemeClr val="tx1"/>
+            </a:fontRef>
+          </p:style>
+        </p:cxnSp>
+        <p:cxnSp>
+          <p:nvCxnSpPr>
+            <p:cNvPr id="43" name="Gerade Verbindung mit Pfeil 42"/>
+            <p:cNvCxnSpPr/>
+            <p:nvPr/>
+          </p:nvCxnSpPr>
+          <p:spPr>
+            <a:xfrm rot="10800000" flipV="1">
+              <a:off x="6182591" y="4183858"/>
+              <a:ext cx="0" cy="519112"/>
+            </a:xfrm>
+            <a:prstGeom prst="straightConnector1">
+              <a:avLst/>
+            </a:prstGeom>
+            <a:ln w="38100">
+              <a:solidFill>
+                <a:schemeClr val="tx1"/>
+              </a:solidFill>
+              <a:tailEnd type="triangle"/>
+            </a:ln>
+          </p:spPr>
+          <p:style>
+            <a:lnRef idx="1">
+              <a:schemeClr val="accent1"/>
+            </a:lnRef>
+            <a:fillRef idx="0">
+              <a:schemeClr val="accent1"/>
+            </a:fillRef>
+            <a:effectRef idx="0">
+              <a:schemeClr val="accent1"/>
+            </a:effectRef>
+            <a:fontRef idx="minor">
+              <a:schemeClr val="tx1"/>
+            </a:fontRef>
+          </p:style>
+        </p:cxnSp>
+      </p:grpSp>
+      <p:grpSp>
+        <p:nvGrpSpPr>
+          <p:cNvPr id="44" name="Gruppieren 43"/>
+          <p:cNvGrpSpPr/>
+          <p:nvPr/>
+        </p:nvGrpSpPr>
+        <p:grpSpPr>
+          <a:xfrm>
+            <a:off x="5857008" y="4161091"/>
+            <a:ext cx="471054" cy="521060"/>
+            <a:chOff x="6182591" y="4183858"/>
+            <a:chExt cx="471054" cy="521060"/>
+          </a:xfrm>
+        </p:grpSpPr>
+        <p:cxnSp>
+          <p:nvCxnSpPr>
+            <p:cNvPr id="45" name="Gerade Verbindung mit Pfeil 44"/>
+            <p:cNvCxnSpPr/>
+            <p:nvPr/>
+          </p:nvCxnSpPr>
+          <p:spPr>
+            <a:xfrm flipV="1">
+              <a:off x="6653645" y="4185806"/>
+              <a:ext cx="0" cy="519112"/>
+            </a:xfrm>
+            <a:prstGeom prst="straightConnector1">
+              <a:avLst/>
+            </a:prstGeom>
+            <a:ln w="38100">
+              <a:solidFill>
+                <a:schemeClr val="tx1"/>
+              </a:solidFill>
+              <a:tailEnd type="triangle"/>
+            </a:ln>
+          </p:spPr>
+          <p:style>
+            <a:lnRef idx="1">
+              <a:schemeClr val="accent1"/>
+            </a:lnRef>
+            <a:fillRef idx="0">
+              <a:schemeClr val="accent1"/>
+            </a:fillRef>
+            <a:effectRef idx="0">
+              <a:schemeClr val="accent1"/>
+            </a:effectRef>
+            <a:fontRef idx="minor">
+              <a:schemeClr val="tx1"/>
+            </a:fontRef>
+          </p:style>
+        </p:cxnSp>
+        <p:cxnSp>
+          <p:nvCxnSpPr>
+            <p:cNvPr id="46" name="Gerade Verbindung mit Pfeil 45"/>
+            <p:cNvCxnSpPr/>
+            <p:nvPr/>
+          </p:nvCxnSpPr>
+          <p:spPr>
+            <a:xfrm rot="10800000" flipV="1">
+              <a:off x="6182591" y="4183858"/>
+              <a:ext cx="0" cy="519112"/>
+            </a:xfrm>
+            <a:prstGeom prst="straightConnector1">
+              <a:avLst/>
+            </a:prstGeom>
+            <a:ln w="38100">
+              <a:solidFill>
+                <a:schemeClr val="tx1"/>
+              </a:solidFill>
+              <a:tailEnd type="triangle"/>
+            </a:ln>
+          </p:spPr>
+          <p:style>
+            <a:lnRef idx="1">
+              <a:schemeClr val="accent1"/>
+            </a:lnRef>
+            <a:fillRef idx="0">
+              <a:schemeClr val="accent1"/>
+            </a:fillRef>
+            <a:effectRef idx="0">
+              <a:schemeClr val="accent1"/>
+            </a:effectRef>
+            <a:fontRef idx="minor">
+              <a:schemeClr val="tx1"/>
+            </a:fontRef>
+          </p:style>
+        </p:cxnSp>
+      </p:grpSp>
+      <p:grpSp>
+        <p:nvGrpSpPr>
+          <p:cNvPr id="47" name="Gruppieren 46"/>
+          <p:cNvGrpSpPr/>
+          <p:nvPr/>
+        </p:nvGrpSpPr>
+        <p:grpSpPr>
+          <a:xfrm>
+            <a:off x="5857007" y="5005499"/>
+            <a:ext cx="471054" cy="201429"/>
+            <a:chOff x="6182591" y="4183858"/>
+            <a:chExt cx="471054" cy="521060"/>
+          </a:xfrm>
+        </p:grpSpPr>
+        <p:cxnSp>
+          <p:nvCxnSpPr>
+            <p:cNvPr id="48" name="Gerade Verbindung mit Pfeil 47"/>
+            <p:cNvCxnSpPr/>
+            <p:nvPr/>
+          </p:nvCxnSpPr>
+          <p:spPr>
+            <a:xfrm flipV="1">
+              <a:off x="6653645" y="4185806"/>
+              <a:ext cx="0" cy="519112"/>
+            </a:xfrm>
+            <a:prstGeom prst="straightConnector1">
+              <a:avLst/>
+            </a:prstGeom>
+            <a:ln w="38100">
+              <a:solidFill>
+                <a:schemeClr val="tx1"/>
+              </a:solidFill>
+              <a:tailEnd type="triangle"/>
+            </a:ln>
+          </p:spPr>
+          <p:style>
+            <a:lnRef idx="1">
+              <a:schemeClr val="accent1"/>
+            </a:lnRef>
+            <a:fillRef idx="0">
+              <a:schemeClr val="accent1"/>
+            </a:fillRef>
+            <a:effectRef idx="0">
+              <a:schemeClr val="accent1"/>
+            </a:effectRef>
+            <a:fontRef idx="minor">
+              <a:schemeClr val="tx1"/>
+            </a:fontRef>
+          </p:style>
+        </p:cxnSp>
+        <p:cxnSp>
+          <p:nvCxnSpPr>
+            <p:cNvPr id="49" name="Gerade Verbindung mit Pfeil 48"/>
+            <p:cNvCxnSpPr/>
+            <p:nvPr/>
+          </p:nvCxnSpPr>
+          <p:spPr>
+            <a:xfrm rot="10800000" flipV="1">
+              <a:off x="6182591" y="4183858"/>
+              <a:ext cx="0" cy="519112"/>
+            </a:xfrm>
+            <a:prstGeom prst="straightConnector1">
+              <a:avLst/>
+            </a:prstGeom>
+            <a:ln w="38100">
+              <a:solidFill>
+                <a:schemeClr val="tx1"/>
+              </a:solidFill>
+              <a:tailEnd type="triangle"/>
+            </a:ln>
+          </p:spPr>
+          <p:style>
+            <a:lnRef idx="1">
+              <a:schemeClr val="accent1"/>
+            </a:lnRef>
+            <a:fillRef idx="0">
+              <a:schemeClr val="accent1"/>
+            </a:fillRef>
+            <a:effectRef idx="0">
+              <a:schemeClr val="accent1"/>
+            </a:effectRef>
+            <a:fontRef idx="minor">
+              <a:schemeClr val="tx1"/>
+            </a:fontRef>
+          </p:style>
+        </p:cxnSp>
+      </p:grpSp>
+      <p:grpSp>
+        <p:nvGrpSpPr>
+          <p:cNvPr id="50" name="Gruppieren 49"/>
+          <p:cNvGrpSpPr/>
+          <p:nvPr/>
+        </p:nvGrpSpPr>
+        <p:grpSpPr>
+          <a:xfrm>
+            <a:off x="4423062" y="2548606"/>
+            <a:ext cx="471054" cy="201429"/>
+            <a:chOff x="6182591" y="4183858"/>
+            <a:chExt cx="471054" cy="521060"/>
+          </a:xfrm>
+        </p:grpSpPr>
+        <p:cxnSp>
+          <p:nvCxnSpPr>
+            <p:cNvPr id="51" name="Gerade Verbindung mit Pfeil 50"/>
+            <p:cNvCxnSpPr/>
+            <p:nvPr/>
+          </p:nvCxnSpPr>
+          <p:spPr>
+            <a:xfrm flipV="1">
+              <a:off x="6653645" y="4185806"/>
+              <a:ext cx="0" cy="519112"/>
+            </a:xfrm>
+            <a:prstGeom prst="straightConnector1">
+              <a:avLst/>
+            </a:prstGeom>
+            <a:ln w="38100">
+              <a:solidFill>
+                <a:schemeClr val="tx1"/>
+              </a:solidFill>
+              <a:tailEnd type="triangle"/>
+            </a:ln>
+          </p:spPr>
+          <p:style>
+            <a:lnRef idx="1">
+              <a:schemeClr val="accent1"/>
+            </a:lnRef>
+            <a:fillRef idx="0">
+              <a:schemeClr val="accent1"/>
+            </a:fillRef>
+            <a:effectRef idx="0">
+              <a:schemeClr val="accent1"/>
+            </a:effectRef>
+            <a:fontRef idx="minor">
+              <a:schemeClr val="tx1"/>
+            </a:fontRef>
+          </p:style>
+        </p:cxnSp>
+        <p:cxnSp>
+          <p:nvCxnSpPr>
+            <p:cNvPr id="52" name="Gerade Verbindung mit Pfeil 51"/>
+            <p:cNvCxnSpPr/>
+            <p:nvPr/>
+          </p:nvCxnSpPr>
+          <p:spPr>
+            <a:xfrm rot="10800000" flipV="1">
+              <a:off x="6182591" y="4183858"/>
+              <a:ext cx="0" cy="519112"/>
+            </a:xfrm>
+            <a:prstGeom prst="straightConnector1">
+              <a:avLst/>
+            </a:prstGeom>
+            <a:ln w="38100">
+              <a:solidFill>
+                <a:schemeClr val="tx1"/>
+              </a:solidFill>
+              <a:tailEnd type="triangle"/>
+            </a:ln>
+          </p:spPr>
+          <p:style>
+            <a:lnRef idx="1">
+              <a:schemeClr val="accent1"/>
+            </a:lnRef>
+            <a:fillRef idx="0">
+              <a:schemeClr val="accent1"/>
+            </a:fillRef>
+            <a:effectRef idx="0">
+              <a:schemeClr val="accent1"/>
+            </a:effectRef>
+            <a:fontRef idx="minor">
+              <a:schemeClr val="tx1"/>
+            </a:fontRef>
+          </p:style>
+        </p:cxnSp>
+      </p:grpSp>
+      <p:grpSp>
+        <p:nvGrpSpPr>
+          <p:cNvPr id="53" name="Gruppieren 52"/>
+          <p:cNvGrpSpPr/>
+          <p:nvPr/>
+        </p:nvGrpSpPr>
+        <p:grpSpPr>
+          <a:xfrm>
+            <a:off x="7301042" y="2534956"/>
+            <a:ext cx="471054" cy="201429"/>
+            <a:chOff x="6182591" y="4183858"/>
+            <a:chExt cx="471054" cy="521060"/>
+          </a:xfrm>
+        </p:grpSpPr>
+        <p:cxnSp>
+          <p:nvCxnSpPr>
+            <p:cNvPr id="54" name="Gerade Verbindung mit Pfeil 53"/>
+            <p:cNvCxnSpPr/>
+            <p:nvPr/>
+          </p:nvCxnSpPr>
+          <p:spPr>
+            <a:xfrm flipV="1">
+              <a:off x="6653645" y="4185806"/>
+              <a:ext cx="0" cy="519112"/>
+            </a:xfrm>
+            <a:prstGeom prst="straightConnector1">
+              <a:avLst/>
+            </a:prstGeom>
+            <a:ln w="38100">
+              <a:solidFill>
+                <a:schemeClr val="tx1"/>
+              </a:solidFill>
+              <a:tailEnd type="triangle"/>
+            </a:ln>
+          </p:spPr>
+          <p:style>
+            <a:lnRef idx="1">
+              <a:schemeClr val="accent1"/>
+            </a:lnRef>
+            <a:fillRef idx="0">
+              <a:schemeClr val="accent1"/>
+            </a:fillRef>
+            <a:effectRef idx="0">
+              <a:schemeClr val="accent1"/>
+            </a:effectRef>
+            <a:fontRef idx="minor">
+              <a:schemeClr val="tx1"/>
+            </a:fontRef>
+          </p:style>
+        </p:cxnSp>
+        <p:cxnSp>
+          <p:nvCxnSpPr>
+            <p:cNvPr id="55" name="Gerade Verbindung mit Pfeil 54"/>
+            <p:cNvCxnSpPr/>
+            <p:nvPr/>
+          </p:nvCxnSpPr>
+          <p:spPr>
+            <a:xfrm rot="10800000" flipV="1">
+              <a:off x="6182591" y="4183858"/>
+              <a:ext cx="0" cy="519112"/>
+            </a:xfrm>
+            <a:prstGeom prst="straightConnector1">
+              <a:avLst/>
+            </a:prstGeom>
+            <a:ln w="38100">
+              <a:solidFill>
+                <a:schemeClr val="tx1"/>
+              </a:solidFill>
+              <a:tailEnd type="triangle"/>
+            </a:ln>
+          </p:spPr>
+          <p:style>
+            <a:lnRef idx="1">
+              <a:schemeClr val="accent1"/>
+            </a:lnRef>
+            <a:fillRef idx="0">
+              <a:schemeClr val="accent1"/>
+            </a:fillRef>
+            <a:effectRef idx="0">
+              <a:schemeClr val="accent1"/>
+            </a:effectRef>
+            <a:fontRef idx="minor">
+              <a:schemeClr val="tx1"/>
+            </a:fontRef>
+          </p:style>
+        </p:cxnSp>
+      </p:grpSp>
+      <p:grpSp>
+        <p:nvGrpSpPr>
+          <p:cNvPr id="56" name="Gruppieren 55"/>
+          <p:cNvGrpSpPr/>
+          <p:nvPr/>
+        </p:nvGrpSpPr>
+        <p:grpSpPr>
+          <a:xfrm>
+            <a:off x="1546167" y="2554524"/>
+            <a:ext cx="471054" cy="201429"/>
+            <a:chOff x="6182591" y="4183858"/>
+            <a:chExt cx="471054" cy="521060"/>
+          </a:xfrm>
+        </p:grpSpPr>
+        <p:cxnSp>
+          <p:nvCxnSpPr>
+            <p:cNvPr id="57" name="Gerade Verbindung mit Pfeil 56"/>
+            <p:cNvCxnSpPr/>
+            <p:nvPr/>
+          </p:nvCxnSpPr>
+          <p:spPr>
+            <a:xfrm flipV="1">
+              <a:off x="6653645" y="4185806"/>
+              <a:ext cx="0" cy="519112"/>
+            </a:xfrm>
+            <a:prstGeom prst="straightConnector1">
+              <a:avLst/>
+            </a:prstGeom>
+            <a:ln w="38100">
+              <a:solidFill>
+                <a:schemeClr val="tx1"/>
+              </a:solidFill>
+              <a:tailEnd type="triangle"/>
+            </a:ln>
+          </p:spPr>
+          <p:style>
+            <a:lnRef idx="1">
+              <a:schemeClr val="accent1"/>
+            </a:lnRef>
+            <a:fillRef idx="0">
+              <a:schemeClr val="accent1"/>
+            </a:fillRef>
+            <a:effectRef idx="0">
+              <a:schemeClr val="accent1"/>
+            </a:effectRef>
+            <a:fontRef idx="minor">
+              <a:schemeClr val="tx1"/>
+            </a:fontRef>
+          </p:style>
+        </p:cxnSp>
+        <p:cxnSp>
+          <p:nvCxnSpPr>
+            <p:cNvPr id="58" name="Gerade Verbindung mit Pfeil 57"/>
+            <p:cNvCxnSpPr/>
+            <p:nvPr/>
+          </p:nvCxnSpPr>
+          <p:spPr>
+            <a:xfrm rot="10800000" flipV="1">
+              <a:off x="6182591" y="4183858"/>
+              <a:ext cx="0" cy="519112"/>
+            </a:xfrm>
+            <a:prstGeom prst="straightConnector1">
+              <a:avLst/>
+            </a:prstGeom>
+            <a:ln w="38100">
+              <a:solidFill>
+                <a:schemeClr val="tx1"/>
+              </a:solidFill>
+              <a:tailEnd type="triangle"/>
+            </a:ln>
+          </p:spPr>
+          <p:style>
+            <a:lnRef idx="1">
+              <a:schemeClr val="accent1"/>
+            </a:lnRef>
+            <a:fillRef idx="0">
+              <a:schemeClr val="accent1"/>
+            </a:fillRef>
+            <a:effectRef idx="0">
+              <a:schemeClr val="accent1"/>
+            </a:effectRef>
+            <a:fontRef idx="minor">
+              <a:schemeClr val="tx1"/>
+            </a:fontRef>
+          </p:style>
+        </p:cxnSp>
+      </p:grpSp>
+      <p:grpSp>
+        <p:nvGrpSpPr>
+          <p:cNvPr id="59" name="Gruppieren 58"/>
+          <p:cNvGrpSpPr/>
+          <p:nvPr/>
+        </p:nvGrpSpPr>
+        <p:grpSpPr>
+          <a:xfrm>
+            <a:off x="10174776" y="2553647"/>
+            <a:ext cx="471054" cy="201429"/>
+            <a:chOff x="6182591" y="4183858"/>
+            <a:chExt cx="471054" cy="521060"/>
+          </a:xfrm>
+        </p:grpSpPr>
+        <p:cxnSp>
+          <p:nvCxnSpPr>
+            <p:cNvPr id="60" name="Gerade Verbindung mit Pfeil 59"/>
+            <p:cNvCxnSpPr/>
+            <p:nvPr/>
+          </p:nvCxnSpPr>
+          <p:spPr>
+            <a:xfrm flipV="1">
+              <a:off x="6653645" y="4185806"/>
+              <a:ext cx="0" cy="519112"/>
+            </a:xfrm>
+            <a:prstGeom prst="straightConnector1">
+              <a:avLst/>
+            </a:prstGeom>
+            <a:ln w="38100">
+              <a:solidFill>
+                <a:schemeClr val="tx1"/>
+              </a:solidFill>
+              <a:tailEnd type="triangle"/>
+            </a:ln>
+          </p:spPr>
+          <p:style>
+            <a:lnRef idx="1">
+              <a:schemeClr val="accent1"/>
+            </a:lnRef>
+            <a:fillRef idx="0">
+              <a:schemeClr val="accent1"/>
+            </a:fillRef>
+            <a:effectRef idx="0">
+              <a:schemeClr val="accent1"/>
+            </a:effectRef>
+            <a:fontRef idx="minor">
+              <a:schemeClr val="tx1"/>
+            </a:fontRef>
+          </p:style>
+        </p:cxnSp>
+        <p:cxnSp>
+          <p:nvCxnSpPr>
+            <p:cNvPr id="61" name="Gerade Verbindung mit Pfeil 60"/>
+            <p:cNvCxnSpPr/>
+            <p:nvPr/>
+          </p:nvCxnSpPr>
+          <p:spPr>
+            <a:xfrm rot="10800000" flipV="1">
+              <a:off x="6182591" y="4183858"/>
+              <a:ext cx="0" cy="519112"/>
+            </a:xfrm>
+            <a:prstGeom prst="straightConnector1">
+              <a:avLst/>
+            </a:prstGeom>
+            <a:ln w="38100">
+              <a:solidFill>
+                <a:schemeClr val="tx1"/>
+              </a:solidFill>
+              <a:tailEnd type="triangle"/>
+            </a:ln>
+          </p:spPr>
+          <p:style>
+            <a:lnRef idx="1">
+              <a:schemeClr val="accent1"/>
+            </a:lnRef>
+            <a:fillRef idx="0">
+              <a:schemeClr val="accent1"/>
+            </a:fillRef>
+            <a:effectRef idx="0">
+              <a:schemeClr val="accent1"/>
+            </a:effectRef>
+            <a:fontRef idx="minor">
+              <a:schemeClr val="tx1"/>
+            </a:fontRef>
+          </p:style>
+        </p:cxnSp>
+      </p:grpSp>
+      <p:cxnSp>
+        <p:nvCxnSpPr>
+          <p:cNvPr id="63" name="Gerade Verbindung mit Pfeil 62"/>
+          <p:cNvCxnSpPr/>
+          <p:nvPr/>
+        </p:nvCxnSpPr>
+        <p:spPr>
+          <a:xfrm>
+            <a:off x="2020238" y="3077620"/>
+            <a:ext cx="1543151" cy="678556"/>
+          </a:xfrm>
+          <a:prstGeom prst="straightConnector1">
+            <a:avLst/>
+          </a:prstGeom>
+          <a:ln w="38100">
+            <a:solidFill>
+              <a:schemeClr val="tx1"/>
+            </a:solidFill>
+            <a:tailEnd type="triangle"/>
+          </a:ln>
+        </p:spPr>
+        <p:style>
+          <a:lnRef idx="1">
+            <a:schemeClr val="accent1"/>
+          </a:lnRef>
+          <a:fillRef idx="0">
+            <a:schemeClr val="accent1"/>
+          </a:fillRef>
+          <a:effectRef idx="0">
+            <a:schemeClr val="accent1"/>
+          </a:effectRef>
+          <a:fontRef idx="minor">
+            <a:schemeClr val="tx1"/>
+          </a:fontRef>
+        </p:style>
+      </p:cxnSp>
+      <p:cxnSp>
+        <p:nvCxnSpPr>
+          <p:cNvPr id="67" name="Gerade Verbindung mit Pfeil 66"/>
+          <p:cNvCxnSpPr/>
+          <p:nvPr/>
+        </p:nvCxnSpPr>
+        <p:spPr>
+          <a:xfrm flipH="1">
+            <a:off x="8628609" y="3065169"/>
+            <a:ext cx="1543151" cy="691007"/>
+          </a:xfrm>
+          <a:prstGeom prst="straightConnector1">
+            <a:avLst/>
+          </a:prstGeom>
+          <a:ln w="38100">
+            <a:solidFill>
+              <a:schemeClr val="tx1"/>
+            </a:solidFill>
+            <a:tailEnd type="triangle"/>
+          </a:ln>
+        </p:spPr>
+        <p:style>
+          <a:lnRef idx="1">
+            <a:schemeClr val="accent1"/>
+          </a:lnRef>
+          <a:fillRef idx="0">
+            <a:schemeClr val="accent1"/>
+          </a:fillRef>
+          <a:effectRef idx="0">
+            <a:schemeClr val="accent1"/>
+          </a:effectRef>
+          <a:fontRef idx="minor">
+            <a:schemeClr val="tx1"/>
+          </a:fontRef>
+        </p:style>
+      </p:cxnSp>
+      <p:sp>
+        <p:nvSpPr>
+          <p:cNvPr id="72" name="Textfeld 71"/>
+          <p:cNvSpPr txBox="1"/>
+          <p:nvPr/>
+        </p:nvSpPr>
+        <p:spPr>
+          <a:xfrm>
+            <a:off x="9070566" y="4674294"/>
+            <a:ext cx="1035861" cy="400110"/>
+          </a:xfrm>
+          <a:prstGeom prst="rect">
+            <a:avLst/>
+          </a:prstGeom>
+          <a:noFill/>
+        </p:spPr>
+        <p:txBody>
+          <a:bodyPr wrap="none" rtlCol="0">
+            <a:spAutoFit/>
+          </a:bodyPr>
+          <a:lstStyle/>
+          <a:p>
+            <a:r>
+              <a:rPr lang="de-DE" sz="2000" dirty="0"/>
+              <a:t>Channel</a:t>
+            </a:r>
+          </a:p>
+        </p:txBody>
+      </p:sp>
+      <p:sp>
+        <p:nvSpPr>
+          <p:cNvPr id="73" name="Textfeld 72"/>
+          <p:cNvSpPr txBox="1"/>
+          <p:nvPr/>
+        </p:nvSpPr>
+        <p:spPr>
+          <a:xfrm>
+            <a:off x="9070566" y="5172045"/>
+            <a:ext cx="2600135" cy="400110"/>
+          </a:xfrm>
+          <a:prstGeom prst="rect">
+            <a:avLst/>
+          </a:prstGeom>
+          <a:noFill/>
+        </p:spPr>
+        <p:txBody>
+          <a:bodyPr wrap="none" rtlCol="0">
+            <a:spAutoFit/>
+          </a:bodyPr>
+          <a:lstStyle/>
+          <a:p>
+            <a:r>
+              <a:rPr lang="de-DE" sz="2000" dirty="0"/>
+              <a:t>Event Processing Agent</a:t>
+            </a:r>
+          </a:p>
+        </p:txBody>
+      </p:sp>
+      <p:sp>
+        <p:nvSpPr>
+          <p:cNvPr id="74" name="Textfeld 73"/>
+          <p:cNvSpPr txBox="1"/>
+          <p:nvPr/>
+        </p:nvSpPr>
+        <p:spPr>
+          <a:xfrm>
+            <a:off x="9070566" y="5678060"/>
+            <a:ext cx="2902461" cy="400110"/>
+          </a:xfrm>
+          <a:prstGeom prst="rect">
+            <a:avLst/>
+          </a:prstGeom>
+          <a:noFill/>
+        </p:spPr>
+        <p:txBody>
+          <a:bodyPr wrap="none" rtlCol="0">
+            <a:spAutoFit/>
+          </a:bodyPr>
+          <a:lstStyle/>
+          <a:p>
+            <a:r>
+              <a:rPr lang="de-DE" sz="2000" dirty="0"/>
+              <a:t>Event </a:t>
+            </a:r>
+            <a:r>
+              <a:rPr lang="de-DE" sz="2000" dirty="0" err="1"/>
+              <a:t>producer</a:t>
+            </a:r>
+            <a:r>
+              <a:rPr lang="de-DE" sz="2000" dirty="0"/>
+              <a:t>/</a:t>
+            </a:r>
+            <a:r>
+              <a:rPr lang="de-DE" sz="2000" dirty="0" err="1"/>
+              <a:t>consumer</a:t>
+            </a:r>
+            <a:endParaRPr lang="de-DE" sz="2000" dirty="0"/>
           </a:p>
         </p:txBody>
       </p:sp>
@@ -46017,27 +48608,13 @@
           <a:p>
             <a:r>
               <a:rPr lang="de-DE" dirty="0"/>
-              <a:t>Angebotene und benötigte Events</a:t>
-            </a:r>
-          </a:p>
-        </p:txBody>
-      </p:sp>
-      <p:sp>
-        <p:nvSpPr>
-          <p:cNvPr id="3" name="Inhaltsplatzhalter 2"/>
-          <p:cNvSpPr>
-            <a:spLocks noGrp="1"/>
-          </p:cNvSpPr>
-          <p:nvPr>
-            <p:ph idx="1"/>
-          </p:nvPr>
-        </p:nvSpPr>
-        <p:spPr/>
-        <p:txBody>
-          <a:bodyPr/>
-          <a:lstStyle/>
-          <a:p>
-            <a:endParaRPr lang="de-DE"/>
+              <a:t>Angedachte </a:t>
+            </a:r>
+            <a:r>
+              <a:rPr lang="de-DE" dirty="0" err="1"/>
+              <a:t>Agents</a:t>
+            </a:r>
+            <a:endParaRPr lang="de-DE" dirty="0"/>
           </a:p>
         </p:txBody>
       </p:sp>
@@ -46103,130 +48680,6 @@
             <a:fld id="{9A8D1588-5235-4A3E-9519-E5C37E4E16B7}" type="slidenum">
               <a:rPr lang="de-DE" smtClean="0"/>
               <a:t>8</a:t>
-            </a:fld>
-            <a:endParaRPr lang="de-DE"/>
-          </a:p>
-        </p:txBody>
-      </p:sp>
-    </p:spTree>
-    <p:extLst>
-      <p:ext uri="{BB962C8B-B14F-4D97-AF65-F5344CB8AC3E}">
-        <p14:creationId xmlns:p14="http://schemas.microsoft.com/office/powerpoint/2010/main" val="3142969181"/>
-      </p:ext>
-    </p:extLst>
-  </p:cSld>
-  <p:clrMapOvr>
-    <a:masterClrMapping/>
-  </p:clrMapOvr>
-</p:sld>
-</file>
-
-<file path=ppt/slides/slide9.xml><?xml version="1.0" encoding="utf-8"?>
-<p:sld xmlns:a="http://schemas.openxmlformats.org/drawingml/2006/main" xmlns:r="http://schemas.openxmlformats.org/officeDocument/2006/relationships" xmlns:p="http://schemas.openxmlformats.org/presentationml/2006/main">
-  <p:cSld>
-    <p:spTree>
-      <p:nvGrpSpPr>
-        <p:cNvPr id="1" name=""/>
-        <p:cNvGrpSpPr/>
-        <p:nvPr/>
-      </p:nvGrpSpPr>
-      <p:grpSpPr>
-        <a:xfrm>
-          <a:off x="0" y="0"/>
-          <a:ext cx="0" cy="0"/>
-          <a:chOff x="0" y="0"/>
-          <a:chExt cx="0" cy="0"/>
-        </a:xfrm>
-      </p:grpSpPr>
-      <p:sp>
-        <p:nvSpPr>
-          <p:cNvPr id="2" name="Titel 1"/>
-          <p:cNvSpPr>
-            <a:spLocks noGrp="1"/>
-          </p:cNvSpPr>
-          <p:nvPr>
-            <p:ph type="title"/>
-          </p:nvPr>
-        </p:nvSpPr>
-        <p:spPr/>
-        <p:txBody>
-          <a:bodyPr/>
-          <a:lstStyle/>
-          <a:p>
-            <a:r>
-              <a:rPr lang="de-DE" dirty="0"/>
-              <a:t>Angedachte </a:t>
-            </a:r>
-            <a:r>
-              <a:rPr lang="de-DE" dirty="0" err="1"/>
-              <a:t>Agents</a:t>
-            </a:r>
-            <a:endParaRPr lang="de-DE" dirty="0"/>
-          </a:p>
-        </p:txBody>
-      </p:sp>
-      <p:sp>
-        <p:nvSpPr>
-          <p:cNvPr id="4" name="Datumsplatzhalter 3"/>
-          <p:cNvSpPr>
-            <a:spLocks noGrp="1"/>
-          </p:cNvSpPr>
-          <p:nvPr>
-            <p:ph type="dt" sz="half" idx="10"/>
-          </p:nvPr>
-        </p:nvSpPr>
-        <p:spPr/>
-        <p:txBody>
-          <a:bodyPr/>
-          <a:lstStyle/>
-          <a:p>
-            <a:r>
-              <a:rPr lang="de-DE"/>
-              <a:t>25.04.2017</a:t>
-            </a:r>
-          </a:p>
-        </p:txBody>
-      </p:sp>
-      <p:sp>
-        <p:nvSpPr>
-          <p:cNvPr id="5" name="Fußzeilenplatzhalter 4"/>
-          <p:cNvSpPr>
-            <a:spLocks noGrp="1"/>
-          </p:cNvSpPr>
-          <p:nvPr>
-            <p:ph type="ftr" sz="quarter" idx="11"/>
-          </p:nvPr>
-        </p:nvSpPr>
-        <p:spPr/>
-        <p:txBody>
-          <a:bodyPr/>
-          <a:lstStyle/>
-          <a:p>
-            <a:r>
-              <a:rPr lang="de-DE"/>
-              <a:t>Florian Blessing, Lisa Böhler, Markus Götz, Jan Habersetzer, Wendelin Herrmann</a:t>
-            </a:r>
-          </a:p>
-        </p:txBody>
-      </p:sp>
-      <p:sp>
-        <p:nvSpPr>
-          <p:cNvPr id="6" name="Foliennummernplatzhalter 5"/>
-          <p:cNvSpPr>
-            <a:spLocks noGrp="1"/>
-          </p:cNvSpPr>
-          <p:nvPr>
-            <p:ph type="sldNum" sz="quarter" idx="12"/>
-          </p:nvPr>
-        </p:nvSpPr>
-        <p:spPr/>
-        <p:txBody>
-          <a:bodyPr/>
-          <a:lstStyle/>
-          <a:p>
-            <a:fld id="{9A8D1588-5235-4A3E-9519-E5C37E4E16B7}" type="slidenum">
-              <a:rPr lang="de-DE" smtClean="0"/>
-              <a:t>9</a:t>
             </a:fld>
             <a:endParaRPr lang="de-DE"/>
           </a:p>
@@ -48061,6 +50514,144 @@
     <p:extLst>
       <p:ext uri="{BB962C8B-B14F-4D97-AF65-F5344CB8AC3E}">
         <p14:creationId xmlns:p14="http://schemas.microsoft.com/office/powerpoint/2010/main" val="2639992796"/>
+      </p:ext>
+    </p:extLst>
+  </p:cSld>
+  <p:clrMapOvr>
+    <a:masterClrMapping/>
+  </p:clrMapOvr>
+</p:sld>
+</file>
+
+<file path=ppt/slides/slide9.xml><?xml version="1.0" encoding="utf-8"?>
+<p:sld xmlns:a="http://schemas.openxmlformats.org/drawingml/2006/main" xmlns:r="http://schemas.openxmlformats.org/officeDocument/2006/relationships" xmlns:p="http://schemas.openxmlformats.org/presentationml/2006/main">
+  <p:cSld>
+    <p:spTree>
+      <p:nvGrpSpPr>
+        <p:cNvPr id="1" name=""/>
+        <p:cNvGrpSpPr/>
+        <p:nvPr/>
+      </p:nvGrpSpPr>
+      <p:grpSpPr>
+        <a:xfrm>
+          <a:off x="0" y="0"/>
+          <a:ext cx="0" cy="0"/>
+          <a:chOff x="0" y="0"/>
+          <a:chExt cx="0" cy="0"/>
+        </a:xfrm>
+      </p:grpSpPr>
+      <p:sp>
+        <p:nvSpPr>
+          <p:cNvPr id="2" name="Titel 1"/>
+          <p:cNvSpPr>
+            <a:spLocks noGrp="1"/>
+          </p:cNvSpPr>
+          <p:nvPr>
+            <p:ph type="title"/>
+          </p:nvPr>
+        </p:nvSpPr>
+        <p:spPr/>
+        <p:txBody>
+          <a:bodyPr/>
+          <a:lstStyle/>
+          <a:p>
+            <a:r>
+              <a:rPr lang="de-DE" dirty="0"/>
+              <a:t>Systementwurf</a:t>
+            </a:r>
+          </a:p>
+        </p:txBody>
+      </p:sp>
+      <p:sp>
+        <p:nvSpPr>
+          <p:cNvPr id="3" name="Textplatzhalter 2"/>
+          <p:cNvSpPr>
+            <a:spLocks noGrp="1"/>
+          </p:cNvSpPr>
+          <p:nvPr>
+            <p:ph type="body" idx="1"/>
+          </p:nvPr>
+        </p:nvSpPr>
+        <p:spPr/>
+        <p:txBody>
+          <a:bodyPr/>
+          <a:lstStyle/>
+          <a:p>
+            <a:endParaRPr lang="de-DE"/>
+          </a:p>
+        </p:txBody>
+      </p:sp>
+      <p:sp>
+        <p:nvSpPr>
+          <p:cNvPr id="4" name="Datumsplatzhalter 3"/>
+          <p:cNvSpPr>
+            <a:spLocks noGrp="1"/>
+          </p:cNvSpPr>
+          <p:nvPr>
+            <p:ph type="dt" sz="half" idx="10"/>
+          </p:nvPr>
+        </p:nvSpPr>
+        <p:spPr/>
+        <p:txBody>
+          <a:bodyPr/>
+          <a:lstStyle/>
+          <a:p>
+            <a:r>
+              <a:rPr lang="de-DE"/>
+              <a:t>25.04.2017</a:t>
+            </a:r>
+          </a:p>
+        </p:txBody>
+      </p:sp>
+      <p:sp>
+        <p:nvSpPr>
+          <p:cNvPr id="5" name="Fußzeilenplatzhalter 4"/>
+          <p:cNvSpPr>
+            <a:spLocks noGrp="1"/>
+          </p:cNvSpPr>
+          <p:nvPr>
+            <p:ph type="ftr" sz="quarter" idx="11"/>
+          </p:nvPr>
+        </p:nvSpPr>
+        <p:spPr/>
+        <p:txBody>
+          <a:bodyPr/>
+          <a:lstStyle/>
+          <a:p>
+            <a:r>
+              <a:rPr lang="de-DE"/>
+              <a:t>Florian Blessing, Lisa Böhler, Markus Götz, Jan Habersetzer, Wendelin Herrmann</a:t>
+            </a:r>
+          </a:p>
+        </p:txBody>
+      </p:sp>
+      <p:sp>
+        <p:nvSpPr>
+          <p:cNvPr id="6" name="Foliennummernplatzhalter 5"/>
+          <p:cNvSpPr>
+            <a:spLocks noGrp="1"/>
+          </p:cNvSpPr>
+          <p:nvPr>
+            <p:ph type="sldNum" sz="quarter" idx="12"/>
+          </p:nvPr>
+        </p:nvSpPr>
+        <p:spPr/>
+        <p:txBody>
+          <a:bodyPr/>
+          <a:lstStyle/>
+          <a:p>
+            <a:fld id="{9A8D1588-5235-4A3E-9519-E5C37E4E16B7}" type="slidenum">
+              <a:rPr lang="de-DE" smtClean="0"/>
+              <a:t>9</a:t>
+            </a:fld>
+            <a:endParaRPr lang="de-DE"/>
+          </a:p>
+        </p:txBody>
+      </p:sp>
+    </p:spTree>
+    <p:extLst>
+      <p:ext uri="{BB962C8B-B14F-4D97-AF65-F5344CB8AC3E}">
+        <p14:creationId xmlns:p14="http://schemas.microsoft.com/office/powerpoint/2010/main" val="3801462308"/>
       </p:ext>
     </p:extLst>
   </p:cSld>

</xml_diff>

<commit_message>
kleine Fehlerkorrektur an finaler Präsentation
</commit_message>
<xml_diff>
--- a/Non-Code (Doku usw.)/Semester 2/_Präsentationen/Präsentation Milestone 4 - 25.04.17.pptx
+++ b/Non-Code (Doku usw.)/Semester 2/_Präsentationen/Präsentation Milestone 4 - 25.04.17.pptx
@@ -17865,20 +17865,6 @@
           <a:bodyPr/>
           <a:lstStyle/>
           <a:p>
-            <a:r>
-              <a:rPr lang="de-DE" dirty="0"/>
-              <a:t>Betonen der Archivfunktion</a:t>
-            </a:r>
-            <a:r>
-              <a:rPr lang="de-DE" baseline="0" dirty="0"/>
-              <a:t> </a:t>
-            </a:r>
-            <a:r>
-              <a:rPr lang="de-DE" baseline="0" dirty="0">
-                <a:sym typeface="Wingdings" panose="05000000000000000000" pitchFamily="2" charset="2"/>
-              </a:rPr>
-              <a:t> Aus User-Stories hervorgegangen, aber noch nicht final abgeklärt</a:t>
-            </a:r>
             <a:endParaRPr lang="de-DE" dirty="0"/>
           </a:p>
         </p:txBody>
@@ -46467,12 +46453,6 @@
             <a:r>
               <a:rPr lang="de-DE" sz="2400" dirty="0"/>
               <a:t>Zugriff auf Google-Dienste</a:t>
-            </a:r>
-          </a:p>
-          <a:p>
-            <a:r>
-              <a:rPr lang="de-DE" sz="2400" dirty="0"/>
-              <a:t>Archivfunktion</a:t>
             </a:r>
           </a:p>
         </p:txBody>

</xml_diff>

<commit_message>
Hinzufügen Sequenzdiagramme zu Präsentation
</commit_message>
<xml_diff>
--- a/Non-Code (Doku usw.)/Semester 2/_Präsentationen/Präsentation Milestone 4 - 25.04.17.pptx
+++ b/Non-Code (Doku usw.)/Semester 2/_Präsentationen/Präsentation Milestone 4 - 25.04.17.pptx
@@ -9,10 +9,10 @@
     <p:sldMasterId id="2147483683" r:id="rId5"/>
   </p:sldMasterIdLst>
   <p:notesMasterIdLst>
-    <p:notesMasterId r:id="rId32"/>
+    <p:notesMasterId r:id="rId35"/>
   </p:notesMasterIdLst>
   <p:handoutMasterIdLst>
-    <p:handoutMasterId r:id="rId33"/>
+    <p:handoutMasterId r:id="rId36"/>
   </p:handoutMasterIdLst>
   <p:sldIdLst>
     <p:sldId id="293" r:id="rId6"/>
@@ -28,19 +28,22 @@
     <p:sldId id="320" r:id="rId16"/>
     <p:sldId id="331" r:id="rId17"/>
     <p:sldId id="321" r:id="rId18"/>
-    <p:sldId id="332" r:id="rId19"/>
-    <p:sldId id="333" r:id="rId20"/>
-    <p:sldId id="311" r:id="rId21"/>
-    <p:sldId id="312" r:id="rId22"/>
-    <p:sldId id="325" r:id="rId23"/>
-    <p:sldId id="326" r:id="rId24"/>
-    <p:sldId id="327" r:id="rId25"/>
-    <p:sldId id="328" r:id="rId26"/>
-    <p:sldId id="329" r:id="rId27"/>
-    <p:sldId id="330" r:id="rId28"/>
-    <p:sldId id="313" r:id="rId29"/>
-    <p:sldId id="314" r:id="rId30"/>
-    <p:sldId id="278" r:id="rId31"/>
+    <p:sldId id="335" r:id="rId19"/>
+    <p:sldId id="332" r:id="rId20"/>
+    <p:sldId id="334" r:id="rId21"/>
+    <p:sldId id="333" r:id="rId22"/>
+    <p:sldId id="336" r:id="rId23"/>
+    <p:sldId id="311" r:id="rId24"/>
+    <p:sldId id="312" r:id="rId25"/>
+    <p:sldId id="325" r:id="rId26"/>
+    <p:sldId id="326" r:id="rId27"/>
+    <p:sldId id="327" r:id="rId28"/>
+    <p:sldId id="328" r:id="rId29"/>
+    <p:sldId id="329" r:id="rId30"/>
+    <p:sldId id="330" r:id="rId31"/>
+    <p:sldId id="313" r:id="rId32"/>
+    <p:sldId id="314" r:id="rId33"/>
+    <p:sldId id="278" r:id="rId34"/>
   </p:sldIdLst>
   <p:sldSz cx="12192000" cy="6858000"/>
   <p:notesSz cx="6858000" cy="9144000"/>
@@ -18065,7 +18068,7 @@
           <a:p>
             <a:fld id="{2C6D43BA-BF3B-4C35-86C4-88F3F3542AEC}" type="slidenum">
               <a:rPr lang="de-DE" smtClean="0"/>
-              <a:t>15</a:t>
+              <a:t>17</a:t>
             </a:fld>
             <a:endParaRPr lang="de-DE"/>
           </a:p>
@@ -18171,7 +18174,7 @@
           <a:p>
             <a:fld id="{2C6D43BA-BF3B-4C35-86C4-88F3F3542AEC}" type="slidenum">
               <a:rPr lang="de-DE" smtClean="0"/>
-              <a:t>21</a:t>
+              <a:t>24</a:t>
             </a:fld>
             <a:endParaRPr lang="de-DE"/>
           </a:p>
@@ -18282,7 +18285,7 @@
           <a:p>
             <a:fld id="{2C6D43BA-BF3B-4C35-86C4-88F3F3542AEC}" type="slidenum">
               <a:rPr lang="de-DE" smtClean="0"/>
-              <a:t>22</a:t>
+              <a:t>25</a:t>
             </a:fld>
             <a:endParaRPr lang="de-DE"/>
           </a:p>
@@ -18366,7 +18369,7 @@
           <a:p>
             <a:fld id="{2C6D43BA-BF3B-4C35-86C4-88F3F3542AEC}" type="slidenum">
               <a:rPr lang="de-DE" smtClean="0"/>
-              <a:t>26</a:t>
+              <a:t>29</a:t>
             </a:fld>
             <a:endParaRPr lang="de-DE"/>
           </a:p>
@@ -37277,8 +37280,8 @@
         </p:blipFill>
         <p:spPr>
           <a:xfrm>
-            <a:off x="2207570" y="1825625"/>
-            <a:ext cx="7776859" cy="4351338"/>
+            <a:off x="2214452" y="1825625"/>
+            <a:ext cx="7763095" cy="4351338"/>
           </a:xfrm>
         </p:spPr>
       </p:pic>
@@ -37425,8 +37428,8 @@
         </p:blipFill>
         <p:spPr>
           <a:xfrm>
-            <a:off x="2206800" y="1825625"/>
-            <a:ext cx="7588492" cy="4351338"/>
+            <a:off x="2214000" y="1825625"/>
+            <a:ext cx="7562325" cy="4351338"/>
           </a:xfrm>
         </p:spPr>
       </p:pic>
@@ -37460,6 +37463,29 @@
           <a:chExt cx="0" cy="0"/>
         </a:xfrm>
       </p:grpSpPr>
+      <p:sp>
+        <p:nvSpPr>
+          <p:cNvPr id="2" name="Titel 1"/>
+          <p:cNvSpPr>
+            <a:spLocks noGrp="1"/>
+          </p:cNvSpPr>
+          <p:nvPr>
+            <p:ph type="title"/>
+          </p:nvPr>
+        </p:nvSpPr>
+        <p:spPr/>
+        <p:txBody>
+          <a:bodyPr/>
+          <a:lstStyle/>
+          <a:p>
+            <a:r>
+              <a:rPr lang="de-DE"/>
+              <a:t>Schnittstelle CEP</a:t>
+            </a:r>
+            <a:endParaRPr lang="de-DE" dirty="0"/>
+          </a:p>
+        </p:txBody>
+      </p:sp>
       <p:pic>
         <p:nvPicPr>
           <p:cNvPr id="9" name="Inhaltsplatzhalter 8"/>
@@ -37484,35 +37510,11 @@
         </p:blipFill>
         <p:spPr>
           <a:xfrm>
-            <a:off x="3470970" y="2057399"/>
-            <a:ext cx="8176243" cy="3780000"/>
+            <a:off x="2142964" y="1825625"/>
+            <a:ext cx="7906071" cy="4351338"/>
           </a:xfrm>
         </p:spPr>
       </p:pic>
-      <p:sp>
-        <p:nvSpPr>
-          <p:cNvPr id="8" name="Textplatzhalter 7"/>
-          <p:cNvSpPr>
-            <a:spLocks noGrp="1"/>
-          </p:cNvSpPr>
-          <p:nvPr>
-            <p:ph type="body" sz="half" idx="2"/>
-          </p:nvPr>
-        </p:nvSpPr>
-        <p:spPr>
-          <a:xfrm>
-            <a:off x="838199" y="2057399"/>
-            <a:ext cx="2381394" cy="3811588"/>
-          </a:xfrm>
-        </p:spPr>
-        <p:txBody>
-          <a:bodyPr/>
-          <a:lstStyle/>
-          <a:p>
-            <a:endParaRPr lang="de-DE" dirty="0"/>
-          </a:p>
-        </p:txBody>
-      </p:sp>
       <p:sp>
         <p:nvSpPr>
           <p:cNvPr id="4" name="Datumsplatzhalter 3"/>
@@ -37574,43 +37576,10 @@
           <a:p>
             <a:fld id="{9A8D1588-5235-4A3E-9519-E5C37E4E16B7}" type="slidenum">
               <a:rPr lang="de-DE" smtClean="0"/>
+              <a:pPr/>
               <a:t>13</a:t>
             </a:fld>
             <a:endParaRPr lang="de-DE"/>
-          </a:p>
-        </p:txBody>
-      </p:sp>
-      <p:sp>
-        <p:nvSpPr>
-          <p:cNvPr id="2" name="Titel 1"/>
-          <p:cNvSpPr>
-            <a:spLocks noGrp="1"/>
-          </p:cNvSpPr>
-          <p:nvPr>
-            <p:ph type="title"/>
-          </p:nvPr>
-        </p:nvSpPr>
-        <p:spPr>
-          <a:xfrm>
-            <a:off x="839788" y="595222"/>
-            <a:ext cx="4343400" cy="1462177"/>
-          </a:xfrm>
-        </p:spPr>
-        <p:txBody>
-          <a:bodyPr/>
-          <a:lstStyle/>
-          <a:p>
-            <a:r>
-              <a:rPr lang="de-DE" dirty="0"/>
-              <a:t>Schnittstelle </a:t>
-            </a:r>
-            <a:br>
-              <a:rPr lang="de-DE" dirty="0"/>
-            </a:br>
-            <a:r>
-              <a:rPr lang="de-DE" dirty="0"/>
-              <a:t>CEP</a:t>
-            </a:r>
           </a:p>
         </p:txBody>
       </p:sp>
@@ -37644,9 +37613,31 @@
           <a:chExt cx="0" cy="0"/>
         </a:xfrm>
       </p:grpSpPr>
+      <p:sp>
+        <p:nvSpPr>
+          <p:cNvPr id="2" name="Titel 1"/>
+          <p:cNvSpPr>
+            <a:spLocks noGrp="1"/>
+          </p:cNvSpPr>
+          <p:nvPr>
+            <p:ph type="title"/>
+          </p:nvPr>
+        </p:nvSpPr>
+        <p:spPr/>
+        <p:txBody>
+          <a:bodyPr/>
+          <a:lstStyle/>
+          <a:p>
+            <a:r>
+              <a:rPr lang="de-DE" dirty="0"/>
+              <a:t>Protokoll CEP Schnittstelle</a:t>
+            </a:r>
+          </a:p>
+        </p:txBody>
+      </p:sp>
       <p:pic>
         <p:nvPicPr>
-          <p:cNvPr id="9" name="Inhaltsplatzhalter 8"/>
+          <p:cNvPr id="8" name="Inhaltsplatzhalter 7"/>
           <p:cNvPicPr>
             <a:picLocks noGrp="1" noChangeAspect="1"/>
           </p:cNvPicPr>
@@ -37668,35 +37659,11 @@
         </p:blipFill>
         <p:spPr>
           <a:xfrm>
-            <a:off x="3470970" y="2158020"/>
-            <a:ext cx="8176243" cy="3578757"/>
+            <a:off x="3594562" y="1825625"/>
+            <a:ext cx="5002875" cy="4351338"/>
           </a:xfrm>
         </p:spPr>
       </p:pic>
-      <p:sp>
-        <p:nvSpPr>
-          <p:cNvPr id="8" name="Textplatzhalter 7"/>
-          <p:cNvSpPr>
-            <a:spLocks noGrp="1"/>
-          </p:cNvSpPr>
-          <p:nvPr>
-            <p:ph type="body" sz="half" idx="2"/>
-          </p:nvPr>
-        </p:nvSpPr>
-        <p:spPr>
-          <a:xfrm>
-            <a:off x="838199" y="2057399"/>
-            <a:ext cx="2381394" cy="3811588"/>
-          </a:xfrm>
-        </p:spPr>
-        <p:txBody>
-          <a:bodyPr/>
-          <a:lstStyle/>
-          <a:p>
-            <a:endParaRPr lang="de-DE" dirty="0"/>
-          </a:p>
-        </p:txBody>
-      </p:sp>
       <p:sp>
         <p:nvSpPr>
           <p:cNvPr id="4" name="Datumsplatzhalter 3"/>
@@ -37766,47 +37733,56 @@
       </p:sp>
       <p:sp>
         <p:nvSpPr>
-          <p:cNvPr id="2" name="Titel 1"/>
-          <p:cNvSpPr>
-            <a:spLocks noGrp="1"/>
-          </p:cNvSpPr>
-          <p:nvPr>
-            <p:ph type="title"/>
-          </p:nvPr>
+          <p:cNvPr id="9" name="Rechteck 8"/>
+          <p:cNvSpPr/>
+          <p:nvPr/>
         </p:nvSpPr>
         <p:spPr>
           <a:xfrm>
-            <a:off x="839788" y="595222"/>
-            <a:ext cx="4343400" cy="1462177"/>
+            <a:off x="1496132" y="1646238"/>
+            <a:ext cx="2098430" cy="4530725"/>
           </a:xfrm>
+          <a:prstGeom prst="rect">
+            <a:avLst/>
+          </a:prstGeom>
+          <a:solidFill>
+            <a:schemeClr val="bg1"/>
+          </a:solidFill>
+          <a:ln>
+            <a:solidFill>
+              <a:schemeClr val="bg1"/>
+            </a:solidFill>
+          </a:ln>
         </p:spPr>
+        <p:style>
+          <a:lnRef idx="2">
+            <a:schemeClr val="accent1">
+              <a:shade val="50000"/>
+            </a:schemeClr>
+          </a:lnRef>
+          <a:fillRef idx="1">
+            <a:schemeClr val="accent1"/>
+          </a:fillRef>
+          <a:effectRef idx="0">
+            <a:schemeClr val="accent1"/>
+          </a:effectRef>
+          <a:fontRef idx="minor">
+            <a:schemeClr val="lt1"/>
+          </a:fontRef>
+        </p:style>
         <p:txBody>
-          <a:bodyPr/>
+          <a:bodyPr rtlCol="0" anchor="ctr"/>
           <a:lstStyle/>
           <a:p>
-            <a:r>
-              <a:rPr lang="de-DE" dirty="0"/>
-              <a:t>Schnittstelle </a:t>
-            </a:r>
-            <a:br>
-              <a:rPr lang="de-DE" dirty="0"/>
-            </a:br>
-            <a:r>
-              <a:rPr lang="de-DE" dirty="0"/>
-              <a:t>Speech </a:t>
-            </a:r>
-            <a:r>
-              <a:rPr lang="de-DE" dirty="0" err="1"/>
-              <a:t>Tokenizer</a:t>
-            </a:r>
-            <a:endParaRPr lang="de-DE" dirty="0"/>
+            <a:pPr algn="ctr"/>
+            <a:endParaRPr lang="de-DE"/>
           </a:p>
         </p:txBody>
       </p:sp>
     </p:spTree>
     <p:extLst>
       <p:ext uri="{BB962C8B-B14F-4D97-AF65-F5344CB8AC3E}">
-        <p14:creationId xmlns:p14="http://schemas.microsoft.com/office/powerpoint/2010/main" val="3649198627"/>
+        <p14:creationId xmlns:p14="http://schemas.microsoft.com/office/powerpoint/2010/main" val="3691089861"/>
       </p:ext>
     </p:extLst>
   </p:cSld>
@@ -37817,190 +37793,6 @@
 </file>
 
 <file path=ppt/slides/slide15.xml><?xml version="1.0" encoding="utf-8"?>
-<p:sld xmlns:a="http://schemas.openxmlformats.org/drawingml/2006/main" xmlns:r="http://schemas.openxmlformats.org/officeDocument/2006/relationships" xmlns:p="http://schemas.openxmlformats.org/presentationml/2006/main">
-  <p:cSld>
-    <p:spTree>
-      <p:nvGrpSpPr>
-        <p:cNvPr id="1" name=""/>
-        <p:cNvGrpSpPr/>
-        <p:nvPr/>
-      </p:nvGrpSpPr>
-      <p:grpSpPr>
-        <a:xfrm>
-          <a:off x="0" y="0"/>
-          <a:ext cx="0" cy="0"/>
-          <a:chOff x="0" y="0"/>
-          <a:chExt cx="0" cy="0"/>
-        </a:xfrm>
-      </p:grpSpPr>
-      <p:pic>
-        <p:nvPicPr>
-          <p:cNvPr id="9" name="Inhaltsplatzhalter 8"/>
-          <p:cNvPicPr>
-            <a:picLocks noGrp="1" noChangeAspect="1"/>
-          </p:cNvPicPr>
-          <p:nvPr>
-            <p:ph idx="1"/>
-          </p:nvPr>
-        </p:nvPicPr>
-        <p:blipFill>
-          <a:blip r:embed="rId3">
-            <a:extLst>
-              <a:ext uri="{28A0092B-C50C-407E-A947-70E740481C1C}">
-                <a14:useLocalDpi xmlns:a14="http://schemas.microsoft.com/office/drawing/2010/main" val="0"/>
-              </a:ext>
-            </a:extLst>
-          </a:blip>
-          <a:stretch>
-            <a:fillRect/>
-          </a:stretch>
-        </p:blipFill>
-        <p:spPr>
-          <a:xfrm>
-            <a:off x="4146856" y="1188987"/>
-            <a:ext cx="7484104" cy="4680000"/>
-          </a:xfrm>
-        </p:spPr>
-      </p:pic>
-      <p:sp>
-        <p:nvSpPr>
-          <p:cNvPr id="8" name="Textplatzhalter 7"/>
-          <p:cNvSpPr>
-            <a:spLocks noGrp="1"/>
-          </p:cNvSpPr>
-          <p:nvPr>
-            <p:ph type="body" sz="half" idx="2"/>
-          </p:nvPr>
-        </p:nvSpPr>
-        <p:spPr>
-          <a:xfrm>
-            <a:off x="838199" y="2057399"/>
-            <a:ext cx="2381394" cy="3811588"/>
-          </a:xfrm>
-        </p:spPr>
-        <p:txBody>
-          <a:bodyPr/>
-          <a:lstStyle/>
-          <a:p>
-            <a:endParaRPr lang="de-DE" dirty="0"/>
-          </a:p>
-        </p:txBody>
-      </p:sp>
-      <p:sp>
-        <p:nvSpPr>
-          <p:cNvPr id="4" name="Datumsplatzhalter 3"/>
-          <p:cNvSpPr>
-            <a:spLocks noGrp="1"/>
-          </p:cNvSpPr>
-          <p:nvPr>
-            <p:ph type="dt" sz="half" idx="10"/>
-          </p:nvPr>
-        </p:nvSpPr>
-        <p:spPr/>
-        <p:txBody>
-          <a:bodyPr/>
-          <a:lstStyle/>
-          <a:p>
-            <a:r>
-              <a:rPr lang="de-DE"/>
-              <a:t>25.04.2017</a:t>
-            </a:r>
-          </a:p>
-        </p:txBody>
-      </p:sp>
-      <p:sp>
-        <p:nvSpPr>
-          <p:cNvPr id="5" name="Fußzeilenplatzhalter 4"/>
-          <p:cNvSpPr>
-            <a:spLocks noGrp="1"/>
-          </p:cNvSpPr>
-          <p:nvPr>
-            <p:ph type="ftr" sz="quarter" idx="11"/>
-          </p:nvPr>
-        </p:nvSpPr>
-        <p:spPr/>
-        <p:txBody>
-          <a:bodyPr/>
-          <a:lstStyle/>
-          <a:p>
-            <a:r>
-              <a:rPr lang="de-DE"/>
-              <a:t>Florian Blessing, Lisa Böhler, Markus Götz, Jan Habersetzer, Wendelin Herrmann</a:t>
-            </a:r>
-          </a:p>
-        </p:txBody>
-      </p:sp>
-      <p:sp>
-        <p:nvSpPr>
-          <p:cNvPr id="6" name="Foliennummernplatzhalter 5"/>
-          <p:cNvSpPr>
-            <a:spLocks noGrp="1"/>
-          </p:cNvSpPr>
-          <p:nvPr>
-            <p:ph type="sldNum" sz="quarter" idx="12"/>
-          </p:nvPr>
-        </p:nvSpPr>
-        <p:spPr/>
-        <p:txBody>
-          <a:bodyPr/>
-          <a:lstStyle/>
-          <a:p>
-            <a:fld id="{9A8D1588-5235-4A3E-9519-E5C37E4E16B7}" type="slidenum">
-              <a:rPr lang="de-DE" smtClean="0"/>
-              <a:t>15</a:t>
-            </a:fld>
-            <a:endParaRPr lang="de-DE"/>
-          </a:p>
-        </p:txBody>
-      </p:sp>
-      <p:sp>
-        <p:nvSpPr>
-          <p:cNvPr id="2" name="Titel 1"/>
-          <p:cNvSpPr>
-            <a:spLocks noGrp="1"/>
-          </p:cNvSpPr>
-          <p:nvPr>
-            <p:ph type="title"/>
-          </p:nvPr>
-        </p:nvSpPr>
-        <p:spPr>
-          <a:xfrm>
-            <a:off x="839788" y="595222"/>
-            <a:ext cx="4343400" cy="1462177"/>
-          </a:xfrm>
-        </p:spPr>
-        <p:txBody>
-          <a:bodyPr/>
-          <a:lstStyle/>
-          <a:p>
-            <a:r>
-              <a:rPr lang="de-DE" dirty="0"/>
-              <a:t>Schnittstelle </a:t>
-            </a:r>
-            <a:br>
-              <a:rPr lang="de-DE" dirty="0"/>
-            </a:br>
-            <a:r>
-              <a:rPr lang="de-DE" dirty="0"/>
-              <a:t>User</a:t>
-            </a:r>
-          </a:p>
-        </p:txBody>
-      </p:sp>
-    </p:spTree>
-    <p:extLst>
-      <p:ext uri="{BB962C8B-B14F-4D97-AF65-F5344CB8AC3E}">
-        <p14:creationId xmlns:p14="http://schemas.microsoft.com/office/powerpoint/2010/main" val="2038653466"/>
-      </p:ext>
-    </p:extLst>
-  </p:cSld>
-  <p:clrMapOvr>
-    <a:masterClrMapping/>
-  </p:clrMapOvr>
-</p:sld>
-</file>
-
-<file path=ppt/slides/slide16.xml><?xml version="1.0" encoding="utf-8"?>
 <p:sld xmlns:a="http://schemas.openxmlformats.org/drawingml/2006/main" xmlns:r="http://schemas.openxmlformats.org/officeDocument/2006/relationships" xmlns:p="http://schemas.openxmlformats.org/presentationml/2006/main">
   <p:cSld>
     <p:spTree>
@@ -38033,6 +37825,660 @@
           <a:lstStyle/>
           <a:p>
             <a:r>
+              <a:rPr lang="de-DE"/>
+              <a:t>Schnittstelle Speech Tokenizer</a:t>
+            </a:r>
+            <a:endParaRPr lang="de-DE" dirty="0"/>
+          </a:p>
+        </p:txBody>
+      </p:sp>
+      <p:pic>
+        <p:nvPicPr>
+          <p:cNvPr id="9" name="Inhaltsplatzhalter 8"/>
+          <p:cNvPicPr>
+            <a:picLocks noGrp="1" noChangeAspect="1"/>
+          </p:cNvPicPr>
+          <p:nvPr>
+            <p:ph idx="1"/>
+          </p:nvPr>
+        </p:nvPicPr>
+        <p:blipFill>
+          <a:blip r:embed="rId2">
+            <a:extLst>
+              <a:ext uri="{28A0092B-C50C-407E-A947-70E740481C1C}">
+                <a14:useLocalDpi xmlns:a14="http://schemas.microsoft.com/office/drawing/2010/main" val="0"/>
+              </a:ext>
+            </a:extLst>
+          </a:blip>
+          <a:stretch>
+            <a:fillRect/>
+          </a:stretch>
+        </p:blipFill>
+        <p:spPr>
+          <a:xfrm>
+            <a:off x="2081938" y="1825625"/>
+            <a:ext cx="8028123" cy="4351338"/>
+          </a:xfrm>
+        </p:spPr>
+      </p:pic>
+      <p:sp>
+        <p:nvSpPr>
+          <p:cNvPr id="4" name="Datumsplatzhalter 3"/>
+          <p:cNvSpPr>
+            <a:spLocks noGrp="1"/>
+          </p:cNvSpPr>
+          <p:nvPr>
+            <p:ph type="dt" sz="half" idx="10"/>
+          </p:nvPr>
+        </p:nvSpPr>
+        <p:spPr/>
+        <p:txBody>
+          <a:bodyPr/>
+          <a:lstStyle/>
+          <a:p>
+            <a:r>
+              <a:rPr lang="de-DE"/>
+              <a:t>25.04.2017</a:t>
+            </a:r>
+          </a:p>
+        </p:txBody>
+      </p:sp>
+      <p:sp>
+        <p:nvSpPr>
+          <p:cNvPr id="5" name="Fußzeilenplatzhalter 4"/>
+          <p:cNvSpPr>
+            <a:spLocks noGrp="1"/>
+          </p:cNvSpPr>
+          <p:nvPr>
+            <p:ph type="ftr" sz="quarter" idx="11"/>
+          </p:nvPr>
+        </p:nvSpPr>
+        <p:spPr/>
+        <p:txBody>
+          <a:bodyPr/>
+          <a:lstStyle/>
+          <a:p>
+            <a:r>
+              <a:rPr lang="de-DE"/>
+              <a:t>Florian Blessing, Lisa Böhler, Markus Götz, Jan Habersetzer, Wendelin Herrmann</a:t>
+            </a:r>
+          </a:p>
+        </p:txBody>
+      </p:sp>
+      <p:sp>
+        <p:nvSpPr>
+          <p:cNvPr id="6" name="Foliennummernplatzhalter 5"/>
+          <p:cNvSpPr>
+            <a:spLocks noGrp="1"/>
+          </p:cNvSpPr>
+          <p:nvPr>
+            <p:ph type="sldNum" sz="quarter" idx="12"/>
+          </p:nvPr>
+        </p:nvSpPr>
+        <p:spPr/>
+        <p:txBody>
+          <a:bodyPr/>
+          <a:lstStyle/>
+          <a:p>
+            <a:fld id="{9A8D1588-5235-4A3E-9519-E5C37E4E16B7}" type="slidenum">
+              <a:rPr lang="de-DE" smtClean="0"/>
+              <a:pPr/>
+              <a:t>15</a:t>
+            </a:fld>
+            <a:endParaRPr lang="de-DE"/>
+          </a:p>
+        </p:txBody>
+      </p:sp>
+    </p:spTree>
+    <p:extLst>
+      <p:ext uri="{BB962C8B-B14F-4D97-AF65-F5344CB8AC3E}">
+        <p14:creationId xmlns:p14="http://schemas.microsoft.com/office/powerpoint/2010/main" val="3649198627"/>
+      </p:ext>
+    </p:extLst>
+  </p:cSld>
+  <p:clrMapOvr>
+    <a:masterClrMapping/>
+  </p:clrMapOvr>
+</p:sld>
+</file>
+
+<file path=ppt/slides/slide16.xml><?xml version="1.0" encoding="utf-8"?>
+<p:sld xmlns:a="http://schemas.openxmlformats.org/drawingml/2006/main" xmlns:r="http://schemas.openxmlformats.org/officeDocument/2006/relationships" xmlns:p="http://schemas.openxmlformats.org/presentationml/2006/main">
+  <p:cSld>
+    <p:spTree>
+      <p:nvGrpSpPr>
+        <p:cNvPr id="1" name=""/>
+        <p:cNvGrpSpPr/>
+        <p:nvPr/>
+      </p:nvGrpSpPr>
+      <p:grpSpPr>
+        <a:xfrm>
+          <a:off x="0" y="0"/>
+          <a:ext cx="0" cy="0"/>
+          <a:chOff x="0" y="0"/>
+          <a:chExt cx="0" cy="0"/>
+        </a:xfrm>
+      </p:grpSpPr>
+      <p:sp>
+        <p:nvSpPr>
+          <p:cNvPr id="7" name="Titel 6"/>
+          <p:cNvSpPr>
+            <a:spLocks noGrp="1"/>
+          </p:cNvSpPr>
+          <p:nvPr>
+            <p:ph type="title"/>
+          </p:nvPr>
+        </p:nvSpPr>
+        <p:spPr/>
+        <p:txBody>
+          <a:bodyPr>
+            <a:normAutofit/>
+          </a:bodyPr>
+          <a:lstStyle/>
+          <a:p>
+            <a:r>
+              <a:rPr lang="de-DE" dirty="0"/>
+              <a:t>Protokoll Speech </a:t>
+            </a:r>
+            <a:r>
+              <a:rPr lang="de-DE" dirty="0" err="1"/>
+              <a:t>Tokenizer</a:t>
+            </a:r>
+            <a:r>
+              <a:rPr lang="de-DE" dirty="0"/>
+              <a:t> Schnittstelle</a:t>
+            </a:r>
+          </a:p>
+        </p:txBody>
+      </p:sp>
+      <p:pic>
+        <p:nvPicPr>
+          <p:cNvPr id="9" name="Inhaltsplatzhalter 8"/>
+          <p:cNvPicPr>
+            <a:picLocks noGrp="1" noChangeAspect="1"/>
+          </p:cNvPicPr>
+          <p:nvPr>
+            <p:ph idx="1"/>
+          </p:nvPr>
+        </p:nvPicPr>
+        <p:blipFill>
+          <a:blip r:embed="rId2">
+            <a:extLst>
+              <a:ext uri="{28A0092B-C50C-407E-A947-70E740481C1C}">
+                <a14:useLocalDpi xmlns:a14="http://schemas.microsoft.com/office/drawing/2010/main" val="0"/>
+              </a:ext>
+            </a:extLst>
+          </a:blip>
+          <a:stretch>
+            <a:fillRect/>
+          </a:stretch>
+        </p:blipFill>
+        <p:spPr>
+          <a:xfrm>
+            <a:off x="3542800" y="1825625"/>
+            <a:ext cx="5106400" cy="4351338"/>
+          </a:xfrm>
+        </p:spPr>
+      </p:pic>
+      <p:sp>
+        <p:nvSpPr>
+          <p:cNvPr id="4" name="Datumsplatzhalter 3"/>
+          <p:cNvSpPr>
+            <a:spLocks noGrp="1"/>
+          </p:cNvSpPr>
+          <p:nvPr>
+            <p:ph type="dt" sz="half" idx="10"/>
+          </p:nvPr>
+        </p:nvSpPr>
+        <p:spPr/>
+        <p:txBody>
+          <a:bodyPr/>
+          <a:lstStyle/>
+          <a:p>
+            <a:r>
+              <a:rPr lang="de-DE"/>
+              <a:t>25.04.2017</a:t>
+            </a:r>
+          </a:p>
+        </p:txBody>
+      </p:sp>
+      <p:sp>
+        <p:nvSpPr>
+          <p:cNvPr id="5" name="Fußzeilenplatzhalter 4"/>
+          <p:cNvSpPr>
+            <a:spLocks noGrp="1"/>
+          </p:cNvSpPr>
+          <p:nvPr>
+            <p:ph type="ftr" sz="quarter" idx="11"/>
+          </p:nvPr>
+        </p:nvSpPr>
+        <p:spPr/>
+        <p:txBody>
+          <a:bodyPr/>
+          <a:lstStyle/>
+          <a:p>
+            <a:r>
+              <a:rPr lang="de-DE"/>
+              <a:t>Florian Blessing, Lisa Böhler, Markus Götz, Jan Habersetzer, Wendelin Herrmann</a:t>
+            </a:r>
+          </a:p>
+        </p:txBody>
+      </p:sp>
+      <p:sp>
+        <p:nvSpPr>
+          <p:cNvPr id="6" name="Foliennummernplatzhalter 5"/>
+          <p:cNvSpPr>
+            <a:spLocks noGrp="1"/>
+          </p:cNvSpPr>
+          <p:nvPr>
+            <p:ph type="sldNum" sz="quarter" idx="12"/>
+          </p:nvPr>
+        </p:nvSpPr>
+        <p:spPr/>
+        <p:txBody>
+          <a:bodyPr/>
+          <a:lstStyle/>
+          <a:p>
+            <a:fld id="{9A8D1588-5235-4A3E-9519-E5C37E4E16B7}" type="slidenum">
+              <a:rPr lang="de-DE" smtClean="0"/>
+              <a:t>16</a:t>
+            </a:fld>
+            <a:endParaRPr lang="de-DE"/>
+          </a:p>
+        </p:txBody>
+      </p:sp>
+      <p:sp>
+        <p:nvSpPr>
+          <p:cNvPr id="10" name="Rechteck 9"/>
+          <p:cNvSpPr/>
+          <p:nvPr/>
+        </p:nvSpPr>
+        <p:spPr>
+          <a:xfrm>
+            <a:off x="1444370" y="1646238"/>
+            <a:ext cx="2098430" cy="4530725"/>
+          </a:xfrm>
+          <a:prstGeom prst="rect">
+            <a:avLst/>
+          </a:prstGeom>
+          <a:solidFill>
+            <a:schemeClr val="bg1"/>
+          </a:solidFill>
+          <a:ln>
+            <a:solidFill>
+              <a:schemeClr val="bg1"/>
+            </a:solidFill>
+          </a:ln>
+        </p:spPr>
+        <p:style>
+          <a:lnRef idx="2">
+            <a:schemeClr val="accent1">
+              <a:shade val="50000"/>
+            </a:schemeClr>
+          </a:lnRef>
+          <a:fillRef idx="1">
+            <a:schemeClr val="accent1"/>
+          </a:fillRef>
+          <a:effectRef idx="0">
+            <a:schemeClr val="accent1"/>
+          </a:effectRef>
+          <a:fontRef idx="minor">
+            <a:schemeClr val="lt1"/>
+          </a:fontRef>
+        </p:style>
+        <p:txBody>
+          <a:bodyPr rtlCol="0" anchor="ctr"/>
+          <a:lstStyle/>
+          <a:p>
+            <a:pPr algn="ctr"/>
+            <a:endParaRPr lang="de-DE"/>
+          </a:p>
+        </p:txBody>
+      </p:sp>
+    </p:spTree>
+    <p:extLst>
+      <p:ext uri="{BB962C8B-B14F-4D97-AF65-F5344CB8AC3E}">
+        <p14:creationId xmlns:p14="http://schemas.microsoft.com/office/powerpoint/2010/main" val="1324577500"/>
+      </p:ext>
+    </p:extLst>
+  </p:cSld>
+  <p:clrMapOvr>
+    <a:masterClrMapping/>
+  </p:clrMapOvr>
+</p:sld>
+</file>
+
+<file path=ppt/slides/slide17.xml><?xml version="1.0" encoding="utf-8"?>
+<p:sld xmlns:a="http://schemas.openxmlformats.org/drawingml/2006/main" xmlns:r="http://schemas.openxmlformats.org/officeDocument/2006/relationships" xmlns:p="http://schemas.openxmlformats.org/presentationml/2006/main">
+  <p:cSld>
+    <p:spTree>
+      <p:nvGrpSpPr>
+        <p:cNvPr id="1" name=""/>
+        <p:cNvGrpSpPr/>
+        <p:nvPr/>
+      </p:nvGrpSpPr>
+      <p:grpSpPr>
+        <a:xfrm>
+          <a:off x="0" y="0"/>
+          <a:ext cx="0" cy="0"/>
+          <a:chOff x="0" y="0"/>
+          <a:chExt cx="0" cy="0"/>
+        </a:xfrm>
+      </p:grpSpPr>
+      <p:sp>
+        <p:nvSpPr>
+          <p:cNvPr id="2" name="Titel 1"/>
+          <p:cNvSpPr>
+            <a:spLocks noGrp="1"/>
+          </p:cNvSpPr>
+          <p:nvPr>
+            <p:ph type="title"/>
+          </p:nvPr>
+        </p:nvSpPr>
+        <p:spPr/>
+        <p:txBody>
+          <a:bodyPr/>
+          <a:lstStyle/>
+          <a:p>
+            <a:r>
+              <a:rPr lang="de-DE"/>
+              <a:t>Schnittstelle User</a:t>
+            </a:r>
+            <a:endParaRPr lang="de-DE" dirty="0"/>
+          </a:p>
+        </p:txBody>
+      </p:sp>
+      <p:pic>
+        <p:nvPicPr>
+          <p:cNvPr id="9" name="Inhaltsplatzhalter 8"/>
+          <p:cNvPicPr>
+            <a:picLocks noGrp="1" noChangeAspect="1"/>
+          </p:cNvPicPr>
+          <p:nvPr>
+            <p:ph idx="1"/>
+          </p:nvPr>
+        </p:nvPicPr>
+        <p:blipFill>
+          <a:blip r:embed="rId3">
+            <a:extLst>
+              <a:ext uri="{28A0092B-C50C-407E-A947-70E740481C1C}">
+                <a14:useLocalDpi xmlns:a14="http://schemas.microsoft.com/office/drawing/2010/main" val="0"/>
+              </a:ext>
+            </a:extLst>
+          </a:blip>
+          <a:stretch>
+            <a:fillRect/>
+          </a:stretch>
+        </p:blipFill>
+        <p:spPr>
+          <a:xfrm>
+            <a:off x="2616740" y="1825625"/>
+            <a:ext cx="6958519" cy="4351338"/>
+          </a:xfrm>
+        </p:spPr>
+      </p:pic>
+      <p:sp>
+        <p:nvSpPr>
+          <p:cNvPr id="4" name="Datumsplatzhalter 3"/>
+          <p:cNvSpPr>
+            <a:spLocks noGrp="1"/>
+          </p:cNvSpPr>
+          <p:nvPr>
+            <p:ph type="dt" sz="half" idx="10"/>
+          </p:nvPr>
+        </p:nvSpPr>
+        <p:spPr/>
+        <p:txBody>
+          <a:bodyPr/>
+          <a:lstStyle/>
+          <a:p>
+            <a:r>
+              <a:rPr lang="de-DE"/>
+              <a:t>25.04.2017</a:t>
+            </a:r>
+          </a:p>
+        </p:txBody>
+      </p:sp>
+      <p:sp>
+        <p:nvSpPr>
+          <p:cNvPr id="5" name="Fußzeilenplatzhalter 4"/>
+          <p:cNvSpPr>
+            <a:spLocks noGrp="1"/>
+          </p:cNvSpPr>
+          <p:nvPr>
+            <p:ph type="ftr" sz="quarter" idx="11"/>
+          </p:nvPr>
+        </p:nvSpPr>
+        <p:spPr/>
+        <p:txBody>
+          <a:bodyPr/>
+          <a:lstStyle/>
+          <a:p>
+            <a:r>
+              <a:rPr lang="de-DE"/>
+              <a:t>Florian Blessing, Lisa Böhler, Markus Götz, Jan Habersetzer, Wendelin Herrmann</a:t>
+            </a:r>
+          </a:p>
+        </p:txBody>
+      </p:sp>
+      <p:sp>
+        <p:nvSpPr>
+          <p:cNvPr id="6" name="Foliennummernplatzhalter 5"/>
+          <p:cNvSpPr>
+            <a:spLocks noGrp="1"/>
+          </p:cNvSpPr>
+          <p:nvPr>
+            <p:ph type="sldNum" sz="quarter" idx="12"/>
+          </p:nvPr>
+        </p:nvSpPr>
+        <p:spPr/>
+        <p:txBody>
+          <a:bodyPr/>
+          <a:lstStyle/>
+          <a:p>
+            <a:fld id="{9A8D1588-5235-4A3E-9519-E5C37E4E16B7}" type="slidenum">
+              <a:rPr lang="de-DE" smtClean="0"/>
+              <a:pPr/>
+              <a:t>17</a:t>
+            </a:fld>
+            <a:endParaRPr lang="de-DE"/>
+          </a:p>
+        </p:txBody>
+      </p:sp>
+    </p:spTree>
+    <p:extLst>
+      <p:ext uri="{BB962C8B-B14F-4D97-AF65-F5344CB8AC3E}">
+        <p14:creationId xmlns:p14="http://schemas.microsoft.com/office/powerpoint/2010/main" val="2038653466"/>
+      </p:ext>
+    </p:extLst>
+  </p:cSld>
+  <p:clrMapOvr>
+    <a:masterClrMapping/>
+  </p:clrMapOvr>
+</p:sld>
+</file>
+
+<file path=ppt/slides/slide18.xml><?xml version="1.0" encoding="utf-8"?>
+<p:sld xmlns:a="http://schemas.openxmlformats.org/drawingml/2006/main" xmlns:r="http://schemas.openxmlformats.org/officeDocument/2006/relationships" xmlns:p="http://schemas.openxmlformats.org/presentationml/2006/main">
+  <p:cSld>
+    <p:spTree>
+      <p:nvGrpSpPr>
+        <p:cNvPr id="1" name=""/>
+        <p:cNvGrpSpPr/>
+        <p:nvPr/>
+      </p:nvGrpSpPr>
+      <p:grpSpPr>
+        <a:xfrm>
+          <a:off x="0" y="0"/>
+          <a:ext cx="0" cy="0"/>
+          <a:chOff x="0" y="0"/>
+          <a:chExt cx="0" cy="0"/>
+        </a:xfrm>
+      </p:grpSpPr>
+      <p:sp>
+        <p:nvSpPr>
+          <p:cNvPr id="2" name="Titel 1"/>
+          <p:cNvSpPr>
+            <a:spLocks noGrp="1"/>
+          </p:cNvSpPr>
+          <p:nvPr>
+            <p:ph type="title"/>
+          </p:nvPr>
+        </p:nvSpPr>
+        <p:spPr/>
+        <p:txBody>
+          <a:bodyPr/>
+          <a:lstStyle/>
+          <a:p>
+            <a:r>
+              <a:rPr lang="de-DE" dirty="0"/>
+              <a:t>Protokoll User Schnittstelle</a:t>
+            </a:r>
+          </a:p>
+        </p:txBody>
+      </p:sp>
+      <p:pic>
+        <p:nvPicPr>
+          <p:cNvPr id="8" name="Inhaltsplatzhalter 7"/>
+          <p:cNvPicPr>
+            <a:picLocks noGrp="1" noChangeAspect="1"/>
+          </p:cNvPicPr>
+          <p:nvPr>
+            <p:ph idx="1"/>
+          </p:nvPr>
+        </p:nvPicPr>
+        <p:blipFill>
+          <a:blip r:embed="rId2">
+            <a:extLst>
+              <a:ext uri="{28A0092B-C50C-407E-A947-70E740481C1C}">
+                <a14:useLocalDpi xmlns:a14="http://schemas.microsoft.com/office/drawing/2010/main" val="0"/>
+              </a:ext>
+            </a:extLst>
+          </a:blip>
+          <a:stretch>
+            <a:fillRect/>
+          </a:stretch>
+        </p:blipFill>
+        <p:spPr>
+          <a:xfrm>
+            <a:off x="3620747" y="1825625"/>
+            <a:ext cx="4950506" cy="4351338"/>
+          </a:xfrm>
+        </p:spPr>
+      </p:pic>
+      <p:sp>
+        <p:nvSpPr>
+          <p:cNvPr id="4" name="Datumsplatzhalter 3"/>
+          <p:cNvSpPr>
+            <a:spLocks noGrp="1"/>
+          </p:cNvSpPr>
+          <p:nvPr>
+            <p:ph type="dt" sz="half" idx="10"/>
+          </p:nvPr>
+        </p:nvSpPr>
+        <p:spPr/>
+        <p:txBody>
+          <a:bodyPr/>
+          <a:lstStyle/>
+          <a:p>
+            <a:r>
+              <a:rPr lang="de-DE"/>
+              <a:t>25.04.2017</a:t>
+            </a:r>
+          </a:p>
+        </p:txBody>
+      </p:sp>
+      <p:sp>
+        <p:nvSpPr>
+          <p:cNvPr id="5" name="Fußzeilenplatzhalter 4"/>
+          <p:cNvSpPr>
+            <a:spLocks noGrp="1"/>
+          </p:cNvSpPr>
+          <p:nvPr>
+            <p:ph type="ftr" sz="quarter" idx="11"/>
+          </p:nvPr>
+        </p:nvSpPr>
+        <p:spPr/>
+        <p:txBody>
+          <a:bodyPr/>
+          <a:lstStyle/>
+          <a:p>
+            <a:r>
+              <a:rPr lang="de-DE"/>
+              <a:t>Florian Blessing, Lisa Böhler, Markus Götz, Jan Habersetzer, Wendelin Herrmann</a:t>
+            </a:r>
+          </a:p>
+        </p:txBody>
+      </p:sp>
+      <p:sp>
+        <p:nvSpPr>
+          <p:cNvPr id="6" name="Foliennummernplatzhalter 5"/>
+          <p:cNvSpPr>
+            <a:spLocks noGrp="1"/>
+          </p:cNvSpPr>
+          <p:nvPr>
+            <p:ph type="sldNum" sz="quarter" idx="12"/>
+          </p:nvPr>
+        </p:nvSpPr>
+        <p:spPr/>
+        <p:txBody>
+          <a:bodyPr/>
+          <a:lstStyle/>
+          <a:p>
+            <a:fld id="{9A8D1588-5235-4A3E-9519-E5C37E4E16B7}" type="slidenum">
+              <a:rPr lang="de-DE" smtClean="0"/>
+              <a:t>18</a:t>
+            </a:fld>
+            <a:endParaRPr lang="de-DE"/>
+          </a:p>
+        </p:txBody>
+      </p:sp>
+    </p:spTree>
+    <p:extLst>
+      <p:ext uri="{BB962C8B-B14F-4D97-AF65-F5344CB8AC3E}">
+        <p14:creationId xmlns:p14="http://schemas.microsoft.com/office/powerpoint/2010/main" val="3732515555"/>
+      </p:ext>
+    </p:extLst>
+  </p:cSld>
+  <p:clrMapOvr>
+    <a:masterClrMapping/>
+  </p:clrMapOvr>
+</p:sld>
+</file>
+
+<file path=ppt/slides/slide19.xml><?xml version="1.0" encoding="utf-8"?>
+<p:sld xmlns:a="http://schemas.openxmlformats.org/drawingml/2006/main" xmlns:r="http://schemas.openxmlformats.org/officeDocument/2006/relationships" xmlns:p="http://schemas.openxmlformats.org/presentationml/2006/main">
+  <p:cSld>
+    <p:spTree>
+      <p:nvGrpSpPr>
+        <p:cNvPr id="1" name=""/>
+        <p:cNvGrpSpPr/>
+        <p:nvPr/>
+      </p:nvGrpSpPr>
+      <p:grpSpPr>
+        <a:xfrm>
+          <a:off x="0" y="0"/>
+          <a:ext cx="0" cy="0"/>
+          <a:chOff x="0" y="0"/>
+          <a:chExt cx="0" cy="0"/>
+        </a:xfrm>
+      </p:grpSpPr>
+      <p:sp>
+        <p:nvSpPr>
+          <p:cNvPr id="2" name="Titel 1"/>
+          <p:cNvSpPr>
+            <a:spLocks noGrp="1"/>
+          </p:cNvSpPr>
+          <p:nvPr>
+            <p:ph type="title"/>
+          </p:nvPr>
+        </p:nvSpPr>
+        <p:spPr/>
+        <p:txBody>
+          <a:bodyPr/>
+          <a:lstStyle/>
+          <a:p>
+            <a:r>
               <a:rPr lang="de-DE" dirty="0"/>
               <a:t>UX Entwicklung</a:t>
             </a:r>
@@ -38119,7 +38565,7 @@
           <a:p>
             <a:fld id="{9A8D1588-5235-4A3E-9519-E5C37E4E16B7}" type="slidenum">
               <a:rPr lang="de-DE" smtClean="0"/>
-              <a:t>16</a:t>
+              <a:t>19</a:t>
             </a:fld>
             <a:endParaRPr lang="de-DE"/>
           </a:p>
@@ -38138,7 +38584,151 @@
 </p:sld>
 </file>
 
-<file path=ppt/slides/slide17.xml><?xml version="1.0" encoding="utf-8"?>
+<file path=ppt/slides/slide2.xml><?xml version="1.0" encoding="utf-8"?>
+<p:sld xmlns:a="http://schemas.openxmlformats.org/drawingml/2006/main" xmlns:r="http://schemas.openxmlformats.org/officeDocument/2006/relationships" xmlns:p="http://schemas.openxmlformats.org/presentationml/2006/main">
+  <p:cSld>
+    <p:spTree>
+      <p:nvGrpSpPr>
+        <p:cNvPr id="1" name=""/>
+        <p:cNvGrpSpPr/>
+        <p:nvPr/>
+      </p:nvGrpSpPr>
+      <p:grpSpPr>
+        <a:xfrm>
+          <a:off x="0" y="0"/>
+          <a:ext cx="0" cy="0"/>
+          <a:chOff x="0" y="0"/>
+          <a:chExt cx="0" cy="0"/>
+        </a:xfrm>
+      </p:grpSpPr>
+      <p:sp>
+        <p:nvSpPr>
+          <p:cNvPr id="2" name="Titel 1"/>
+          <p:cNvSpPr>
+            <a:spLocks noGrp="1"/>
+          </p:cNvSpPr>
+          <p:nvPr>
+            <p:ph type="title"/>
+          </p:nvPr>
+        </p:nvSpPr>
+        <p:spPr/>
+        <p:txBody>
+          <a:bodyPr/>
+          <a:lstStyle/>
+          <a:p>
+            <a:r>
+              <a:rPr lang="de-DE" dirty="0"/>
+              <a:t>AGENDA</a:t>
+            </a:r>
+          </a:p>
+        </p:txBody>
+      </p:sp>
+      <p:graphicFrame>
+        <p:nvGraphicFramePr>
+          <p:cNvPr id="11" name="Inhaltsplatzhalter 10"/>
+          <p:cNvGraphicFramePr>
+            <a:graphicFrameLocks noGrp="1"/>
+          </p:cNvGraphicFramePr>
+          <p:nvPr>
+            <p:ph idx="1"/>
+            <p:extLst>
+              <p:ext uri="{D42A27DB-BD31-4B8C-83A1-F6EECF244321}">
+                <p14:modId xmlns:p14="http://schemas.microsoft.com/office/powerpoint/2010/main" val="1755907837"/>
+              </p:ext>
+            </p:extLst>
+          </p:nvPr>
+        </p:nvGraphicFramePr>
+        <p:xfrm>
+          <a:off x="838200" y="2651036"/>
+          <a:ext cx="10515600" cy="1555929"/>
+        </p:xfrm>
+        <a:graphic>
+          <a:graphicData uri="http://schemas.openxmlformats.org/drawingml/2006/diagram">
+            <dgm:relIds xmlns:dgm="http://schemas.openxmlformats.org/drawingml/2006/diagram" xmlns:r="http://schemas.openxmlformats.org/officeDocument/2006/relationships" r:dm="rId2" r:lo="rId3" r:qs="rId4" r:cs="rId5"/>
+          </a:graphicData>
+        </a:graphic>
+      </p:graphicFrame>
+      <p:sp>
+        <p:nvSpPr>
+          <p:cNvPr id="4" name="Datumsplatzhalter 3"/>
+          <p:cNvSpPr>
+            <a:spLocks noGrp="1"/>
+          </p:cNvSpPr>
+          <p:nvPr>
+            <p:ph type="dt" sz="half" idx="10"/>
+          </p:nvPr>
+        </p:nvSpPr>
+        <p:spPr/>
+        <p:txBody>
+          <a:bodyPr/>
+          <a:lstStyle/>
+          <a:p>
+            <a:r>
+              <a:rPr lang="de-DE"/>
+              <a:t>25.04.2017</a:t>
+            </a:r>
+          </a:p>
+        </p:txBody>
+      </p:sp>
+      <p:sp>
+        <p:nvSpPr>
+          <p:cNvPr id="5" name="Fußzeilenplatzhalter 4"/>
+          <p:cNvSpPr>
+            <a:spLocks noGrp="1"/>
+          </p:cNvSpPr>
+          <p:nvPr>
+            <p:ph type="ftr" sz="quarter" idx="11"/>
+          </p:nvPr>
+        </p:nvSpPr>
+        <p:spPr/>
+        <p:txBody>
+          <a:bodyPr/>
+          <a:lstStyle/>
+          <a:p>
+            <a:r>
+              <a:rPr lang="de-DE"/>
+              <a:t>Florian Blessing, Lisa Böhler, Markus Götz, Jan Habersetzer, Wendelin Herrmann</a:t>
+            </a:r>
+          </a:p>
+        </p:txBody>
+      </p:sp>
+      <p:sp>
+        <p:nvSpPr>
+          <p:cNvPr id="8" name="Foliennummernplatzhalter 7"/>
+          <p:cNvSpPr>
+            <a:spLocks noGrp="1"/>
+          </p:cNvSpPr>
+          <p:nvPr>
+            <p:ph type="sldNum" sz="quarter" idx="12"/>
+          </p:nvPr>
+        </p:nvSpPr>
+        <p:spPr/>
+        <p:txBody>
+          <a:bodyPr/>
+          <a:lstStyle/>
+          <a:p>
+            <a:fld id="{9A8D1588-5235-4A3E-9519-E5C37E4E16B7}" type="slidenum">
+              <a:rPr lang="de-DE" smtClean="0"/>
+              <a:t>2</a:t>
+            </a:fld>
+            <a:endParaRPr lang="de-DE"/>
+          </a:p>
+        </p:txBody>
+      </p:sp>
+    </p:spTree>
+    <p:extLst>
+      <p:ext uri="{BB962C8B-B14F-4D97-AF65-F5344CB8AC3E}">
+        <p14:creationId xmlns:p14="http://schemas.microsoft.com/office/powerpoint/2010/main" val="3060933778"/>
+      </p:ext>
+    </p:extLst>
+  </p:cSld>
+  <p:clrMapOvr>
+    <a:masterClrMapping/>
+  </p:clrMapOvr>
+</p:sld>
+</file>
+
+<file path=ppt/slides/slide20.xml><?xml version="1.0" encoding="utf-8"?>
 <p:sld xmlns:a="http://schemas.openxmlformats.org/drawingml/2006/main" xmlns:r="http://schemas.openxmlformats.org/officeDocument/2006/relationships" xmlns:p="http://schemas.openxmlformats.org/presentationml/2006/main">
   <p:cSld>
     <p:spTree>
@@ -38263,7 +38853,7 @@
           <a:p>
             <a:fld id="{9A8D1588-5235-4A3E-9519-E5C37E4E16B7}" type="slidenum">
               <a:rPr lang="de-DE" smtClean="0"/>
-              <a:t>17</a:t>
+              <a:t>20</a:t>
             </a:fld>
             <a:endParaRPr lang="de-DE"/>
           </a:p>
@@ -38282,7 +38872,7 @@
 </p:sld>
 </file>
 
-<file path=ppt/slides/slide18.xml><?xml version="1.0" encoding="utf-8"?>
+<file path=ppt/slides/slide21.xml><?xml version="1.0" encoding="utf-8"?>
 <p:sld xmlns:a="http://schemas.openxmlformats.org/drawingml/2006/main" xmlns:r="http://schemas.openxmlformats.org/officeDocument/2006/relationships" xmlns:p="http://schemas.openxmlformats.org/presentationml/2006/main">
   <p:cSld>
     <p:spTree>
@@ -38382,7 +38972,7 @@
           <a:p>
             <a:fld id="{9A8D1588-5235-4A3E-9519-E5C37E4E16B7}" type="slidenum">
               <a:rPr lang="de-DE" smtClean="0"/>
-              <a:t>18</a:t>
+              <a:t>21</a:t>
             </a:fld>
             <a:endParaRPr lang="de-DE"/>
           </a:p>
@@ -38511,7 +39101,7 @@
 </p:sld>
 </file>
 
-<file path=ppt/slides/slide19.xml><?xml version="1.0" encoding="utf-8"?>
+<file path=ppt/slides/slide22.xml><?xml version="1.0" encoding="utf-8"?>
 <p:sld xmlns:a="http://schemas.openxmlformats.org/drawingml/2006/main" xmlns:r="http://schemas.openxmlformats.org/officeDocument/2006/relationships" xmlns:p="http://schemas.openxmlformats.org/presentationml/2006/main">
   <p:cSld>
     <p:spTree>
@@ -38656,7 +39246,7 @@
           <a:p>
             <a:fld id="{9A8D1588-5235-4A3E-9519-E5C37E4E16B7}" type="slidenum">
               <a:rPr lang="de-DE" smtClean="0"/>
-              <a:t>19</a:t>
+              <a:t>22</a:t>
             </a:fld>
             <a:endParaRPr lang="de-DE"/>
           </a:p>
@@ -39090,151 +39680,7 @@
 </p:sld>
 </file>
 
-<file path=ppt/slides/slide2.xml><?xml version="1.0" encoding="utf-8"?>
-<p:sld xmlns:a="http://schemas.openxmlformats.org/drawingml/2006/main" xmlns:r="http://schemas.openxmlformats.org/officeDocument/2006/relationships" xmlns:p="http://schemas.openxmlformats.org/presentationml/2006/main">
-  <p:cSld>
-    <p:spTree>
-      <p:nvGrpSpPr>
-        <p:cNvPr id="1" name=""/>
-        <p:cNvGrpSpPr/>
-        <p:nvPr/>
-      </p:nvGrpSpPr>
-      <p:grpSpPr>
-        <a:xfrm>
-          <a:off x="0" y="0"/>
-          <a:ext cx="0" cy="0"/>
-          <a:chOff x="0" y="0"/>
-          <a:chExt cx="0" cy="0"/>
-        </a:xfrm>
-      </p:grpSpPr>
-      <p:sp>
-        <p:nvSpPr>
-          <p:cNvPr id="2" name="Titel 1"/>
-          <p:cNvSpPr>
-            <a:spLocks noGrp="1"/>
-          </p:cNvSpPr>
-          <p:nvPr>
-            <p:ph type="title"/>
-          </p:nvPr>
-        </p:nvSpPr>
-        <p:spPr/>
-        <p:txBody>
-          <a:bodyPr/>
-          <a:lstStyle/>
-          <a:p>
-            <a:r>
-              <a:rPr lang="de-DE" dirty="0"/>
-              <a:t>AGENDA</a:t>
-            </a:r>
-          </a:p>
-        </p:txBody>
-      </p:sp>
-      <p:graphicFrame>
-        <p:nvGraphicFramePr>
-          <p:cNvPr id="11" name="Inhaltsplatzhalter 10"/>
-          <p:cNvGraphicFramePr>
-            <a:graphicFrameLocks noGrp="1"/>
-          </p:cNvGraphicFramePr>
-          <p:nvPr>
-            <p:ph idx="1"/>
-            <p:extLst>
-              <p:ext uri="{D42A27DB-BD31-4B8C-83A1-F6EECF244321}">
-                <p14:modId xmlns:p14="http://schemas.microsoft.com/office/powerpoint/2010/main" val="1755907837"/>
-              </p:ext>
-            </p:extLst>
-          </p:nvPr>
-        </p:nvGraphicFramePr>
-        <p:xfrm>
-          <a:off x="838200" y="2651036"/>
-          <a:ext cx="10515600" cy="1555929"/>
-        </p:xfrm>
-        <a:graphic>
-          <a:graphicData uri="http://schemas.openxmlformats.org/drawingml/2006/diagram">
-            <dgm:relIds xmlns:dgm="http://schemas.openxmlformats.org/drawingml/2006/diagram" xmlns:r="http://schemas.openxmlformats.org/officeDocument/2006/relationships" r:dm="rId2" r:lo="rId3" r:qs="rId4" r:cs="rId5"/>
-          </a:graphicData>
-        </a:graphic>
-      </p:graphicFrame>
-      <p:sp>
-        <p:nvSpPr>
-          <p:cNvPr id="4" name="Datumsplatzhalter 3"/>
-          <p:cNvSpPr>
-            <a:spLocks noGrp="1"/>
-          </p:cNvSpPr>
-          <p:nvPr>
-            <p:ph type="dt" sz="half" idx="10"/>
-          </p:nvPr>
-        </p:nvSpPr>
-        <p:spPr/>
-        <p:txBody>
-          <a:bodyPr/>
-          <a:lstStyle/>
-          <a:p>
-            <a:r>
-              <a:rPr lang="de-DE"/>
-              <a:t>25.04.2017</a:t>
-            </a:r>
-          </a:p>
-        </p:txBody>
-      </p:sp>
-      <p:sp>
-        <p:nvSpPr>
-          <p:cNvPr id="5" name="Fußzeilenplatzhalter 4"/>
-          <p:cNvSpPr>
-            <a:spLocks noGrp="1"/>
-          </p:cNvSpPr>
-          <p:nvPr>
-            <p:ph type="ftr" sz="quarter" idx="11"/>
-          </p:nvPr>
-        </p:nvSpPr>
-        <p:spPr/>
-        <p:txBody>
-          <a:bodyPr/>
-          <a:lstStyle/>
-          <a:p>
-            <a:r>
-              <a:rPr lang="de-DE"/>
-              <a:t>Florian Blessing, Lisa Böhler, Markus Götz, Jan Habersetzer, Wendelin Herrmann</a:t>
-            </a:r>
-          </a:p>
-        </p:txBody>
-      </p:sp>
-      <p:sp>
-        <p:nvSpPr>
-          <p:cNvPr id="8" name="Foliennummernplatzhalter 7"/>
-          <p:cNvSpPr>
-            <a:spLocks noGrp="1"/>
-          </p:cNvSpPr>
-          <p:nvPr>
-            <p:ph type="sldNum" sz="quarter" idx="12"/>
-          </p:nvPr>
-        </p:nvSpPr>
-        <p:spPr/>
-        <p:txBody>
-          <a:bodyPr/>
-          <a:lstStyle/>
-          <a:p>
-            <a:fld id="{9A8D1588-5235-4A3E-9519-E5C37E4E16B7}" type="slidenum">
-              <a:rPr lang="de-DE" smtClean="0"/>
-              <a:t>2</a:t>
-            </a:fld>
-            <a:endParaRPr lang="de-DE"/>
-          </a:p>
-        </p:txBody>
-      </p:sp>
-    </p:spTree>
-    <p:extLst>
-      <p:ext uri="{BB962C8B-B14F-4D97-AF65-F5344CB8AC3E}">
-        <p14:creationId xmlns:p14="http://schemas.microsoft.com/office/powerpoint/2010/main" val="3060933778"/>
-      </p:ext>
-    </p:extLst>
-  </p:cSld>
-  <p:clrMapOvr>
-    <a:masterClrMapping/>
-  </p:clrMapOvr>
-</p:sld>
-</file>
-
-<file path=ppt/slides/slide20.xml><?xml version="1.0" encoding="utf-8"?>
+<file path=ppt/slides/slide23.xml><?xml version="1.0" encoding="utf-8"?>
 <p:sld xmlns:a="http://schemas.openxmlformats.org/drawingml/2006/main" xmlns:r="http://schemas.openxmlformats.org/officeDocument/2006/relationships" xmlns:p="http://schemas.openxmlformats.org/presentationml/2006/main">
   <p:cSld>
     <p:spTree>
@@ -39363,7 +39809,7 @@
           <a:p>
             <a:fld id="{9A8D1588-5235-4A3E-9519-E5C37E4E16B7}" type="slidenum">
               <a:rPr lang="de-DE" smtClean="0"/>
-              <a:t>20</a:t>
+              <a:t>23</a:t>
             </a:fld>
             <a:endParaRPr lang="de-DE"/>
           </a:p>
@@ -39382,7 +39828,7 @@
 </p:sld>
 </file>
 
-<file path=ppt/slides/slide21.xml><?xml version="1.0" encoding="utf-8"?>
+<file path=ppt/slides/slide24.xml><?xml version="1.0" encoding="utf-8"?>
 <p:sld xmlns:a="http://schemas.openxmlformats.org/drawingml/2006/main" xmlns:r="http://schemas.openxmlformats.org/officeDocument/2006/relationships" xmlns:p="http://schemas.openxmlformats.org/presentationml/2006/main">
   <p:cSld>
     <p:spTree>
@@ -39511,7 +39957,7 @@
           <a:p>
             <a:fld id="{9A8D1588-5235-4A3E-9519-E5C37E4E16B7}" type="slidenum">
               <a:rPr lang="de-DE" smtClean="0"/>
-              <a:t>21</a:t>
+              <a:t>24</a:t>
             </a:fld>
             <a:endParaRPr lang="de-DE"/>
           </a:p>
@@ -39530,7 +39976,7 @@
 </p:sld>
 </file>
 
-<file path=ppt/slides/slide22.xml><?xml version="1.0" encoding="utf-8"?>
+<file path=ppt/slides/slide25.xml><?xml version="1.0" encoding="utf-8"?>
 <p:sld xmlns:a="http://schemas.openxmlformats.org/drawingml/2006/main" xmlns:r="http://schemas.openxmlformats.org/officeDocument/2006/relationships" xmlns:p="http://schemas.openxmlformats.org/presentationml/2006/main">
   <p:cSld>
     <p:spTree>
@@ -39659,7 +40105,7 @@
           <a:p>
             <a:fld id="{9A8D1588-5235-4A3E-9519-E5C37E4E16B7}" type="slidenum">
               <a:rPr lang="de-DE" smtClean="0"/>
-              <a:t>22</a:t>
+              <a:t>25</a:t>
             </a:fld>
             <a:endParaRPr lang="de-DE"/>
           </a:p>
@@ -39678,7 +40124,7 @@
 </p:sld>
 </file>
 
-<file path=ppt/slides/slide23.xml><?xml version="1.0" encoding="utf-8"?>
+<file path=ppt/slides/slide26.xml><?xml version="1.0" encoding="utf-8"?>
 <p:sld xmlns:a="http://schemas.openxmlformats.org/drawingml/2006/main" xmlns:r="http://schemas.openxmlformats.org/officeDocument/2006/relationships" xmlns:p="http://schemas.openxmlformats.org/presentationml/2006/main">
   <p:cSld>
     <p:spTree>
@@ -39807,7 +40253,7 @@
           <a:p>
             <a:fld id="{9A8D1588-5235-4A3E-9519-E5C37E4E16B7}" type="slidenum">
               <a:rPr lang="de-DE" smtClean="0"/>
-              <a:t>23</a:t>
+              <a:t>26</a:t>
             </a:fld>
             <a:endParaRPr lang="de-DE"/>
           </a:p>
@@ -39826,7 +40272,7 @@
 </p:sld>
 </file>
 
-<file path=ppt/slides/slide24.xml><?xml version="1.0" encoding="utf-8"?>
+<file path=ppt/slides/slide27.xml><?xml version="1.0" encoding="utf-8"?>
 <p:sld xmlns:a="http://schemas.openxmlformats.org/drawingml/2006/main" xmlns:r="http://schemas.openxmlformats.org/officeDocument/2006/relationships" xmlns:p="http://schemas.openxmlformats.org/presentationml/2006/main">
   <p:cSld>
     <p:spTree>
@@ -39945,7 +40391,7 @@
           <a:p>
             <a:fld id="{9A8D1588-5235-4A3E-9519-E5C37E4E16B7}" type="slidenum">
               <a:rPr lang="de-DE" smtClean="0"/>
-              <a:t>24</a:t>
+              <a:t>27</a:t>
             </a:fld>
             <a:endParaRPr lang="de-DE"/>
           </a:p>
@@ -39964,7 +40410,7 @@
 </p:sld>
 </file>
 
-<file path=ppt/slides/slide25.xml><?xml version="1.0" encoding="utf-8"?>
+<file path=ppt/slides/slide28.xml><?xml version="1.0" encoding="utf-8"?>
 <p:sld xmlns:a="http://schemas.openxmlformats.org/drawingml/2006/main" xmlns:r="http://schemas.openxmlformats.org/officeDocument/2006/relationships" xmlns:p="http://schemas.openxmlformats.org/presentationml/2006/main">
   <p:cSld>
     <p:spTree>
@@ -40098,7 +40544,7 @@
           <a:p>
             <a:fld id="{9A8D1588-5235-4A3E-9519-E5C37E4E16B7}" type="slidenum">
               <a:rPr lang="de-DE" smtClean="0"/>
-              <a:t>25</a:t>
+              <a:t>28</a:t>
             </a:fld>
             <a:endParaRPr lang="de-DE"/>
           </a:p>
@@ -40531,7 +40977,7 @@
 </p:sld>
 </file>
 
-<file path=ppt/slides/slide26.xml><?xml version="1.0" encoding="utf-8"?>
+<file path=ppt/slides/slide29.xml><?xml version="1.0" encoding="utf-8"?>
 <p:sld xmlns:a="http://schemas.openxmlformats.org/drawingml/2006/main" xmlns:r="http://schemas.openxmlformats.org/officeDocument/2006/relationships" xmlns:p="http://schemas.openxmlformats.org/presentationml/2006/main">
   <p:cSld>
     <p:spTree>

</xml_diff>